<commit_message>
slide and code tweaks resulting from practice dry run
</commit_message>
<xml_diff>
--- a/slides.pptx
+++ b/slides.pptx
@@ -5,26 +5,27 @@
     <p:sldMasterId id="2147483648" r:id="rId4"/>
   </p:sldMasterIdLst>
   <p:notesMasterIdLst>
-    <p:notesMasterId r:id="rId22"/>
+    <p:notesMasterId r:id="rId23"/>
   </p:notesMasterIdLst>
   <p:sldIdLst>
     <p:sldId id="263" r:id="rId5"/>
     <p:sldId id="269" r:id="rId6"/>
     <p:sldId id="258" r:id="rId7"/>
     <p:sldId id="267" r:id="rId8"/>
-    <p:sldId id="270" r:id="rId9"/>
-    <p:sldId id="271" r:id="rId10"/>
-    <p:sldId id="272" r:id="rId11"/>
-    <p:sldId id="277" r:id="rId12"/>
-    <p:sldId id="282" r:id="rId13"/>
-    <p:sldId id="273" r:id="rId14"/>
-    <p:sldId id="274" r:id="rId15"/>
-    <p:sldId id="275" r:id="rId16"/>
-    <p:sldId id="276" r:id="rId17"/>
-    <p:sldId id="278" r:id="rId18"/>
-    <p:sldId id="279" r:id="rId19"/>
-    <p:sldId id="280" r:id="rId20"/>
-    <p:sldId id="281" r:id="rId21"/>
+    <p:sldId id="283" r:id="rId9"/>
+    <p:sldId id="270" r:id="rId10"/>
+    <p:sldId id="271" r:id="rId11"/>
+    <p:sldId id="272" r:id="rId12"/>
+    <p:sldId id="277" r:id="rId13"/>
+    <p:sldId id="282" r:id="rId14"/>
+    <p:sldId id="273" r:id="rId15"/>
+    <p:sldId id="274" r:id="rId16"/>
+    <p:sldId id="275" r:id="rId17"/>
+    <p:sldId id="276" r:id="rId18"/>
+    <p:sldId id="278" r:id="rId19"/>
+    <p:sldId id="279" r:id="rId20"/>
+    <p:sldId id="280" r:id="rId21"/>
+    <p:sldId id="281" r:id="rId22"/>
   </p:sldIdLst>
   <p:sldSz cx="9144000" cy="6858000" type="screen4x3"/>
   <p:notesSz cx="7315200" cy="9601200"/>
@@ -263,7 +264,7 @@
               <a:pPr>
                 <a:defRPr/>
               </a:pPr>
-              <a:t>12/23/2015</a:t>
+              <a:t>12/30/2015</a:t>
             </a:fld>
             <a:endParaRPr lang="en-US"/>
           </a:p>
@@ -758,42 +759,47 @@
           <a:p>
             <a:r>
               <a:rPr lang="en-US" dirty="0" smtClean="0"/>
-              <a:t>You publish a message</a:t>
-            </a:r>
+              <a:t>You put a message A on the queue</a:t>
+            </a:r>
+            <a:r>
+              <a:rPr lang="en-US" baseline="0" dirty="0" smtClean="0"/>
+              <a:t> (send)</a:t>
+            </a:r>
+          </a:p>
+          <a:p>
+            <a:r>
+              <a:rPr lang="en-US" baseline="0" dirty="0" smtClean="0"/>
+              <a:t>You take a message A off the queue (receive)</a:t>
+            </a:r>
+          </a:p>
+          <a:p>
+            <a:r>
+              <a:rPr lang="en-US" baseline="0" dirty="0" smtClean="0"/>
+              <a:t>The queue is durable, so it will persist in the queue after it is sent.</a:t>
+            </a:r>
+          </a:p>
+          <a:p>
+            <a:endParaRPr lang="en-US" dirty="0" smtClean="0"/>
           </a:p>
           <a:p>
             <a:r>
               <a:rPr lang="en-US" dirty="0" smtClean="0"/>
-              <a:t>Anyone who is subscribing</a:t>
+              <a:t>With this pattern, you can put</a:t>
             </a:r>
             <a:r>
               <a:rPr lang="en-US" baseline="0" dirty="0" smtClean="0"/>
-              <a:t> will receive the message.</a:t>
-            </a:r>
+              <a:t> any number of message types on the same queue. Receivers who subscribe to the queue will process the message types separately.</a:t>
+            </a:r>
+          </a:p>
+          <a:p>
+            <a:endParaRPr lang="en-US" baseline="0" dirty="0" smtClean="0"/>
           </a:p>
           <a:p>
             <a:r>
               <a:rPr lang="en-US" baseline="0" dirty="0" smtClean="0"/>
-              <a:t>You can have multiple subscribers for 2 different reasons:</a:t>
-            </a:r>
-          </a:p>
-          <a:p>
-            <a:pPr marL="228600" indent="-228600">
-              <a:buAutoNum type="arabicParenR"/>
-            </a:pPr>
-            <a:r>
-              <a:rPr lang="en-US" baseline="0" dirty="0" smtClean="0"/>
-              <a:t>Scaling (more processes, the more messages you can process)</a:t>
-            </a:r>
-          </a:p>
-          <a:p>
-            <a:pPr marL="228600" indent="-228600">
-              <a:buAutoNum type="arabicParenR"/>
-            </a:pPr>
-            <a:r>
-              <a:rPr lang="en-US" baseline="0" dirty="0" smtClean="0"/>
-              <a:t>Doing multiple things with the same message (notify the seller, process the payment, notify the warehouse)</a:t>
-            </a:r>
+              <a:t>You don’t have to put everything on the same queue, but you can.</a:t>
+            </a:r>
+            <a:endParaRPr lang="en-US" dirty="0" smtClean="0"/>
           </a:p>
         </p:txBody>
       </p:sp>
@@ -829,7 +835,7 @@
     </p:spTree>
     <p:extLst>
       <p:ext uri="{BB962C8B-B14F-4D97-AF65-F5344CB8AC3E}">
-        <p14:creationId xmlns:p14="http://schemas.microsoft.com/office/powerpoint/2010/main" val="3615418977"/>
+        <p14:creationId xmlns:p14="http://schemas.microsoft.com/office/powerpoint/2010/main" val="1174759699"/>
       </p:ext>
     </p:extLst>
   </p:cSld>
@@ -885,39 +891,42 @@
           <a:p>
             <a:r>
               <a:rPr lang="en-US" dirty="0" smtClean="0"/>
-              <a:t>You can use</a:t>
+              <a:t>You publish a message</a:t>
+            </a:r>
+          </a:p>
+          <a:p>
+            <a:r>
+              <a:rPr lang="en-US" dirty="0" smtClean="0"/>
+              <a:t>Anyone who is subscribing</a:t>
             </a:r>
             <a:r>
               <a:rPr lang="en-US" baseline="0" dirty="0" smtClean="0"/>
-              <a:t> </a:t>
-            </a:r>
-            <a:r>
-              <a:rPr lang="en-US" baseline="0" dirty="0" err="1" smtClean="0"/>
-              <a:t>EasyNetQ</a:t>
-            </a:r>
+              <a:t> will receive the message.</a:t>
+            </a:r>
+          </a:p>
+          <a:p>
             <a:r>
               <a:rPr lang="en-US" baseline="0" dirty="0" smtClean="0"/>
-              <a:t> to send a message as a request, and then wait for the response.</a:t>
-            </a:r>
-          </a:p>
-          <a:p>
+              <a:t>You can have multiple subscribers for 2 different reasons:</a:t>
+            </a:r>
+          </a:p>
+          <a:p>
+            <a:pPr marL="228600" indent="-228600">
+              <a:buAutoNum type="arabicParenR"/>
+            </a:pPr>
             <a:r>
               <a:rPr lang="en-US" baseline="0" dirty="0" smtClean="0"/>
-              <a:t>It’s like a remote method call.</a:t>
-            </a:r>
-          </a:p>
-          <a:p>
+              <a:t>Scaling (more processes, the more messages you can process)</a:t>
+            </a:r>
+          </a:p>
+          <a:p>
+            <a:pPr marL="228600" indent="-228600">
+              <a:buAutoNum type="arabicParenR"/>
+            </a:pPr>
             <a:r>
               <a:rPr lang="en-US" baseline="0" dirty="0" smtClean="0"/>
-              <a:t>You can do it as a blocking call or as an asynchronous call.</a:t>
-            </a:r>
-          </a:p>
-          <a:p>
-            <a:r>
-              <a:rPr lang="en-US" baseline="0" dirty="0" smtClean="0"/>
-              <a:t>This is pretty cool, but I’m not going to demo it today unless we have time. Talk to me afterwards if this is something you’re interested in.</a:t>
-            </a:r>
-            <a:endParaRPr lang="en-US" dirty="0"/>
+              <a:t>Doing multiple things with the same message (notify the seller, process the payment, notify the warehouse)</a:t>
+            </a:r>
           </a:p>
         </p:txBody>
       </p:sp>
@@ -953,7 +962,7 @@
     </p:spTree>
     <p:extLst>
       <p:ext uri="{BB962C8B-B14F-4D97-AF65-F5344CB8AC3E}">
-        <p14:creationId xmlns:p14="http://schemas.microsoft.com/office/powerpoint/2010/main" val="3672246787"/>
+        <p14:creationId xmlns:p14="http://schemas.microsoft.com/office/powerpoint/2010/main" val="3615418977"/>
       </p:ext>
     </p:extLst>
   </p:cSld>
@@ -1009,11 +1018,37 @@
           <a:p>
             <a:r>
               <a:rPr lang="en-US" dirty="0" smtClean="0"/>
-              <a:t>I’m not going to cover</a:t>
+              <a:t>You can use</a:t>
             </a:r>
             <a:r>
               <a:rPr lang="en-US" baseline="0" dirty="0" smtClean="0"/>
-              <a:t> #3, but I do have code samples for it if you are interested in checking it out on your own.</a:t>
+              <a:t> </a:t>
+            </a:r>
+            <a:r>
+              <a:rPr lang="en-US" baseline="0" dirty="0" err="1" smtClean="0"/>
+              <a:t>EasyNetQ</a:t>
+            </a:r>
+            <a:r>
+              <a:rPr lang="en-US" baseline="0" dirty="0" smtClean="0"/>
+              <a:t> to send a message as a request, and then wait for the response.</a:t>
+            </a:r>
+          </a:p>
+          <a:p>
+            <a:r>
+              <a:rPr lang="en-US" baseline="0" dirty="0" smtClean="0"/>
+              <a:t>It’s like a remote method call.</a:t>
+            </a:r>
+          </a:p>
+          <a:p>
+            <a:r>
+              <a:rPr lang="en-US" baseline="0" dirty="0" smtClean="0"/>
+              <a:t>You can do it as a blocking call or as an asynchronous call.</a:t>
+            </a:r>
+          </a:p>
+          <a:p>
+            <a:r>
+              <a:rPr lang="en-US" baseline="0" dirty="0" smtClean="0"/>
+              <a:t>This is pretty cool, but I’m not going to demo it today unless we have time. Talk to me afterwards if this is something you’re interested in.</a:t>
             </a:r>
             <a:endParaRPr lang="en-US" dirty="0"/>
           </a:p>
@@ -1051,7 +1086,7 @@
     </p:spTree>
     <p:extLst>
       <p:ext uri="{BB962C8B-B14F-4D97-AF65-F5344CB8AC3E}">
-        <p14:creationId xmlns:p14="http://schemas.microsoft.com/office/powerpoint/2010/main" val="2587942622"/>
+        <p14:creationId xmlns:p14="http://schemas.microsoft.com/office/powerpoint/2010/main" val="3672246787"/>
       </p:ext>
     </p:extLst>
   </p:cSld>
@@ -1107,117 +1142,13 @@
           <a:p>
             <a:r>
               <a:rPr lang="en-US" dirty="0" smtClean="0"/>
-              <a:t>At</a:t>
+              <a:t>I’m not going to cover</a:t>
             </a:r>
             <a:r>
               <a:rPr lang="en-US" baseline="0" dirty="0" smtClean="0"/>
-              <a:t> last </a:t>
-            </a:r>
-            <a:r>
-              <a:rPr lang="en-US" baseline="0" dirty="0" err="1" smtClean="0"/>
-              <a:t>CodeMash</a:t>
-            </a:r>
-            <a:r>
-              <a:rPr lang="en-US" baseline="0" dirty="0" smtClean="0"/>
-              <a:t>, I was inspired to create an open source project, </a:t>
-            </a:r>
-            <a:r>
-              <a:rPr lang="en-US" baseline="0" dirty="0" err="1" smtClean="0"/>
-              <a:t>EmpiriCall</a:t>
-            </a:r>
-            <a:r>
-              <a:rPr lang="en-US" baseline="0" dirty="0" smtClean="0"/>
-              <a:t>. It’s still a work in progress.</a:t>
-            </a:r>
-          </a:p>
-          <a:p>
-            <a:endParaRPr lang="en-US" baseline="0" dirty="0" smtClean="0"/>
-          </a:p>
-          <a:p>
-            <a:r>
-              <a:rPr lang="en-US" baseline="0" dirty="0" smtClean="0"/>
-              <a:t>At Heuristics, we mainly work on a product called </a:t>
-            </a:r>
-            <a:r>
-              <a:rPr lang="en-US" baseline="0" dirty="0" err="1" smtClean="0"/>
-              <a:t>LearningBuilder</a:t>
-            </a:r>
-            <a:r>
-              <a:rPr lang="en-US" baseline="0" dirty="0" smtClean="0"/>
-              <a:t>. It’s a large, complex, highly configurable system with a lot of features.</a:t>
-            </a:r>
-          </a:p>
-          <a:p>
-            <a:endParaRPr lang="en-US" baseline="0" dirty="0" smtClean="0"/>
-          </a:p>
-          <a:p>
-            <a:r>
-              <a:rPr lang="en-US" baseline="0" dirty="0" smtClean="0"/>
-              <a:t>I wanted to answer some questions about </a:t>
-            </a:r>
-            <a:r>
-              <a:rPr lang="en-US" baseline="0" dirty="0" err="1" smtClean="0"/>
-              <a:t>LearningBuilder</a:t>
-            </a:r>
-            <a:r>
-              <a:rPr lang="en-US" baseline="0" dirty="0" smtClean="0"/>
-              <a:t>.</a:t>
-            </a:r>
-          </a:p>
-          <a:p>
-            <a:pPr marL="228600" indent="-228600">
-              <a:buAutoNum type="arabicParenR"/>
-            </a:pPr>
-            <a:r>
-              <a:rPr lang="en-US" baseline="0" dirty="0" smtClean="0"/>
-              <a:t>Which features are being used?</a:t>
-            </a:r>
-          </a:p>
-          <a:p>
-            <a:pPr marL="228600" indent="-228600">
-              <a:buAutoNum type="arabicParenR"/>
-            </a:pPr>
-            <a:r>
-              <a:rPr lang="en-US" baseline="0" dirty="0" smtClean="0"/>
-              <a:t>Which features are not being used (or barely being used)?</a:t>
-            </a:r>
-          </a:p>
-          <a:p>
-            <a:pPr marL="228600" indent="-228600">
-              <a:buAutoNum type="arabicParenR"/>
-            </a:pPr>
-            <a:r>
-              <a:rPr lang="en-US" baseline="0" dirty="0" smtClean="0"/>
-              <a:t>Which users are using which features?</a:t>
-            </a:r>
-          </a:p>
-          <a:p>
-            <a:pPr marL="228600" indent="-228600">
-              <a:buAutoNum type="arabicParenR"/>
-            </a:pPr>
-            <a:r>
-              <a:rPr lang="en-US" baseline="0" dirty="0" smtClean="0"/>
-              <a:t>Which customers are using which features?</a:t>
-            </a:r>
-          </a:p>
-          <a:p>
-            <a:pPr marL="228600" indent="-228600">
-              <a:buAutoNum type="arabicParenR"/>
-            </a:pPr>
-            <a:endParaRPr lang="en-US" baseline="0" dirty="0" smtClean="0"/>
-          </a:p>
-          <a:p>
-            <a:pPr marL="0" indent="0">
-              <a:buNone/>
-            </a:pPr>
-            <a:r>
-              <a:rPr lang="en-US" baseline="0" dirty="0" smtClean="0"/>
-              <a:t>I could guess, talk to customers, talk to the BAs, sales, etc. And that’s important. But I also want to be able to look at the actual usage, and have empirical answers to those questions. This data can help inform decisions for testing, refactoring, sales, </a:t>
-            </a:r>
-            <a:r>
-              <a:rPr lang="en-US" baseline="0" dirty="0" smtClean="0"/>
-              <a:t>pricing.</a:t>
-            </a:r>
+              <a:t> #3, but I do have code samples for it if you are interested in checking it out on your own.</a:t>
+            </a:r>
+            <a:endParaRPr lang="en-US" dirty="0"/>
           </a:p>
         </p:txBody>
       </p:sp>
@@ -1253,7 +1184,7 @@
     </p:spTree>
     <p:extLst>
       <p:ext uri="{BB962C8B-B14F-4D97-AF65-F5344CB8AC3E}">
-        <p14:creationId xmlns:p14="http://schemas.microsoft.com/office/powerpoint/2010/main" val="1152442700"/>
+        <p14:creationId xmlns:p14="http://schemas.microsoft.com/office/powerpoint/2010/main" val="2587942622"/>
       </p:ext>
     </p:extLst>
   </p:cSld>
@@ -1304,239 +1235,118 @@
         </p:nvSpPr>
         <p:spPr/>
         <p:txBody>
-          <a:bodyPr>
-            <a:normAutofit fontScale="92500"/>
-          </a:bodyPr>
+          <a:bodyPr/>
           <a:lstStyle/>
           <a:p>
-            <a:pPr marL="0" marR="0" indent="0" algn="l" defTabSz="914400" rtl="0" eaLnBrk="0" fontAlgn="base" latinLnBrk="0" hangingPunct="0">
-              <a:lnSpc>
-                <a:spcPct val="100000"/>
-              </a:lnSpc>
-              <a:spcBef>
-                <a:spcPct val="30000"/>
-              </a:spcBef>
-              <a:spcAft>
-                <a:spcPct val="0"/>
-              </a:spcAft>
-              <a:buClrTx/>
-              <a:buSzTx/>
-              <a:buFontTx/>
-              <a:buNone/>
-              <a:tabLst/>
-              <a:defRPr/>
+            <a:r>
+              <a:rPr lang="en-US" dirty="0" smtClean="0"/>
+              <a:t>At</a:t>
+            </a:r>
+            <a:r>
+              <a:rPr lang="en-US" baseline="0" dirty="0" smtClean="0"/>
+              <a:t> last </a:t>
+            </a:r>
+            <a:r>
+              <a:rPr lang="en-US" baseline="0" dirty="0" err="1" smtClean="0"/>
+              <a:t>CodeMash</a:t>
+            </a:r>
+            <a:r>
+              <a:rPr lang="en-US" baseline="0" dirty="0" smtClean="0"/>
+              <a:t>, I was inspired to create an open source project, </a:t>
+            </a:r>
+            <a:r>
+              <a:rPr lang="en-US" baseline="0" dirty="0" err="1" smtClean="0"/>
+              <a:t>EmpiriCall</a:t>
+            </a:r>
+            <a:r>
+              <a:rPr lang="en-US" baseline="0" dirty="0" smtClean="0"/>
+              <a:t>. It’s still a work in progress.</a:t>
+            </a:r>
+          </a:p>
+          <a:p>
+            <a:endParaRPr lang="en-US" baseline="0" dirty="0" smtClean="0"/>
+          </a:p>
+          <a:p>
+            <a:r>
+              <a:rPr lang="en-US" baseline="0" dirty="0" smtClean="0"/>
+              <a:t>At Heuristics, we mainly work on a product called </a:t>
+            </a:r>
+            <a:r>
+              <a:rPr lang="en-US" baseline="0" dirty="0" err="1" smtClean="0"/>
+              <a:t>LearningBuilder</a:t>
+            </a:r>
+            <a:r>
+              <a:rPr lang="en-US" baseline="0" dirty="0" smtClean="0"/>
+              <a:t>. It’s a large, complex, highly configurable system with a lot of features.</a:t>
+            </a:r>
+          </a:p>
+          <a:p>
+            <a:endParaRPr lang="en-US" baseline="0" dirty="0" smtClean="0"/>
+          </a:p>
+          <a:p>
+            <a:r>
+              <a:rPr lang="en-US" baseline="0" dirty="0" smtClean="0"/>
+              <a:t>I wanted to answer some questions about </a:t>
+            </a:r>
+            <a:r>
+              <a:rPr lang="en-US" baseline="0" dirty="0" err="1" smtClean="0"/>
+              <a:t>LearningBuilder</a:t>
+            </a:r>
+            <a:r>
+              <a:rPr lang="en-US" baseline="0" dirty="0" smtClean="0"/>
+              <a:t>.</a:t>
+            </a:r>
+          </a:p>
+          <a:p>
+            <a:pPr marL="228600" indent="-228600">
+              <a:buAutoNum type="arabicParenR"/>
             </a:pPr>
             <a:r>
-              <a:rPr lang="en-US" dirty="0" smtClean="0"/>
-              <a:t>I’m sure I’m not the first to think of this, and maybe I’m wrong,</a:t>
-            </a:r>
-            <a:r>
               <a:rPr lang="en-US" baseline="0" dirty="0" smtClean="0"/>
-              <a:t> but here goes.</a:t>
-            </a:r>
-          </a:p>
-          <a:p>
-            <a:endParaRPr lang="en-US" dirty="0" smtClean="0"/>
-          </a:p>
-          <a:p>
-            <a:r>
-              <a:rPr lang="en-US" dirty="0" smtClean="0"/>
-              <a:t>My</a:t>
-            </a:r>
+              <a:t>Which features are being used?</a:t>
+            </a:r>
+          </a:p>
+          <a:p>
+            <a:pPr marL="228600" indent="-228600">
+              <a:buAutoNum type="arabicParenR"/>
+            </a:pPr>
             <a:r>
               <a:rPr lang="en-US" baseline="0" dirty="0" smtClean="0"/>
-              <a:t> central conceit is that there are features, and there are MVC actions. A feature consists of a bundle of MVC actions. I can track MVC action details, therefore, I can track features. (if I map them correctly).</a:t>
-            </a:r>
-            <a:endParaRPr lang="en-US" dirty="0" smtClean="0"/>
-          </a:p>
-          <a:p>
-            <a:endParaRPr lang="en-US" dirty="0" smtClean="0"/>
-          </a:p>
-          <a:p>
-            <a:r>
-              <a:rPr lang="en-US" dirty="0" smtClean="0"/>
-              <a:t>You</a:t>
-            </a:r>
+              <a:t>Which features are not being used (or barely being used)?</a:t>
+            </a:r>
+          </a:p>
+          <a:p>
+            <a:pPr marL="228600" indent="-228600">
+              <a:buAutoNum type="arabicParenR"/>
+            </a:pPr>
             <a:r>
               <a:rPr lang="en-US" baseline="0" dirty="0" smtClean="0"/>
-              <a:t> might think a logging framework or Google Analytics could do this, and maybe they can, but I don’t think those tools have this in mind. They also can’t report on what’s NOT being used very well.</a:t>
-            </a:r>
-            <a:endParaRPr lang="en-US" dirty="0" smtClean="0"/>
-          </a:p>
-          <a:p>
-            <a:pPr marL="0" marR="0" indent="0" algn="l" defTabSz="914400" rtl="0" eaLnBrk="0" fontAlgn="base" latinLnBrk="0" hangingPunct="0">
-              <a:lnSpc>
-                <a:spcPct val="100000"/>
-              </a:lnSpc>
-              <a:spcBef>
-                <a:spcPct val="30000"/>
-              </a:spcBef>
-              <a:spcAft>
-                <a:spcPct val="0"/>
-              </a:spcAft>
-              <a:buClrTx/>
-              <a:buSzTx/>
-              <a:buFontTx/>
-              <a:buNone/>
-              <a:tabLst/>
-              <a:defRPr/>
+              <a:t>Which users are using which features?</a:t>
+            </a:r>
+          </a:p>
+          <a:p>
+            <a:pPr marL="228600" indent="-228600">
+              <a:buAutoNum type="arabicParenR"/>
+            </a:pPr>
+            <a:r>
+              <a:rPr lang="en-US" baseline="0" dirty="0" smtClean="0"/>
+              <a:t>Which customers are using which features?</a:t>
+            </a:r>
+          </a:p>
+          <a:p>
+            <a:pPr marL="228600" indent="-228600">
+              <a:buAutoNum type="arabicParenR"/>
             </a:pPr>
             <a:endParaRPr lang="en-US" baseline="0" dirty="0" smtClean="0"/>
           </a:p>
           <a:p>
-            <a:pPr marL="0" marR="0" indent="0" algn="l" defTabSz="914400" rtl="0" eaLnBrk="0" fontAlgn="base" latinLnBrk="0" hangingPunct="0">
-              <a:lnSpc>
-                <a:spcPct val="100000"/>
-              </a:lnSpc>
-              <a:spcBef>
-                <a:spcPct val="30000"/>
-              </a:spcBef>
-              <a:spcAft>
-                <a:spcPct val="0"/>
-              </a:spcAft>
-              <a:buClrTx/>
-              <a:buSzTx/>
-              <a:buFontTx/>
+            <a:pPr marL="0" indent="0">
               <a:buNone/>
-              <a:tabLst/>
-              <a:defRPr/>
             </a:pPr>
             <a:r>
               <a:rPr lang="en-US" baseline="0" dirty="0" smtClean="0"/>
-              <a:t>I’m going to record every single MVC action and the user who is doing the action. I’m going to parse my MVC app to get a list of all the possible actions. I can also tie those actions to a “feature”, which is just an arbitrary string.</a:t>
-            </a:r>
-          </a:p>
-          <a:p>
-            <a:pPr marL="0" marR="0" indent="0" algn="l" defTabSz="914400" rtl="0" eaLnBrk="0" fontAlgn="base" latinLnBrk="0" hangingPunct="0">
-              <a:lnSpc>
-                <a:spcPct val="100000"/>
-              </a:lnSpc>
-              <a:spcBef>
-                <a:spcPct val="30000"/>
-              </a:spcBef>
-              <a:spcAft>
-                <a:spcPct val="0"/>
-              </a:spcAft>
-              <a:buClrTx/>
-              <a:buSzTx/>
-              <a:buFontTx/>
-              <a:buNone/>
-              <a:tabLst/>
-              <a:defRPr/>
-            </a:pPr>
-            <a:endParaRPr lang="en-US" baseline="0" dirty="0" smtClean="0"/>
-          </a:p>
-          <a:p>
-            <a:pPr marL="0" marR="0" indent="0" algn="l" defTabSz="914400" rtl="0" eaLnBrk="0" fontAlgn="base" latinLnBrk="0" hangingPunct="0">
-              <a:lnSpc>
-                <a:spcPct val="100000"/>
-              </a:lnSpc>
-              <a:spcBef>
-                <a:spcPct val="30000"/>
-              </a:spcBef>
-              <a:spcAft>
-                <a:spcPct val="0"/>
-              </a:spcAft>
-              <a:buClrTx/>
-              <a:buSzTx/>
-              <a:buFontTx/>
-              <a:buNone/>
-              <a:tabLst/>
-              <a:defRPr/>
-            </a:pPr>
-            <a:r>
-              <a:rPr lang="en-US" baseline="0" dirty="0" smtClean="0"/>
-              <a:t>An architect can see “hey, no one has used this action in 6 months, why not? Can we drop it?”</a:t>
-            </a:r>
-          </a:p>
-          <a:p>
-            <a:pPr marL="0" marR="0" indent="0" algn="l" defTabSz="914400" rtl="0" eaLnBrk="0" fontAlgn="base" latinLnBrk="0" hangingPunct="0">
-              <a:lnSpc>
-                <a:spcPct val="100000"/>
-              </a:lnSpc>
-              <a:spcBef>
-                <a:spcPct val="30000"/>
-              </a:spcBef>
-              <a:spcAft>
-                <a:spcPct val="0"/>
-              </a:spcAft>
-              <a:buClrTx/>
-              <a:buSzTx/>
-              <a:buFontTx/>
-              <a:buNone/>
-              <a:tabLst/>
-              <a:defRPr/>
-            </a:pPr>
-            <a:r>
-              <a:rPr lang="en-US" baseline="0" dirty="0" smtClean="0"/>
-              <a:t>A BA can see “Hey, this customer is using feature X a lot during a certain month? Why? Is there something missing?”</a:t>
-            </a:r>
-          </a:p>
-          <a:p>
-            <a:pPr marL="0" marR="0" indent="0" algn="l" defTabSz="914400" rtl="0" eaLnBrk="0" fontAlgn="base" latinLnBrk="0" hangingPunct="0">
-              <a:lnSpc>
-                <a:spcPct val="100000"/>
-              </a:lnSpc>
-              <a:spcBef>
-                <a:spcPct val="30000"/>
-              </a:spcBef>
-              <a:spcAft>
-                <a:spcPct val="0"/>
-              </a:spcAft>
-              <a:buClrTx/>
-              <a:buSzTx/>
-              <a:buFontTx/>
-              <a:buNone/>
-              <a:tabLst/>
-              <a:defRPr/>
-            </a:pPr>
-            <a:r>
-              <a:rPr lang="en-US" baseline="0" dirty="0" smtClean="0"/>
-              <a:t>Sales can see “Hey, only customer X is using feature Y, maybe we should sell it as a separate module.”</a:t>
-            </a:r>
-          </a:p>
-          <a:p>
-            <a:pPr marL="0" marR="0" indent="0" algn="l" defTabSz="914400" rtl="0" eaLnBrk="0" fontAlgn="base" latinLnBrk="0" hangingPunct="0">
-              <a:lnSpc>
-                <a:spcPct val="100000"/>
-              </a:lnSpc>
-              <a:spcBef>
-                <a:spcPct val="30000"/>
-              </a:spcBef>
-              <a:spcAft>
-                <a:spcPct val="0"/>
-              </a:spcAft>
-              <a:buClrTx/>
-              <a:buSzTx/>
-              <a:buFontTx/>
-              <a:buNone/>
-              <a:tabLst/>
-              <a:defRPr/>
-            </a:pPr>
-            <a:r>
-              <a:rPr lang="en-US" baseline="0" dirty="0" smtClean="0"/>
-              <a:t>A UX Designer can see “Hey, no one is using feature Z, maybe because it’s not discoverable enough”</a:t>
-            </a:r>
-          </a:p>
-          <a:p>
-            <a:pPr marL="0" marR="0" indent="0" algn="l" defTabSz="914400" rtl="0" eaLnBrk="0" fontAlgn="base" latinLnBrk="0" hangingPunct="0">
-              <a:lnSpc>
-                <a:spcPct val="100000"/>
-              </a:lnSpc>
-              <a:spcBef>
-                <a:spcPct val="30000"/>
-              </a:spcBef>
-              <a:spcAft>
-                <a:spcPct val="0"/>
-              </a:spcAft>
-              <a:buClrTx/>
-              <a:buSzTx/>
-              <a:buFontTx/>
-              <a:buNone/>
-              <a:tabLst/>
-              <a:defRPr/>
-            </a:pPr>
-            <a:endParaRPr lang="en-US" baseline="0" dirty="0" smtClean="0"/>
+              <a:t>I could guess, talk to customers, talk to the BAs, sales, etc. And that’s important. But I also want to be able to look at the actual usage, and have empirical answers to those questions. This data can help inform decisions for testing, refactoring, sales, pricing.</a:t>
+            </a:r>
           </a:p>
         </p:txBody>
       </p:sp>
@@ -1572,7 +1382,7 @@
     </p:spTree>
     <p:extLst>
       <p:ext uri="{BB962C8B-B14F-4D97-AF65-F5344CB8AC3E}">
-        <p14:creationId xmlns:p14="http://schemas.microsoft.com/office/powerpoint/2010/main" val="1206815952"/>
+        <p14:creationId xmlns:p14="http://schemas.microsoft.com/office/powerpoint/2010/main" val="1152442700"/>
       </p:ext>
     </p:extLst>
   </p:cSld>
@@ -1623,7 +1433,9 @@
         </p:nvSpPr>
         <p:spPr/>
         <p:txBody>
-          <a:bodyPr/>
+          <a:bodyPr>
+            <a:normAutofit fontScale="92500"/>
+          </a:bodyPr>
           <a:lstStyle/>
           <a:p>
             <a:pPr marL="0" marR="0" indent="0" algn="l" defTabSz="914400" rtl="0" eaLnBrk="0" fontAlgn="base" latinLnBrk="0" hangingPunct="0">
@@ -1644,31 +1456,216 @@
               <a:defRPr/>
             </a:pPr>
             <a:r>
+              <a:rPr lang="en-US" dirty="0" smtClean="0"/>
+              <a:t>I’m sure I’m not the first to think of this, and maybe I’m wrong,</a:t>
+            </a:r>
+            <a:r>
               <a:rPr lang="en-US" baseline="0" dirty="0" smtClean="0"/>
-              <a:t>That’s my vision, anyway. Let me show it to you in action, on </a:t>
-            </a:r>
-            <a:r>
-              <a:rPr lang="en-US" baseline="0" dirty="0" err="1" smtClean="0"/>
-              <a:t>LearningBuilder</a:t>
+              <a:t> but here goes.</a:t>
+            </a:r>
+          </a:p>
+          <a:p>
+            <a:endParaRPr lang="en-US" dirty="0" smtClean="0"/>
+          </a:p>
+          <a:p>
+            <a:r>
+              <a:rPr lang="en-US" dirty="0" smtClean="0"/>
+              <a:t>My</a:t>
             </a:r>
             <a:r>
               <a:rPr lang="en-US" baseline="0" dirty="0" smtClean="0"/>
-              <a:t>.</a:t>
-            </a:r>
-          </a:p>
-          <a:p>
+              <a:t> central conceit is that there are features, and there are MVC actions. A feature consists of a bundle of MVC actions. I can track MVC action details, therefore, I can track features. (if I map them correctly).</a:t>
+            </a:r>
             <a:endParaRPr lang="en-US" dirty="0" smtClean="0"/>
           </a:p>
           <a:p>
+            <a:endParaRPr lang="en-US" dirty="0" smtClean="0"/>
+          </a:p>
+          <a:p>
             <a:r>
               <a:rPr lang="en-US" dirty="0" smtClean="0"/>
-              <a:t>I</a:t>
+              <a:t>You</a:t>
             </a:r>
             <a:r>
               <a:rPr lang="en-US" baseline="0" dirty="0" smtClean="0"/>
-              <a:t> said that I was recording every MVC action. If I’m making an extra database trip for every single action, that’s adding a lot of work to the main project; a lot of extra DB traffic. But I can just record the data into a message, push it off to a queue, and have some other process put it into the reporting database. So the main project is barely doing any extra work—all the work is on the queue, the processors, and a separate reporting database.</a:t>
-            </a:r>
-            <a:endParaRPr lang="en-US" dirty="0"/>
+              <a:t> might think a logging framework or Google Analytics could do this, and maybe they can, but I don’t think those tools have this in mind. They also can’t report on what’s NOT being used very well.</a:t>
+            </a:r>
+            <a:endParaRPr lang="en-US" dirty="0" smtClean="0"/>
+          </a:p>
+          <a:p>
+            <a:pPr marL="0" marR="0" indent="0" algn="l" defTabSz="914400" rtl="0" eaLnBrk="0" fontAlgn="base" latinLnBrk="0" hangingPunct="0">
+              <a:lnSpc>
+                <a:spcPct val="100000"/>
+              </a:lnSpc>
+              <a:spcBef>
+                <a:spcPct val="30000"/>
+              </a:spcBef>
+              <a:spcAft>
+                <a:spcPct val="0"/>
+              </a:spcAft>
+              <a:buClrTx/>
+              <a:buSzTx/>
+              <a:buFontTx/>
+              <a:buNone/>
+              <a:tabLst/>
+              <a:defRPr/>
+            </a:pPr>
+            <a:endParaRPr lang="en-US" baseline="0" dirty="0" smtClean="0"/>
+          </a:p>
+          <a:p>
+            <a:pPr marL="0" marR="0" indent="0" algn="l" defTabSz="914400" rtl="0" eaLnBrk="0" fontAlgn="base" latinLnBrk="0" hangingPunct="0">
+              <a:lnSpc>
+                <a:spcPct val="100000"/>
+              </a:lnSpc>
+              <a:spcBef>
+                <a:spcPct val="30000"/>
+              </a:spcBef>
+              <a:spcAft>
+                <a:spcPct val="0"/>
+              </a:spcAft>
+              <a:buClrTx/>
+              <a:buSzTx/>
+              <a:buFontTx/>
+              <a:buNone/>
+              <a:tabLst/>
+              <a:defRPr/>
+            </a:pPr>
+            <a:r>
+              <a:rPr lang="en-US" baseline="0" dirty="0" smtClean="0"/>
+              <a:t>I’m going to record every single MVC action and the user who is doing the action. I’m going to parse my MVC app to get a list of all the possible actions. I can also tie those actions to a “feature”, which is just an arbitrary string.</a:t>
+            </a:r>
+          </a:p>
+          <a:p>
+            <a:pPr marL="0" marR="0" indent="0" algn="l" defTabSz="914400" rtl="0" eaLnBrk="0" fontAlgn="base" latinLnBrk="0" hangingPunct="0">
+              <a:lnSpc>
+                <a:spcPct val="100000"/>
+              </a:lnSpc>
+              <a:spcBef>
+                <a:spcPct val="30000"/>
+              </a:spcBef>
+              <a:spcAft>
+                <a:spcPct val="0"/>
+              </a:spcAft>
+              <a:buClrTx/>
+              <a:buSzTx/>
+              <a:buFontTx/>
+              <a:buNone/>
+              <a:tabLst/>
+              <a:defRPr/>
+            </a:pPr>
+            <a:endParaRPr lang="en-US" baseline="0" dirty="0" smtClean="0"/>
+          </a:p>
+          <a:p>
+            <a:pPr marL="0" marR="0" indent="0" algn="l" defTabSz="914400" rtl="0" eaLnBrk="0" fontAlgn="base" latinLnBrk="0" hangingPunct="0">
+              <a:lnSpc>
+                <a:spcPct val="100000"/>
+              </a:lnSpc>
+              <a:spcBef>
+                <a:spcPct val="30000"/>
+              </a:spcBef>
+              <a:spcAft>
+                <a:spcPct val="0"/>
+              </a:spcAft>
+              <a:buClrTx/>
+              <a:buSzTx/>
+              <a:buFontTx/>
+              <a:buNone/>
+              <a:tabLst/>
+              <a:defRPr/>
+            </a:pPr>
+            <a:r>
+              <a:rPr lang="en-US" baseline="0" dirty="0" smtClean="0"/>
+              <a:t>An architect can see “hey, no one has used this action in 6 months, why not? Can we drop it?”</a:t>
+            </a:r>
+          </a:p>
+          <a:p>
+            <a:pPr marL="0" marR="0" indent="0" algn="l" defTabSz="914400" rtl="0" eaLnBrk="0" fontAlgn="base" latinLnBrk="0" hangingPunct="0">
+              <a:lnSpc>
+                <a:spcPct val="100000"/>
+              </a:lnSpc>
+              <a:spcBef>
+                <a:spcPct val="30000"/>
+              </a:spcBef>
+              <a:spcAft>
+                <a:spcPct val="0"/>
+              </a:spcAft>
+              <a:buClrTx/>
+              <a:buSzTx/>
+              <a:buFontTx/>
+              <a:buNone/>
+              <a:tabLst/>
+              <a:defRPr/>
+            </a:pPr>
+            <a:r>
+              <a:rPr lang="en-US" baseline="0" dirty="0" smtClean="0"/>
+              <a:t>A BA can see “Hey, this customer is using feature X a lot during a certain month? Why? Is there something missing?”</a:t>
+            </a:r>
+          </a:p>
+          <a:p>
+            <a:pPr marL="0" marR="0" indent="0" algn="l" defTabSz="914400" rtl="0" eaLnBrk="0" fontAlgn="base" latinLnBrk="0" hangingPunct="0">
+              <a:lnSpc>
+                <a:spcPct val="100000"/>
+              </a:lnSpc>
+              <a:spcBef>
+                <a:spcPct val="30000"/>
+              </a:spcBef>
+              <a:spcAft>
+                <a:spcPct val="0"/>
+              </a:spcAft>
+              <a:buClrTx/>
+              <a:buSzTx/>
+              <a:buFontTx/>
+              <a:buNone/>
+              <a:tabLst/>
+              <a:defRPr/>
+            </a:pPr>
+            <a:r>
+              <a:rPr lang="en-US" baseline="0" dirty="0" smtClean="0"/>
+              <a:t>Sales can see “Hey, only customer X is using feature Y, maybe we should sell it as a separate module.”</a:t>
+            </a:r>
+          </a:p>
+          <a:p>
+            <a:pPr marL="0" marR="0" indent="0" algn="l" defTabSz="914400" rtl="0" eaLnBrk="0" fontAlgn="base" latinLnBrk="0" hangingPunct="0">
+              <a:lnSpc>
+                <a:spcPct val="100000"/>
+              </a:lnSpc>
+              <a:spcBef>
+                <a:spcPct val="30000"/>
+              </a:spcBef>
+              <a:spcAft>
+                <a:spcPct val="0"/>
+              </a:spcAft>
+              <a:buClrTx/>
+              <a:buSzTx/>
+              <a:buFontTx/>
+              <a:buNone/>
+              <a:tabLst/>
+              <a:defRPr/>
+            </a:pPr>
+            <a:r>
+              <a:rPr lang="en-US" baseline="0" dirty="0" smtClean="0"/>
+              <a:t>A UX Designer can see “Hey, no one is using feature Z, maybe because it’s not discoverable enough”</a:t>
+            </a:r>
+          </a:p>
+          <a:p>
+            <a:pPr marL="0" marR="0" indent="0" algn="l" defTabSz="914400" rtl="0" eaLnBrk="0" fontAlgn="base" latinLnBrk="0" hangingPunct="0">
+              <a:lnSpc>
+                <a:spcPct val="100000"/>
+              </a:lnSpc>
+              <a:spcBef>
+                <a:spcPct val="30000"/>
+              </a:spcBef>
+              <a:spcAft>
+                <a:spcPct val="0"/>
+              </a:spcAft>
+              <a:buClrTx/>
+              <a:buSzTx/>
+              <a:buFontTx/>
+              <a:buNone/>
+              <a:tabLst/>
+              <a:defRPr/>
+            </a:pPr>
+            <a:endParaRPr lang="en-US" baseline="0" dirty="0" smtClean="0"/>
           </a:p>
         </p:txBody>
       </p:sp>
@@ -1704,7 +1701,7 @@
     </p:spTree>
     <p:extLst>
       <p:ext uri="{BB962C8B-B14F-4D97-AF65-F5344CB8AC3E}">
-        <p14:creationId xmlns:p14="http://schemas.microsoft.com/office/powerpoint/2010/main" val="1850804247"/>
+        <p14:creationId xmlns:p14="http://schemas.microsoft.com/office/powerpoint/2010/main" val="1206815952"/>
       </p:ext>
     </p:extLst>
   </p:cSld>
@@ -1775,6 +1772,31 @@
               <a:tabLst/>
               <a:defRPr/>
             </a:pPr>
+            <a:r>
+              <a:rPr lang="en-US" baseline="0" dirty="0" smtClean="0"/>
+              <a:t>That’s my vision, anyway. Let me show it to you in action, on </a:t>
+            </a:r>
+            <a:r>
+              <a:rPr lang="en-US" baseline="0" dirty="0" err="1" smtClean="0"/>
+              <a:t>LearningBuilder</a:t>
+            </a:r>
+            <a:r>
+              <a:rPr lang="en-US" baseline="0" dirty="0" smtClean="0"/>
+              <a:t>.</a:t>
+            </a:r>
+          </a:p>
+          <a:p>
+            <a:endParaRPr lang="en-US" dirty="0" smtClean="0"/>
+          </a:p>
+          <a:p>
+            <a:r>
+              <a:rPr lang="en-US" dirty="0" smtClean="0"/>
+              <a:t>I</a:t>
+            </a:r>
+            <a:r>
+              <a:rPr lang="en-US" baseline="0" dirty="0" smtClean="0"/>
+              <a:t> said that I was recording every MVC action. If I’m making an extra database trip for every single action, that’s adding a lot of work to the main project; a lot of extra DB traffic. But I can just record the data into a message, push it off to a queue, and have some other process put it into the reporting database. So the main project is barely doing any extra work—all the work is on the queue, the processors, and a separate reporting database.</a:t>
+            </a:r>
             <a:endParaRPr lang="en-US" dirty="0"/>
           </a:p>
         </p:txBody>
@@ -1803,6 +1825,113 @@
                 <a:defRPr/>
               </a:pPr>
               <a:t>17</a:t>
+            </a:fld>
+            <a:endParaRPr lang="en-US"/>
+          </a:p>
+        </p:txBody>
+      </p:sp>
+    </p:spTree>
+    <p:extLst>
+      <p:ext uri="{BB962C8B-B14F-4D97-AF65-F5344CB8AC3E}">
+        <p14:creationId xmlns:p14="http://schemas.microsoft.com/office/powerpoint/2010/main" val="1850804247"/>
+      </p:ext>
+    </p:extLst>
+  </p:cSld>
+  <p:clrMapOvr>
+    <a:masterClrMapping/>
+  </p:clrMapOvr>
+</p:notes>
+</file>
+
+<file path=ppt/notesSlides/notesSlide17.xml><?xml version="1.0" encoding="utf-8"?>
+<p:notes xmlns:a="http://schemas.openxmlformats.org/drawingml/2006/main" xmlns:r="http://schemas.openxmlformats.org/officeDocument/2006/relationships" xmlns:p="http://schemas.openxmlformats.org/presentationml/2006/main">
+  <p:cSld>
+    <p:spTree>
+      <p:nvGrpSpPr>
+        <p:cNvPr id="1" name=""/>
+        <p:cNvGrpSpPr/>
+        <p:nvPr/>
+      </p:nvGrpSpPr>
+      <p:grpSpPr>
+        <a:xfrm>
+          <a:off x="0" y="0"/>
+          <a:ext cx="0" cy="0"/>
+          <a:chOff x="0" y="0"/>
+          <a:chExt cx="0" cy="0"/>
+        </a:xfrm>
+      </p:grpSpPr>
+      <p:sp>
+        <p:nvSpPr>
+          <p:cNvPr id="2" name="Slide Image Placeholder 1"/>
+          <p:cNvSpPr>
+            <a:spLocks noGrp="1" noRot="1" noChangeAspect="1"/>
+          </p:cNvSpPr>
+          <p:nvPr>
+            <p:ph type="sldImg"/>
+          </p:nvPr>
+        </p:nvSpPr>
+        <p:spPr/>
+      </p:sp>
+      <p:sp>
+        <p:nvSpPr>
+          <p:cNvPr id="3" name="Notes Placeholder 2"/>
+          <p:cNvSpPr>
+            <a:spLocks noGrp="1"/>
+          </p:cNvSpPr>
+          <p:nvPr>
+            <p:ph type="body" idx="1"/>
+          </p:nvPr>
+        </p:nvSpPr>
+        <p:spPr/>
+        <p:txBody>
+          <a:bodyPr/>
+          <a:lstStyle/>
+          <a:p>
+            <a:pPr marL="0" marR="0" indent="0" algn="l" defTabSz="914400" rtl="0" eaLnBrk="0" fontAlgn="base" latinLnBrk="0" hangingPunct="0">
+              <a:lnSpc>
+                <a:spcPct val="100000"/>
+              </a:lnSpc>
+              <a:spcBef>
+                <a:spcPct val="30000"/>
+              </a:spcBef>
+              <a:spcAft>
+                <a:spcPct val="0"/>
+              </a:spcAft>
+              <a:buClrTx/>
+              <a:buSzTx/>
+              <a:buFontTx/>
+              <a:buNone/>
+              <a:tabLst/>
+              <a:defRPr/>
+            </a:pPr>
+            <a:endParaRPr lang="en-US" dirty="0"/>
+          </a:p>
+        </p:txBody>
+      </p:sp>
+      <p:sp>
+        <p:nvSpPr>
+          <p:cNvPr id="4" name="Slide Number Placeholder 3"/>
+          <p:cNvSpPr>
+            <a:spLocks noGrp="1"/>
+          </p:cNvSpPr>
+          <p:nvPr>
+            <p:ph type="sldNum" sz="quarter" idx="10"/>
+          </p:nvPr>
+        </p:nvSpPr>
+        <p:spPr/>
+        <p:txBody>
+          <a:bodyPr/>
+          <a:lstStyle/>
+          <a:p>
+            <a:pPr>
+              <a:defRPr/>
+            </a:pPr>
+            <a:fld id="{8AF380C8-B354-427F-99E5-332FEB535C73}" type="slidenum">
+              <a:rPr lang="en-US" smtClean="0"/>
+              <a:pPr>
+                <a:defRPr/>
+              </a:pPr>
+              <a:t>18</a:t>
             </a:fld>
             <a:endParaRPr lang="en-US"/>
           </a:p>
@@ -2065,30 +2194,9 @@
           <a:p>
             <a:r>
               <a:rPr lang="en-US" dirty="0" smtClean="0"/>
-              <a:t>Let’s assume that we have a “main program”,</a:t>
-            </a:r>
-            <a:r>
-              <a:rPr lang="en-US" baseline="0" dirty="0" smtClean="0"/>
-              <a:t> let’s say a web app. It does all kinds of stuff: renders a UI, does business logic, makes DB queries, etc. Picture Amazon.com for instance.</a:t>
-            </a:r>
-          </a:p>
-          <a:p>
-            <a:endParaRPr lang="en-US" baseline="0" dirty="0" smtClean="0"/>
-          </a:p>
-          <a:p>
-            <a:r>
-              <a:rPr lang="en-US" baseline="0" dirty="0" smtClean="0"/>
-              <a:t>It also has some tasks that are difficult, slow, or maybe there’s a large quantity of them. These tasks are on the main progress process, which means they affect the user experience. But those tasks don’t necessary need to happen there. They could be run on some other process, or some other machine. When you place an order, Amazon has to do a lot of work: notifications to sellers, notification to warehouses, updating databases, retrieving funds etc. These don’t all need to happen immediately. Amazon can just tell you “okay we got your order” and ideally move that work off of the web server to some other process on some other machine.</a:t>
-            </a:r>
-          </a:p>
-          <a:p>
-            <a:endParaRPr lang="en-US" baseline="0" dirty="0" smtClean="0"/>
-          </a:p>
-          <a:p>
-            <a:r>
-              <a:rPr lang="en-US" baseline="0" dirty="0" smtClean="0"/>
-              <a:t>But we can’t  just push it directly to the machine, it might already be busy. So we put the relevant information into a temporary holding area. This is the queue.</a:t>
-            </a:r>
+              <a:t>Here’s what I’m covering today</a:t>
+            </a:r>
+            <a:endParaRPr lang="en-US" dirty="0"/>
           </a:p>
         </p:txBody>
       </p:sp>
@@ -2124,7 +2232,7 @@
     </p:spTree>
     <p:extLst>
       <p:ext uri="{BB962C8B-B14F-4D97-AF65-F5344CB8AC3E}">
-        <p14:creationId xmlns:p14="http://schemas.microsoft.com/office/powerpoint/2010/main" val="1568745081"/>
+        <p14:creationId xmlns:p14="http://schemas.microsoft.com/office/powerpoint/2010/main" val="2176565980"/>
       </p:ext>
     </p:extLst>
   </p:cSld>
@@ -2180,21 +2288,30 @@
           <a:p>
             <a:r>
               <a:rPr lang="en-US" dirty="0" smtClean="0"/>
-              <a:t>I’m going to show you a Hello World using</a:t>
+              <a:t>Let’s assume that we have a “main program”,</a:t>
             </a:r>
             <a:r>
               <a:rPr lang="en-US" baseline="0" dirty="0" smtClean="0"/>
-              <a:t> </a:t>
-            </a:r>
-            <a:r>
-              <a:rPr lang="en-US" baseline="0" dirty="0" err="1" smtClean="0"/>
-              <a:t>RabbitMQ</a:t>
-            </a:r>
+              <a:t> let’s say a web app. It does all kinds of stuff: renders a UI, does business logic, makes DB queries, etc. Picture Amazon.com for instance.</a:t>
+            </a:r>
+          </a:p>
+          <a:p>
+            <a:endParaRPr lang="en-US" baseline="0" dirty="0" smtClean="0"/>
+          </a:p>
+          <a:p>
             <a:r>
               <a:rPr lang="en-US" baseline="0" dirty="0" smtClean="0"/>
-              <a:t> on .NET</a:t>
-            </a:r>
-            <a:endParaRPr lang="en-US" dirty="0"/>
+              <a:t>It also has some tasks that are difficult, slow, or maybe there’s a large quantity of them. These tasks are on the main progress process, which means they affect the user experience. But those tasks don’t necessary need to happen there. They could be run on some other process, or some other machine. When you place an order, Amazon has to do a lot of work: notifications to sellers, notification to warehouses, updating databases, retrieving funds etc. These don’t all need to happen immediately. Amazon can just tell you “okay we got your order” and ideally move that work off of the web server to some other process on some other machine.</a:t>
+            </a:r>
+          </a:p>
+          <a:p>
+            <a:endParaRPr lang="en-US" baseline="0" dirty="0" smtClean="0"/>
+          </a:p>
+          <a:p>
+            <a:r>
+              <a:rPr lang="en-US" baseline="0" dirty="0" smtClean="0"/>
+              <a:t>But we can’t  just push it directly to the machine, it might already be busy. So we put the relevant information into a temporary holding area. This is the queue.</a:t>
+            </a:r>
           </a:p>
         </p:txBody>
       </p:sp>
@@ -2230,7 +2347,7 @@
     </p:spTree>
     <p:extLst>
       <p:ext uri="{BB962C8B-B14F-4D97-AF65-F5344CB8AC3E}">
-        <p14:creationId xmlns:p14="http://schemas.microsoft.com/office/powerpoint/2010/main" val="1601098168"/>
+        <p14:creationId xmlns:p14="http://schemas.microsoft.com/office/powerpoint/2010/main" val="1568745081"/>
       </p:ext>
     </p:extLst>
   </p:cSld>
@@ -2286,54 +2403,19 @@
           <a:p>
             <a:r>
               <a:rPr lang="en-US" dirty="0" smtClean="0"/>
-              <a:t>We get</a:t>
+              <a:t>I’m going to show you a Hello World using</a:t>
             </a:r>
             <a:r>
               <a:rPr lang="en-US" baseline="0" dirty="0" smtClean="0"/>
-              <a:t> a lot of power, but we may have to do a lot of work.</a:t>
-            </a:r>
-          </a:p>
-          <a:p>
+              <a:t> </a:t>
+            </a:r>
+            <a:r>
+              <a:rPr lang="en-US" baseline="0" dirty="0" err="1" smtClean="0"/>
+              <a:t>RabbitMQ</a:t>
+            </a:r>
             <a:r>
               <a:rPr lang="en-US" baseline="0" dirty="0" smtClean="0"/>
-              <a:t>Instead, we could use </a:t>
-            </a:r>
-            <a:r>
-              <a:rPr lang="en-US" baseline="0" dirty="0" err="1" smtClean="0"/>
-              <a:t>EasyNetQ</a:t>
-            </a:r>
-            <a:r>
-              <a:rPr lang="en-US" baseline="0" dirty="0" smtClean="0"/>
-              <a:t>.</a:t>
-            </a:r>
-          </a:p>
-          <a:p>
-            <a:endParaRPr lang="en-US" baseline="0" dirty="0" smtClean="0"/>
-          </a:p>
-          <a:p>
-            <a:r>
-              <a:rPr lang="en-US" baseline="0" dirty="0" smtClean="0"/>
-              <a:t>This is a .NET specific library, so both the producer(s) and consumer(s) need to be in .NET to use this.</a:t>
-            </a:r>
-          </a:p>
-          <a:p>
-            <a:r>
-              <a:rPr lang="en-US" baseline="0" dirty="0" smtClean="0"/>
-              <a:t>It’s an opinionated library, so we lose some control of </a:t>
-            </a:r>
-            <a:r>
-              <a:rPr lang="en-US" baseline="0" dirty="0" err="1" smtClean="0"/>
-              <a:t>RabbitMq</a:t>
-            </a:r>
-            <a:r>
-              <a:rPr lang="en-US" baseline="0" dirty="0" smtClean="0"/>
-              <a:t>.</a:t>
-            </a:r>
-          </a:p>
-          <a:p>
-            <a:r>
-              <a:rPr lang="en-US" baseline="0" dirty="0" smtClean="0"/>
-              <a:t>We lose some flexibility, but we gain some powerful patterns of producing and consuming.</a:t>
+              <a:t> on .NET</a:t>
             </a:r>
             <a:endParaRPr lang="en-US" dirty="0"/>
           </a:p>
@@ -2371,7 +2453,7 @@
     </p:spTree>
     <p:extLst>
       <p:ext uri="{BB962C8B-B14F-4D97-AF65-F5344CB8AC3E}">
-        <p14:creationId xmlns:p14="http://schemas.microsoft.com/office/powerpoint/2010/main" val="3970463987"/>
+        <p14:creationId xmlns:p14="http://schemas.microsoft.com/office/powerpoint/2010/main" val="1601098168"/>
       </p:ext>
     </p:extLst>
   </p:cSld>
@@ -2427,11 +2509,17 @@
           <a:p>
             <a:r>
               <a:rPr lang="en-US" dirty="0" smtClean="0"/>
-              <a:t>Messages are plain old objects. You</a:t>
+              <a:t>We get</a:t>
             </a:r>
             <a:r>
               <a:rPr lang="en-US" baseline="0" dirty="0" smtClean="0"/>
-              <a:t> give an object to </a:t>
+              <a:t> a lot of power, but we may have to do a lot of work.</a:t>
+            </a:r>
+          </a:p>
+          <a:p>
+            <a:r>
+              <a:rPr lang="en-US" baseline="0" dirty="0" smtClean="0"/>
+              <a:t>Instead, we could use </a:t>
             </a:r>
             <a:r>
               <a:rPr lang="en-US" baseline="0" dirty="0" err="1" smtClean="0"/>
@@ -2439,17 +2527,38 @@
             </a:r>
             <a:r>
               <a:rPr lang="en-US" baseline="0" dirty="0" smtClean="0"/>
-              <a:t>, it creates the channels, routing, queues, serializes the messages.</a:t>
-            </a:r>
+              <a:t>.</a:t>
+            </a:r>
+          </a:p>
+          <a:p>
+            <a:endParaRPr lang="en-US" baseline="0" dirty="0" smtClean="0"/>
           </a:p>
           <a:p>
             <a:r>
               <a:rPr lang="en-US" baseline="0" dirty="0" smtClean="0"/>
-              <a:t>You pull a message off the queue as an object, it finds the right routing, queue, and does the deserialization.</a:t>
-            </a:r>
-          </a:p>
-          <a:p>
-            <a:endParaRPr lang="en-US" baseline="0" dirty="0" smtClean="0"/>
+              <a:t>This is a .NET specific library, so both the producer(s) and consumer(s) need to be in .NET to use this.</a:t>
+            </a:r>
+          </a:p>
+          <a:p>
+            <a:r>
+              <a:rPr lang="en-US" baseline="0" dirty="0" smtClean="0"/>
+              <a:t>It’s an opinionated library, so we lose some control of </a:t>
+            </a:r>
+            <a:r>
+              <a:rPr lang="en-US" baseline="0" dirty="0" err="1" smtClean="0"/>
+              <a:t>RabbitMq</a:t>
+            </a:r>
+            <a:r>
+              <a:rPr lang="en-US" baseline="0" dirty="0" smtClean="0"/>
+              <a:t>.</a:t>
+            </a:r>
+          </a:p>
+          <a:p>
+            <a:r>
+              <a:rPr lang="en-US" baseline="0" dirty="0" smtClean="0"/>
+              <a:t>We lose some flexibility, but we gain some powerful patterns of producing and consuming.</a:t>
+            </a:r>
+            <a:endParaRPr lang="en-US" dirty="0"/>
           </a:p>
         </p:txBody>
       </p:sp>
@@ -2485,7 +2594,7 @@
     </p:spTree>
     <p:extLst>
       <p:ext uri="{BB962C8B-B14F-4D97-AF65-F5344CB8AC3E}">
-        <p14:creationId xmlns:p14="http://schemas.microsoft.com/office/powerpoint/2010/main" val="1800400832"/>
+        <p14:creationId xmlns:p14="http://schemas.microsoft.com/office/powerpoint/2010/main" val="3970463987"/>
       </p:ext>
     </p:extLst>
   </p:cSld>
@@ -2541,21 +2650,29 @@
           <a:p>
             <a:r>
               <a:rPr lang="en-US" dirty="0" smtClean="0"/>
-              <a:t>Here are three patterns that </a:t>
-            </a:r>
-            <a:r>
-              <a:rPr lang="en-US" dirty="0" err="1" smtClean="0"/>
+              <a:t>Messages are plain old objects. You</a:t>
+            </a:r>
+            <a:r>
+              <a:rPr lang="en-US" baseline="0" dirty="0" smtClean="0"/>
+              <a:t> give an object to </a:t>
+            </a:r>
+            <a:r>
+              <a:rPr lang="en-US" baseline="0" dirty="0" err="1" smtClean="0"/>
               <a:t>EasyNetQ</a:t>
             </a:r>
             <a:r>
-              <a:rPr lang="en-US" dirty="0" smtClean="0"/>
-              <a:t> handles</a:t>
-            </a:r>
-            <a:r>
               <a:rPr lang="en-US" baseline="0" dirty="0" smtClean="0"/>
-              <a:t> for us.</a:t>
-            </a:r>
-            <a:endParaRPr lang="en-US" dirty="0"/>
+              <a:t>, it creates the channels, routing, queues, serializes the messages.</a:t>
+            </a:r>
+          </a:p>
+          <a:p>
+            <a:r>
+              <a:rPr lang="en-US" baseline="0" dirty="0" smtClean="0"/>
+              <a:t>You pull a message off the queue as an object, it finds the right routing, queue, and does the deserialization.</a:t>
+            </a:r>
+          </a:p>
+          <a:p>
+            <a:endParaRPr lang="en-US" baseline="0" dirty="0" smtClean="0"/>
           </a:p>
         </p:txBody>
       </p:sp>
@@ -2591,7 +2708,7 @@
     </p:spTree>
     <p:extLst>
       <p:ext uri="{BB962C8B-B14F-4D97-AF65-F5344CB8AC3E}">
-        <p14:creationId xmlns:p14="http://schemas.microsoft.com/office/powerpoint/2010/main" val="329760597"/>
+        <p14:creationId xmlns:p14="http://schemas.microsoft.com/office/powerpoint/2010/main" val="1800400832"/>
       </p:ext>
     </p:extLst>
   </p:cSld>
@@ -2647,47 +2764,21 @@
           <a:p>
             <a:r>
               <a:rPr lang="en-US" dirty="0" smtClean="0"/>
-              <a:t>You put a message A on the queue</a:t>
+              <a:t>Here are three patterns that </a:t>
+            </a:r>
+            <a:r>
+              <a:rPr lang="en-US" dirty="0" err="1" smtClean="0"/>
+              <a:t>EasyNetQ</a:t>
+            </a:r>
+            <a:r>
+              <a:rPr lang="en-US" dirty="0" smtClean="0"/>
+              <a:t> handles</a:t>
             </a:r>
             <a:r>
               <a:rPr lang="en-US" baseline="0" dirty="0" smtClean="0"/>
-              <a:t> (send)</a:t>
-            </a:r>
-          </a:p>
-          <a:p>
-            <a:r>
-              <a:rPr lang="en-US" baseline="0" dirty="0" smtClean="0"/>
-              <a:t>You take a message A off the queue (receive)</a:t>
-            </a:r>
-          </a:p>
-          <a:p>
-            <a:r>
-              <a:rPr lang="en-US" baseline="0" dirty="0" smtClean="0"/>
-              <a:t>The queue is durable, so it will persist in the queue after it is sent.</a:t>
-            </a:r>
-          </a:p>
-          <a:p>
-            <a:endParaRPr lang="en-US" dirty="0" smtClean="0"/>
-          </a:p>
-          <a:p>
-            <a:r>
-              <a:rPr lang="en-US" dirty="0" smtClean="0"/>
-              <a:t>With this pattern, you can put</a:t>
-            </a:r>
-            <a:r>
-              <a:rPr lang="en-US" baseline="0" dirty="0" smtClean="0"/>
-              <a:t> any number of message types on the same queue. Receivers who subscribe to the queue will process the message types separately.</a:t>
-            </a:r>
-          </a:p>
-          <a:p>
-            <a:endParaRPr lang="en-US" baseline="0" dirty="0" smtClean="0"/>
-          </a:p>
-          <a:p>
-            <a:r>
-              <a:rPr lang="en-US" baseline="0" dirty="0" smtClean="0"/>
-              <a:t>You don’t have to put everything on the same queue, but you can.</a:t>
-            </a:r>
-            <a:endParaRPr lang="en-US" dirty="0" smtClean="0"/>
+              <a:t> for us.</a:t>
+            </a:r>
+            <a:endParaRPr lang="en-US" dirty="0"/>
           </a:p>
         </p:txBody>
       </p:sp>
@@ -2723,7 +2814,7 @@
     </p:spTree>
     <p:extLst>
       <p:ext uri="{BB962C8B-B14F-4D97-AF65-F5344CB8AC3E}">
-        <p14:creationId xmlns:p14="http://schemas.microsoft.com/office/powerpoint/2010/main" val="1174759699"/>
+        <p14:creationId xmlns:p14="http://schemas.microsoft.com/office/powerpoint/2010/main" val="329760597"/>
       </p:ext>
     </p:extLst>
   </p:cSld>
@@ -3299,7 +3390,7 @@
               <a:pPr>
                 <a:defRPr/>
               </a:pPr>
-              <a:t>12/23/2015</a:t>
+              <a:t>12/30/2015</a:t>
             </a:fld>
             <a:endParaRPr lang="en-US"/>
           </a:p>
@@ -3901,7 +3992,7 @@
               <a:pPr>
                 <a:defRPr/>
               </a:pPr>
-              <a:t>12/23/2015</a:t>
+              <a:t>12/30/2015</a:t>
             </a:fld>
             <a:endParaRPr lang="en-US"/>
           </a:p>
@@ -4095,7 +4186,7 @@
               <a:pPr>
                 <a:defRPr/>
               </a:pPr>
-              <a:t>12/23/2015</a:t>
+              <a:t>12/30/2015</a:t>
             </a:fld>
             <a:endParaRPr lang="en-US"/>
           </a:p>
@@ -4383,7 +4474,7 @@
               <a:pPr>
                 <a:defRPr/>
               </a:pPr>
-              <a:t>12/23/2015</a:t>
+              <a:t>12/30/2015</a:t>
             </a:fld>
             <a:endParaRPr lang="en-US"/>
           </a:p>
@@ -4662,7 +4753,7 @@
           <a:p>
             <a:fld id="{5B5F5B05-54A5-40D6-8C87-F6F8096DBE9F}" type="datetimeFigureOut">
               <a:rPr lang="en-US" smtClean="0"/>
-              <a:t>12/23/2015</a:t>
+              <a:t>12/30/2015</a:t>
             </a:fld>
             <a:endParaRPr lang="en-US"/>
           </a:p>
@@ -4814,7 +4905,7 @@
               <a:pPr>
                 <a:defRPr/>
               </a:pPr>
-              <a:t>12/23/2015</a:t>
+              <a:t>12/30/2015</a:t>
             </a:fld>
             <a:endParaRPr lang="en-US" dirty="0"/>
           </a:p>
@@ -5638,6 +5729,152 @@
       </p:grpSpPr>
       <p:sp>
         <p:nvSpPr>
+          <p:cNvPr id="5" name="TextBox 4"/>
+          <p:cNvSpPr txBox="1"/>
+          <p:nvPr/>
+        </p:nvSpPr>
+        <p:spPr>
+          <a:xfrm>
+            <a:off x="304800" y="838200"/>
+            <a:ext cx="8653301" cy="4401205"/>
+          </a:xfrm>
+          <a:prstGeom prst="rect">
+            <a:avLst/>
+          </a:prstGeom>
+          <a:noFill/>
+        </p:spPr>
+        <p:txBody>
+          <a:bodyPr wrap="square" rtlCol="0">
+            <a:spAutoFit/>
+          </a:bodyPr>
+          <a:lstStyle/>
+          <a:p>
+            <a:pPr algn="ctr"/>
+            <a:r>
+              <a:rPr lang="en-US" sz="4000" dirty="0" err="1" smtClean="0">
+                <a:solidFill>
+                  <a:schemeClr val="bg1"/>
+                </a:solidFill>
+              </a:rPr>
+              <a:t>EasyNetQ</a:t>
+            </a:r>
+            <a:r>
+              <a:rPr lang="en-US" sz="4000" dirty="0" smtClean="0">
+                <a:solidFill>
+                  <a:schemeClr val="bg1"/>
+                </a:solidFill>
+              </a:rPr>
+              <a:t> Patterns:</a:t>
+            </a:r>
+          </a:p>
+          <a:p>
+            <a:pPr algn="ctr"/>
+            <a:endParaRPr lang="en-US" sz="4000" dirty="0" smtClean="0">
+              <a:solidFill>
+                <a:schemeClr val="bg1"/>
+              </a:solidFill>
+            </a:endParaRPr>
+          </a:p>
+          <a:p>
+            <a:pPr marL="742950" indent="-742950">
+              <a:buAutoNum type="arabicPeriod"/>
+            </a:pPr>
+            <a:r>
+              <a:rPr lang="en-US" sz="4000" dirty="0" smtClean="0">
+                <a:solidFill>
+                  <a:schemeClr val="bg1"/>
+                </a:solidFill>
+              </a:rPr>
+              <a:t>Send &amp; Receive</a:t>
+            </a:r>
+          </a:p>
+          <a:p>
+            <a:pPr marL="742950" indent="-742950">
+              <a:buAutoNum type="arabicPeriod"/>
+            </a:pPr>
+            <a:endParaRPr lang="en-US" sz="4000" dirty="0" smtClean="0">
+              <a:solidFill>
+                <a:schemeClr val="bg1"/>
+              </a:solidFill>
+            </a:endParaRPr>
+          </a:p>
+          <a:p>
+            <a:pPr marL="742950" indent="-742950">
+              <a:buAutoNum type="arabicPeriod"/>
+            </a:pPr>
+            <a:r>
+              <a:rPr lang="en-US" sz="4000" dirty="0" smtClean="0">
+                <a:solidFill>
+                  <a:schemeClr val="bg1"/>
+                </a:solidFill>
+              </a:rPr>
+              <a:t>Publish &amp; Subscribe</a:t>
+            </a:r>
+          </a:p>
+          <a:p>
+            <a:pPr marL="742950" indent="-742950">
+              <a:buAutoNum type="arabicPeriod"/>
+            </a:pPr>
+            <a:endParaRPr lang="en-US" sz="4000" dirty="0" smtClean="0">
+              <a:solidFill>
+                <a:schemeClr val="bg1"/>
+              </a:solidFill>
+            </a:endParaRPr>
+          </a:p>
+          <a:p>
+            <a:pPr marL="742950" indent="-742950">
+              <a:buAutoNum type="arabicPeriod"/>
+            </a:pPr>
+            <a:r>
+              <a:rPr lang="en-US" sz="4000" dirty="0" smtClean="0">
+                <a:solidFill>
+                  <a:schemeClr val="bg1"/>
+                </a:solidFill>
+              </a:rPr>
+              <a:t>Request &amp; Response</a:t>
+            </a:r>
+          </a:p>
+        </p:txBody>
+      </p:sp>
+    </p:spTree>
+    <p:extLst>
+      <p:ext uri="{BB962C8B-B14F-4D97-AF65-F5344CB8AC3E}">
+        <p14:creationId xmlns:p14="http://schemas.microsoft.com/office/powerpoint/2010/main" val="2609970301"/>
+      </p:ext>
+    </p:extLst>
+  </p:cSld>
+  <p:clrMapOvr>
+    <a:masterClrMapping/>
+  </p:clrMapOvr>
+  <p:timing>
+    <p:tnLst>
+      <p:par>
+        <p:cTn id="1" dur="indefinite" restart="never" nodeType="tmRoot"/>
+      </p:par>
+    </p:tnLst>
+  </p:timing>
+</p:sld>
+</file>
+
+<file path=ppt/slides/slide11.xml><?xml version="1.0" encoding="utf-8"?>
+<p:sld xmlns:a="http://schemas.openxmlformats.org/drawingml/2006/main" xmlns:r="http://schemas.openxmlformats.org/officeDocument/2006/relationships" xmlns:p="http://schemas.openxmlformats.org/presentationml/2006/main">
+  <p:cSld>
+    <p:spTree>
+      <p:nvGrpSpPr>
+        <p:cNvPr id="1" name=""/>
+        <p:cNvGrpSpPr/>
+        <p:nvPr/>
+      </p:nvGrpSpPr>
+      <p:grpSpPr>
+        <a:xfrm>
+          <a:off x="0" y="0"/>
+          <a:ext cx="0" cy="0"/>
+          <a:chOff x="0" y="0"/>
+          <a:chExt cx="0" cy="0"/>
+        </a:xfrm>
+      </p:grpSpPr>
+      <p:sp>
+        <p:nvSpPr>
           <p:cNvPr id="4" name="Slide Number Placeholder 3"/>
           <p:cNvSpPr>
             <a:spLocks noGrp="1"/>
@@ -5659,7 +5896,7 @@
               <a:pPr>
                 <a:defRPr/>
               </a:pPr>
-              <a:t>10</a:t>
+              <a:t>11</a:t>
             </a:fld>
             <a:endParaRPr lang="en-US" dirty="0"/>
           </a:p>
@@ -6777,7 +7014,7 @@
 </p:sld>
 </file>
 
-<file path=ppt/slides/slide11.xml><?xml version="1.0" encoding="utf-8"?>
+<file path=ppt/slides/slide12.xml><?xml version="1.0" encoding="utf-8"?>
 <p:sld xmlns:a="http://schemas.openxmlformats.org/drawingml/2006/main" xmlns:r="http://schemas.openxmlformats.org/officeDocument/2006/relationships" xmlns:p="http://schemas.openxmlformats.org/presentationml/2006/main">
   <p:cSld>
     <p:spTree>
@@ -8480,7 +8717,7 @@
 </p:sld>
 </file>
 
-<file path=ppt/slides/slide12.xml><?xml version="1.0" encoding="utf-8"?>
+<file path=ppt/slides/slide13.xml><?xml version="1.0" encoding="utf-8"?>
 <p:sld xmlns:a="http://schemas.openxmlformats.org/drawingml/2006/main" xmlns:r="http://schemas.openxmlformats.org/officeDocument/2006/relationships" xmlns:p="http://schemas.openxmlformats.org/presentationml/2006/main">
   <p:cSld>
     <p:spTree>
@@ -9690,154 +9927,6 @@
 </p:sld>
 </file>
 
-<file path=ppt/slides/slide13.xml><?xml version="1.0" encoding="utf-8"?>
-<p:sld xmlns:a="http://schemas.openxmlformats.org/drawingml/2006/main" xmlns:r="http://schemas.openxmlformats.org/officeDocument/2006/relationships" xmlns:p="http://schemas.openxmlformats.org/presentationml/2006/main">
-  <p:cSld>
-    <p:spTree>
-      <p:nvGrpSpPr>
-        <p:cNvPr id="1" name=""/>
-        <p:cNvGrpSpPr/>
-        <p:nvPr/>
-      </p:nvGrpSpPr>
-      <p:grpSpPr>
-        <a:xfrm>
-          <a:off x="0" y="0"/>
-          <a:ext cx="0" cy="0"/>
-          <a:chOff x="0" y="0"/>
-          <a:chExt cx="0" cy="0"/>
-        </a:xfrm>
-      </p:grpSpPr>
-      <p:sp>
-        <p:nvSpPr>
-          <p:cNvPr id="5" name="TextBox 4"/>
-          <p:cNvSpPr txBox="1"/>
-          <p:nvPr/>
-        </p:nvSpPr>
-        <p:spPr>
-          <a:xfrm>
-            <a:off x="304800" y="838200"/>
-            <a:ext cx="8653301" cy="4401205"/>
-          </a:xfrm>
-          <a:prstGeom prst="rect">
-            <a:avLst/>
-          </a:prstGeom>
-          <a:noFill/>
-        </p:spPr>
-        <p:txBody>
-          <a:bodyPr wrap="square" rtlCol="0">
-            <a:spAutoFit/>
-          </a:bodyPr>
-          <a:lstStyle/>
-          <a:p>
-            <a:pPr algn="ctr"/>
-            <a:r>
-              <a:rPr lang="en-US" sz="4000" dirty="0" err="1" smtClean="0">
-                <a:solidFill>
-                  <a:schemeClr val="bg1"/>
-                </a:solidFill>
-              </a:rPr>
-              <a:t>EasyNetQ</a:t>
-            </a:r>
-            <a:r>
-              <a:rPr lang="en-US" sz="4000" dirty="0" smtClean="0">
-                <a:solidFill>
-                  <a:schemeClr val="bg1"/>
-                </a:solidFill>
-              </a:rPr>
-              <a:t> Code:</a:t>
-            </a:r>
-          </a:p>
-          <a:p>
-            <a:pPr algn="ctr"/>
-            <a:endParaRPr lang="en-US" sz="4000" dirty="0" smtClean="0">
-              <a:solidFill>
-                <a:schemeClr val="bg1"/>
-              </a:solidFill>
-            </a:endParaRPr>
-          </a:p>
-          <a:p>
-            <a:pPr marL="742950" indent="-742950">
-              <a:buAutoNum type="arabicPeriod"/>
-            </a:pPr>
-            <a:r>
-              <a:rPr lang="en-US" sz="4000" dirty="0" smtClean="0">
-                <a:solidFill>
-                  <a:schemeClr val="bg1"/>
-                </a:solidFill>
-              </a:rPr>
-              <a:t>Send &amp; Receive</a:t>
-            </a:r>
-          </a:p>
-          <a:p>
-            <a:pPr marL="742950" indent="-742950">
-              <a:buAutoNum type="arabicPeriod"/>
-            </a:pPr>
-            <a:endParaRPr lang="en-US" sz="4000" dirty="0" smtClean="0">
-              <a:solidFill>
-                <a:schemeClr val="bg1"/>
-              </a:solidFill>
-            </a:endParaRPr>
-          </a:p>
-          <a:p>
-            <a:pPr marL="742950" indent="-742950">
-              <a:buAutoNum type="arabicPeriod"/>
-            </a:pPr>
-            <a:r>
-              <a:rPr lang="en-US" sz="4000" dirty="0" smtClean="0">
-                <a:solidFill>
-                  <a:schemeClr val="bg1"/>
-                </a:solidFill>
-              </a:rPr>
-              <a:t>Publish &amp; Subscribe</a:t>
-            </a:r>
-          </a:p>
-          <a:p>
-            <a:pPr marL="742950" indent="-742950">
-              <a:buAutoNum type="arabicPeriod"/>
-            </a:pPr>
-            <a:endParaRPr lang="en-US" sz="4000" dirty="0" smtClean="0">
-              <a:solidFill>
-                <a:schemeClr val="bg1"/>
-              </a:solidFill>
-            </a:endParaRPr>
-          </a:p>
-          <a:p>
-            <a:pPr marL="742950" indent="-742950">
-              <a:buAutoNum type="arabicPeriod"/>
-            </a:pPr>
-            <a:r>
-              <a:rPr lang="en-US" sz="4000" dirty="0" smtClean="0">
-                <a:solidFill>
-                  <a:schemeClr val="tx1">
-                    <a:lumMod val="75000"/>
-                  </a:schemeClr>
-                </a:solidFill>
-              </a:rPr>
-              <a:t>Request &amp; Response</a:t>
-            </a:r>
-          </a:p>
-        </p:txBody>
-      </p:sp>
-    </p:spTree>
-    <p:extLst>
-      <p:ext uri="{BB962C8B-B14F-4D97-AF65-F5344CB8AC3E}">
-        <p14:creationId xmlns:p14="http://schemas.microsoft.com/office/powerpoint/2010/main" val="3384064574"/>
-      </p:ext>
-    </p:extLst>
-  </p:cSld>
-  <p:clrMapOvr>
-    <a:masterClrMapping/>
-  </p:clrMapOvr>
-  <p:timing>
-    <p:tnLst>
-      <p:par>
-        <p:cTn id="1" dur="indefinite" restart="never" nodeType="tmRoot"/>
-      </p:par>
-    </p:tnLst>
-  </p:timing>
-</p:sld>
-</file>
-
 <file path=ppt/slides/slide14.xml><?xml version="1.0" encoding="utf-8"?>
 <p:sld xmlns:a="http://schemas.openxmlformats.org/drawingml/2006/main" xmlns:r="http://schemas.openxmlformats.org/officeDocument/2006/relationships" xmlns:p="http://schemas.openxmlformats.org/presentationml/2006/main">
   <p:cSld>
@@ -9863,8 +9952,8 @@
         </p:nvSpPr>
         <p:spPr>
           <a:xfrm>
-            <a:off x="3132280" y="838200"/>
-            <a:ext cx="2521844" cy="707886"/>
+            <a:off x="304800" y="838200"/>
+            <a:ext cx="8653301" cy="4401205"/>
           </a:xfrm>
           <a:prstGeom prst="rect">
             <a:avLst/>
@@ -9872,7 +9961,7 @@
           <a:noFill/>
         </p:spPr>
         <p:txBody>
-          <a:bodyPr wrap="none" rtlCol="0">
+          <a:bodyPr wrap="square" rtlCol="0">
             <a:spAutoFit/>
           </a:bodyPr>
           <a:lstStyle/>
@@ -9884,112 +9973,92 @@
                   <a:schemeClr val="bg1"/>
                 </a:solidFill>
               </a:rPr>
-              <a:t>EmpiriCall</a:t>
-            </a:r>
-            <a:endParaRPr lang="en-US" sz="4000" dirty="0">
+              <a:t>EasyNetQ</a:t>
+            </a:r>
+            <a:r>
+              <a:rPr lang="en-US" sz="4000" dirty="0" smtClean="0">
+                <a:solidFill>
+                  <a:schemeClr val="bg1"/>
+                </a:solidFill>
+              </a:rPr>
+              <a:t> Code:</a:t>
+            </a:r>
+          </a:p>
+          <a:p>
+            <a:pPr algn="ctr"/>
+            <a:endParaRPr lang="en-US" sz="4000" dirty="0" smtClean="0">
               <a:solidFill>
                 <a:schemeClr val="bg1"/>
               </a:solidFill>
             </a:endParaRPr>
           </a:p>
-        </p:txBody>
-      </p:sp>
-      <p:sp>
-        <p:nvSpPr>
-          <p:cNvPr id="2" name="TextBox 1"/>
-          <p:cNvSpPr txBox="1"/>
-          <p:nvPr/>
-        </p:nvSpPr>
-        <p:spPr>
-          <a:xfrm>
-            <a:off x="381000" y="2438400"/>
-            <a:ext cx="8571577" cy="2554545"/>
-          </a:xfrm>
-          <a:prstGeom prst="rect">
-            <a:avLst/>
-          </a:prstGeom>
-          <a:noFill/>
-        </p:spPr>
-        <p:txBody>
-          <a:bodyPr wrap="none" rtlCol="0">
-            <a:spAutoFit/>
-          </a:bodyPr>
-          <a:lstStyle/>
-          <a:p>
-            <a:pPr marL="457200" indent="-457200">
-              <a:buFont typeface="+mj-lt"/>
+          <a:p>
+            <a:pPr marL="742950" indent="-742950">
               <a:buAutoNum type="arabicPeriod"/>
             </a:pPr>
             <a:r>
-              <a:rPr lang="en-US" sz="3200" dirty="0" smtClean="0">
+              <a:rPr lang="en-US" sz="4000" dirty="0" smtClean="0">
                 <a:solidFill>
                   <a:schemeClr val="bg1"/>
                 </a:solidFill>
               </a:rPr>
-              <a:t>Which features are/are not being used?</a:t>
-            </a:r>
-          </a:p>
-          <a:p>
-            <a:pPr marL="457200" indent="-457200">
-              <a:buFont typeface="+mj-lt"/>
+              <a:t>Send &amp; Receive</a:t>
+            </a:r>
+          </a:p>
+          <a:p>
+            <a:pPr marL="742950" indent="-742950">
               <a:buAutoNum type="arabicPeriod"/>
             </a:pPr>
-            <a:endParaRPr lang="en-US" sz="3200" dirty="0" smtClean="0">
+            <a:endParaRPr lang="en-US" sz="4000" dirty="0" smtClean="0">
               <a:solidFill>
                 <a:schemeClr val="bg1"/>
               </a:solidFill>
             </a:endParaRPr>
           </a:p>
           <a:p>
-            <a:pPr marL="457200" indent="-457200">
-              <a:buFont typeface="+mj-lt"/>
+            <a:pPr marL="742950" indent="-742950">
               <a:buAutoNum type="arabicPeriod"/>
             </a:pPr>
             <a:r>
-              <a:rPr lang="en-US" sz="3200" dirty="0" smtClean="0">
+              <a:rPr lang="en-US" sz="4000" dirty="0" smtClean="0">
                 <a:solidFill>
                   <a:schemeClr val="bg1"/>
                 </a:solidFill>
               </a:rPr>
-              <a:t>Which customers are using which features?</a:t>
-            </a:r>
-          </a:p>
-          <a:p>
-            <a:pPr marL="457200" indent="-457200">
-              <a:buFont typeface="+mj-lt"/>
+              <a:t>Publish &amp; Subscribe</a:t>
+            </a:r>
+          </a:p>
+          <a:p>
+            <a:pPr marL="742950" indent="-742950">
               <a:buAutoNum type="arabicPeriod"/>
             </a:pPr>
-            <a:endParaRPr lang="en-US" sz="3200" dirty="0" smtClean="0">
+            <a:endParaRPr lang="en-US" sz="4000" dirty="0" smtClean="0">
               <a:solidFill>
                 <a:schemeClr val="bg1"/>
               </a:solidFill>
             </a:endParaRPr>
           </a:p>
           <a:p>
-            <a:pPr marL="457200" indent="-457200">
-              <a:buFont typeface="+mj-lt"/>
+            <a:pPr marL="742950" indent="-742950">
               <a:buAutoNum type="arabicPeriod"/>
             </a:pPr>
             <a:r>
-              <a:rPr lang="en-US" sz="3200" dirty="0" smtClean="0">
+              <a:rPr lang="en-US" sz="4000" dirty="0" smtClean="0">
                 <a:solidFill>
-                  <a:schemeClr val="bg1"/>
+                  <a:schemeClr val="tx1">
+                    <a:lumMod val="75000"/>
+                  </a:schemeClr>
                 </a:solidFill>
               </a:rPr>
-              <a:t>Which users are using which features?</a:t>
-            </a:r>
-            <a:endParaRPr lang="en-US" sz="3200" dirty="0">
-              <a:solidFill>
-                <a:schemeClr val="bg1"/>
-              </a:solidFill>
-            </a:endParaRPr>
+              <a:t>Request &amp; Response</a:t>
+            </a:r>
           </a:p>
         </p:txBody>
       </p:sp>
     </p:spTree>
     <p:extLst>
       <p:ext uri="{BB962C8B-B14F-4D97-AF65-F5344CB8AC3E}">
-        <p14:creationId xmlns:p14="http://schemas.microsoft.com/office/powerpoint/2010/main" val="2358411301"/>
+        <p14:creationId xmlns:p14="http://schemas.microsoft.com/office/powerpoint/2010/main" val="3384064574"/>
       </p:ext>
     </p:extLst>
   </p:cSld>
@@ -10064,648 +10133,100 @@
       </p:sp>
       <p:sp>
         <p:nvSpPr>
-          <p:cNvPr id="2" name="Rectangle 1"/>
-          <p:cNvSpPr/>
+          <p:cNvPr id="2" name="TextBox 1"/>
+          <p:cNvSpPr txBox="1"/>
           <p:nvPr/>
         </p:nvSpPr>
-        <p:spPr bwMode="auto">
+        <p:spPr>
           <a:xfrm>
-            <a:off x="609600" y="2133600"/>
-            <a:ext cx="2133600" cy="1710396"/>
+            <a:off x="381000" y="2438400"/>
+            <a:ext cx="8571577" cy="2554545"/>
           </a:xfrm>
           <a:prstGeom prst="rect">
             <a:avLst/>
           </a:prstGeom>
-          <a:solidFill>
-            <a:schemeClr val="accent1"/>
-          </a:solidFill>
-          <a:ln w="9525" cap="flat" cmpd="sng" algn="ctr">
-            <a:solidFill>
-              <a:schemeClr val="tx1"/>
-            </a:solidFill>
-            <a:prstDash val="solid"/>
-            <a:round/>
-            <a:headEnd type="none" w="med" len="med"/>
-            <a:tailEnd type="none" w="med" len="med"/>
-          </a:ln>
-          <a:effectLst/>
+          <a:noFill/>
         </p:spPr>
         <p:txBody>
-          <a:bodyPr vert="horz" wrap="square" lIns="91440" tIns="45720" rIns="91440" bIns="45720" numCol="1" rtlCol="0" anchor="t" anchorCtr="0" compatLnSpc="1">
-            <a:prstTxWarp prst="textNoShape">
-              <a:avLst/>
-            </a:prstTxWarp>
+          <a:bodyPr wrap="none" rtlCol="0">
+            <a:spAutoFit/>
           </a:bodyPr>
           <a:lstStyle/>
           <a:p>
-            <a:pPr marL="0" marR="0" indent="0" algn="l" defTabSz="914400" rtl="0" eaLnBrk="0" fontAlgn="base" latinLnBrk="0" hangingPunct="0">
-              <a:lnSpc>
-                <a:spcPct val="100000"/>
-              </a:lnSpc>
-              <a:spcBef>
-                <a:spcPct val="0"/>
-              </a:spcBef>
-              <a:spcAft>
-                <a:spcPct val="0"/>
-              </a:spcAft>
-              <a:buClrTx/>
-              <a:buSzTx/>
-              <a:buFontTx/>
-              <a:buNone/>
-              <a:tabLst/>
+            <a:pPr marL="457200" indent="-457200">
+              <a:buFont typeface="+mj-lt"/>
+              <a:buAutoNum type="arabicPeriod"/>
             </a:pPr>
             <a:r>
-              <a:rPr kumimoji="0" lang="en-US" sz="2400" b="0" i="0" u="none" strike="noStrike" cap="none" normalizeH="0" baseline="0" dirty="0" smtClean="0">
-                <a:ln>
-                  <a:noFill/>
-                </a:ln>
+              <a:rPr lang="en-US" sz="3200" dirty="0" smtClean="0">
                 <a:solidFill>
-                  <a:schemeClr val="tx1"/>
+                  <a:schemeClr val="bg1"/>
                 </a:solidFill>
-                <a:effectLst/>
-                <a:latin typeface="Arial" charset="0"/>
-                <a:ea typeface="ＭＳ Ｐゴシック" pitchFamily="1" charset="-128"/>
               </a:rPr>
-              <a:t>Learning Plan</a:t>
-            </a:r>
-          </a:p>
-          <a:p>
-            <a:pPr marL="0" marR="0" indent="0" algn="l" defTabSz="914400" rtl="0" eaLnBrk="0" fontAlgn="base" latinLnBrk="0" hangingPunct="0">
-              <a:lnSpc>
-                <a:spcPct val="100000"/>
-              </a:lnSpc>
-              <a:spcBef>
-                <a:spcPct val="0"/>
-              </a:spcBef>
-              <a:spcAft>
-                <a:spcPct val="0"/>
-              </a:spcAft>
-              <a:buClrTx/>
-              <a:buSzTx/>
-              <a:buFontTx/>
-              <a:buNone/>
-              <a:tabLst/>
+              <a:t>Which features are/are not being used?</a:t>
+            </a:r>
+          </a:p>
+          <a:p>
+            <a:pPr marL="457200" indent="-457200">
+              <a:buFont typeface="+mj-lt"/>
+              <a:buAutoNum type="arabicPeriod"/>
             </a:pPr>
-            <a:r>
-              <a:rPr lang="en-US" dirty="0" smtClean="0"/>
-              <a:t>(feature 1)</a:t>
-            </a:r>
-            <a:endParaRPr kumimoji="0" lang="en-US" sz="2400" b="0" i="0" u="none" strike="noStrike" cap="none" normalizeH="0" baseline="0" dirty="0" smtClean="0">
-              <a:ln>
-                <a:noFill/>
-              </a:ln>
+            <a:endParaRPr lang="en-US" sz="3200" dirty="0" smtClean="0">
               <a:solidFill>
-                <a:schemeClr val="tx1"/>
+                <a:schemeClr val="bg1"/>
               </a:solidFill>
-              <a:effectLst/>
-              <a:latin typeface="Arial" charset="0"/>
-              <a:ea typeface="ＭＳ Ｐゴシック" pitchFamily="1" charset="-128"/>
             </a:endParaRPr>
           </a:p>
-        </p:txBody>
-      </p:sp>
-      <p:sp>
-        <p:nvSpPr>
-          <p:cNvPr id="6" name="Rectangle 5"/>
-          <p:cNvSpPr/>
-          <p:nvPr/>
-        </p:nvSpPr>
-        <p:spPr bwMode="auto">
-          <a:xfrm>
-            <a:off x="3132280" y="2133600"/>
-            <a:ext cx="4716320" cy="533400"/>
-          </a:xfrm>
-          <a:prstGeom prst="rect">
-            <a:avLst/>
-          </a:prstGeom>
-          <a:solidFill>
-            <a:schemeClr val="accent1"/>
-          </a:solidFill>
-          <a:ln w="9525" cap="flat" cmpd="sng" algn="ctr">
-            <a:solidFill>
-              <a:schemeClr val="tx1"/>
-            </a:solidFill>
-            <a:prstDash val="solid"/>
-            <a:round/>
-            <a:headEnd type="none" w="med" len="med"/>
-            <a:tailEnd type="none" w="med" len="med"/>
-          </a:ln>
-          <a:effectLst/>
-        </p:spPr>
-        <p:txBody>
-          <a:bodyPr vert="horz" wrap="square" lIns="91440" tIns="45720" rIns="91440" bIns="45720" numCol="1" rtlCol="0" anchor="t" anchorCtr="0" compatLnSpc="1">
-            <a:prstTxWarp prst="textNoShape">
-              <a:avLst/>
-            </a:prstTxWarp>
-          </a:bodyPr>
-          <a:lstStyle/>
-          <a:p>
-            <a:pPr marL="0" marR="0" indent="0" algn="l" defTabSz="914400" rtl="0" eaLnBrk="0" fontAlgn="base" latinLnBrk="0" hangingPunct="0">
-              <a:lnSpc>
-                <a:spcPct val="100000"/>
-              </a:lnSpc>
-              <a:spcBef>
-                <a:spcPct val="0"/>
-              </a:spcBef>
-              <a:spcAft>
-                <a:spcPct val="0"/>
-              </a:spcAft>
-              <a:buClrTx/>
-              <a:buSzTx/>
-              <a:buFontTx/>
-              <a:buNone/>
-              <a:tabLst/>
+          <a:p>
+            <a:pPr marL="457200" indent="-457200">
+              <a:buFont typeface="+mj-lt"/>
+              <a:buAutoNum type="arabicPeriod"/>
             </a:pPr>
             <a:r>
-              <a:rPr kumimoji="0" lang="en-US" sz="2400" b="0" i="0" u="none" strike="noStrike" cap="none" normalizeH="0" baseline="0" dirty="0" smtClean="0">
-                <a:ln>
-                  <a:noFill/>
-                </a:ln>
+              <a:rPr lang="en-US" sz="3200" dirty="0" smtClean="0">
                 <a:solidFill>
-                  <a:schemeClr val="tx1"/>
+                  <a:schemeClr val="bg1"/>
                 </a:solidFill>
-                <a:effectLst/>
-                <a:latin typeface="Arial" charset="0"/>
-                <a:ea typeface="ＭＳ Ｐゴシック" pitchFamily="1" charset="-128"/>
               </a:rPr>
-              <a:t>Learning Plan creation</a:t>
-            </a:r>
-          </a:p>
-        </p:txBody>
-      </p:sp>
-      <p:sp>
-        <p:nvSpPr>
-          <p:cNvPr id="8" name="Rectangle 7"/>
-          <p:cNvSpPr/>
-          <p:nvPr/>
-        </p:nvSpPr>
-        <p:spPr bwMode="auto">
-          <a:xfrm>
-            <a:off x="3132280" y="2743200"/>
-            <a:ext cx="4716320" cy="511314"/>
-          </a:xfrm>
-          <a:prstGeom prst="rect">
-            <a:avLst/>
-          </a:prstGeom>
-          <a:solidFill>
-            <a:schemeClr val="accent1"/>
-          </a:solidFill>
-          <a:ln w="9525" cap="flat" cmpd="sng" algn="ctr">
-            <a:solidFill>
-              <a:schemeClr val="tx1"/>
-            </a:solidFill>
-            <a:prstDash val="solid"/>
-            <a:round/>
-            <a:headEnd type="none" w="med" len="med"/>
-            <a:tailEnd type="none" w="med" len="med"/>
-          </a:ln>
-          <a:effectLst/>
-        </p:spPr>
-        <p:txBody>
-          <a:bodyPr vert="horz" wrap="square" lIns="91440" tIns="45720" rIns="91440" bIns="45720" numCol="1" rtlCol="0" anchor="t" anchorCtr="0" compatLnSpc="1">
-            <a:prstTxWarp prst="textNoShape">
-              <a:avLst/>
-            </a:prstTxWarp>
-          </a:bodyPr>
-          <a:lstStyle/>
-          <a:p>
-            <a:pPr marL="0" marR="0" indent="0" algn="l" defTabSz="914400" rtl="0" eaLnBrk="0" fontAlgn="base" latinLnBrk="0" hangingPunct="0">
-              <a:lnSpc>
-                <a:spcPct val="100000"/>
-              </a:lnSpc>
-              <a:spcBef>
-                <a:spcPct val="0"/>
-              </a:spcBef>
-              <a:spcAft>
-                <a:spcPct val="0"/>
-              </a:spcAft>
-              <a:buClrTx/>
-              <a:buSzTx/>
-              <a:buFontTx/>
-              <a:buNone/>
-              <a:tabLst/>
+              <a:t>Which customers are using which features?</a:t>
+            </a:r>
+          </a:p>
+          <a:p>
+            <a:pPr marL="457200" indent="-457200">
+              <a:buFont typeface="+mj-lt"/>
+              <a:buAutoNum type="arabicPeriod"/>
             </a:pPr>
-            <a:r>
-              <a:rPr kumimoji="0" lang="en-US" sz="2400" b="0" i="0" u="none" strike="noStrike" cap="none" normalizeH="0" baseline="0" dirty="0" smtClean="0">
-                <a:ln>
-                  <a:noFill/>
-                </a:ln>
+            <a:endParaRPr lang="en-US" sz="3200" dirty="0" smtClean="0">
+              <a:solidFill>
+                <a:schemeClr val="bg1"/>
+              </a:solidFill>
+            </a:endParaRPr>
+          </a:p>
+          <a:p>
+            <a:pPr marL="457200" indent="-457200">
+              <a:buFont typeface="+mj-lt"/>
+              <a:buAutoNum type="arabicPeriod"/>
+            </a:pPr>
+            <a:r>
+              <a:rPr lang="en-US" sz="3200" dirty="0" smtClean="0">
                 <a:solidFill>
-                  <a:schemeClr val="tx1"/>
+                  <a:schemeClr val="bg1"/>
                 </a:solidFill>
-                <a:effectLst/>
-                <a:latin typeface="Arial" charset="0"/>
-                <a:ea typeface="ＭＳ Ｐゴシック" pitchFamily="1" charset="-128"/>
               </a:rPr>
-              <a:t>Learning Plan view</a:t>
-            </a:r>
-          </a:p>
-        </p:txBody>
-      </p:sp>
-      <p:sp>
-        <p:nvSpPr>
-          <p:cNvPr id="9" name="Rectangle 8"/>
-          <p:cNvSpPr/>
-          <p:nvPr/>
-        </p:nvSpPr>
-        <p:spPr bwMode="auto">
-          <a:xfrm>
-            <a:off x="3132280" y="3332682"/>
-            <a:ext cx="4716320" cy="511314"/>
-          </a:xfrm>
-          <a:prstGeom prst="rect">
-            <a:avLst/>
-          </a:prstGeom>
-          <a:solidFill>
-            <a:schemeClr val="accent1"/>
-          </a:solidFill>
-          <a:ln w="9525" cap="flat" cmpd="sng" algn="ctr">
-            <a:solidFill>
-              <a:schemeClr val="tx1"/>
-            </a:solidFill>
-            <a:prstDash val="solid"/>
-            <a:round/>
-            <a:headEnd type="none" w="med" len="med"/>
-            <a:tailEnd type="none" w="med" len="med"/>
-          </a:ln>
-          <a:effectLst/>
-        </p:spPr>
-        <p:txBody>
-          <a:bodyPr vert="horz" wrap="square" lIns="91440" tIns="45720" rIns="91440" bIns="45720" numCol="1" rtlCol="0" anchor="t" anchorCtr="0" compatLnSpc="1">
-            <a:prstTxWarp prst="textNoShape">
-              <a:avLst/>
-            </a:prstTxWarp>
-          </a:bodyPr>
-          <a:lstStyle/>
-          <a:p>
-            <a:pPr marL="0" marR="0" indent="0" algn="l" defTabSz="914400" rtl="0" eaLnBrk="0" fontAlgn="base" latinLnBrk="0" hangingPunct="0">
-              <a:lnSpc>
-                <a:spcPct val="100000"/>
-              </a:lnSpc>
-              <a:spcBef>
-                <a:spcPct val="0"/>
-              </a:spcBef>
-              <a:spcAft>
-                <a:spcPct val="0"/>
-              </a:spcAft>
-              <a:buClrTx/>
-              <a:buSzTx/>
-              <a:buFontTx/>
-              <a:buNone/>
-              <a:tabLst/>
-            </a:pPr>
-            <a:r>
-              <a:rPr lang="en-US" dirty="0" smtClean="0"/>
-              <a:t>Reflective Plan Exercises</a:t>
-            </a:r>
-            <a:endParaRPr kumimoji="0" lang="en-US" sz="2400" b="0" i="0" u="none" strike="noStrike" cap="none" normalizeH="0" baseline="0" dirty="0" smtClean="0">
-              <a:ln>
-                <a:noFill/>
-              </a:ln>
+              <a:t>Which users are using which features?</a:t>
+            </a:r>
+            <a:endParaRPr lang="en-US" sz="3200" dirty="0">
               <a:solidFill>
-                <a:schemeClr val="tx1"/>
+                <a:schemeClr val="bg1"/>
               </a:solidFill>
-              <a:effectLst/>
-              <a:latin typeface="Arial" charset="0"/>
-              <a:ea typeface="ＭＳ Ｐゴシック" pitchFamily="1" charset="-128"/>
             </a:endParaRPr>
-          </a:p>
-        </p:txBody>
-      </p:sp>
-      <p:sp>
-        <p:nvSpPr>
-          <p:cNvPr id="10" name="Rectangle 9"/>
-          <p:cNvSpPr/>
-          <p:nvPr/>
-        </p:nvSpPr>
-        <p:spPr bwMode="auto">
-          <a:xfrm>
-            <a:off x="609600" y="4164810"/>
-            <a:ext cx="2133600" cy="1710396"/>
-          </a:xfrm>
-          <a:prstGeom prst="rect">
-            <a:avLst/>
-          </a:prstGeom>
-          <a:solidFill>
-            <a:schemeClr val="accent1"/>
-          </a:solidFill>
-          <a:ln w="9525" cap="flat" cmpd="sng" algn="ctr">
-            <a:solidFill>
-              <a:schemeClr val="tx1"/>
-            </a:solidFill>
-            <a:prstDash val="solid"/>
-            <a:round/>
-            <a:headEnd type="none" w="med" len="med"/>
-            <a:tailEnd type="none" w="med" len="med"/>
-          </a:ln>
-          <a:effectLst/>
-        </p:spPr>
-        <p:txBody>
-          <a:bodyPr vert="horz" wrap="square" lIns="91440" tIns="45720" rIns="91440" bIns="45720" numCol="1" rtlCol="0" anchor="t" anchorCtr="0" compatLnSpc="1">
-            <a:prstTxWarp prst="textNoShape">
-              <a:avLst/>
-            </a:prstTxWarp>
-          </a:bodyPr>
-          <a:lstStyle/>
-          <a:p>
-            <a:pPr marL="0" marR="0" indent="0" algn="l" defTabSz="914400" rtl="0" eaLnBrk="0" fontAlgn="base" latinLnBrk="0" hangingPunct="0">
-              <a:lnSpc>
-                <a:spcPct val="100000"/>
-              </a:lnSpc>
-              <a:spcBef>
-                <a:spcPct val="0"/>
-              </a:spcBef>
-              <a:spcAft>
-                <a:spcPct val="0"/>
-              </a:spcAft>
-              <a:buClrTx/>
-              <a:buSzTx/>
-              <a:buFontTx/>
-              <a:buNone/>
-              <a:tabLst/>
-            </a:pPr>
-            <a:r>
-              <a:rPr kumimoji="0" lang="en-US" sz="2400" b="0" i="0" u="none" strike="noStrike" cap="none" normalizeH="0" baseline="0" dirty="0" smtClean="0">
-                <a:ln>
-                  <a:noFill/>
-                </a:ln>
-                <a:solidFill>
-                  <a:schemeClr val="tx1"/>
-                </a:solidFill>
-                <a:effectLst/>
-                <a:latin typeface="Arial" charset="0"/>
-                <a:ea typeface="ＭＳ Ｐゴシック" pitchFamily="1" charset="-128"/>
-              </a:rPr>
-              <a:t>Workflow</a:t>
-            </a:r>
-          </a:p>
-          <a:p>
-            <a:pPr marL="0" marR="0" indent="0" algn="l" defTabSz="914400" rtl="0" eaLnBrk="0" fontAlgn="base" latinLnBrk="0" hangingPunct="0">
-              <a:lnSpc>
-                <a:spcPct val="100000"/>
-              </a:lnSpc>
-              <a:spcBef>
-                <a:spcPct val="0"/>
-              </a:spcBef>
-              <a:spcAft>
-                <a:spcPct val="0"/>
-              </a:spcAft>
-              <a:buClrTx/>
-              <a:buSzTx/>
-              <a:buFontTx/>
-              <a:buNone/>
-              <a:tabLst/>
-            </a:pPr>
-            <a:r>
-              <a:rPr lang="en-US" dirty="0" smtClean="0"/>
-              <a:t>Admin</a:t>
-            </a:r>
-          </a:p>
-          <a:p>
-            <a:pPr marL="0" marR="0" indent="0" algn="l" defTabSz="914400" rtl="0" eaLnBrk="0" fontAlgn="base" latinLnBrk="0" hangingPunct="0">
-              <a:lnSpc>
-                <a:spcPct val="100000"/>
-              </a:lnSpc>
-              <a:spcBef>
-                <a:spcPct val="0"/>
-              </a:spcBef>
-              <a:spcAft>
-                <a:spcPct val="0"/>
-              </a:spcAft>
-              <a:buClrTx/>
-              <a:buSzTx/>
-              <a:buFontTx/>
-              <a:buNone/>
-              <a:tabLst/>
-            </a:pPr>
-            <a:r>
-              <a:rPr kumimoji="0" lang="en-US" sz="2400" b="0" i="0" u="none" strike="noStrike" cap="none" normalizeH="0" baseline="0" dirty="0" smtClean="0">
-                <a:ln>
-                  <a:noFill/>
-                </a:ln>
-                <a:solidFill>
-                  <a:schemeClr val="tx1"/>
-                </a:solidFill>
-                <a:effectLst/>
-                <a:latin typeface="Arial" charset="0"/>
-                <a:ea typeface="ＭＳ Ｐゴシック" pitchFamily="1" charset="-128"/>
-              </a:rPr>
-              <a:t>(feature 2)</a:t>
-            </a:r>
-          </a:p>
-        </p:txBody>
-      </p:sp>
-      <p:sp>
-        <p:nvSpPr>
-          <p:cNvPr id="11" name="Rectangle 10"/>
-          <p:cNvSpPr/>
-          <p:nvPr/>
-        </p:nvSpPr>
-        <p:spPr bwMode="auto">
-          <a:xfrm>
-            <a:off x="3132280" y="4164810"/>
-            <a:ext cx="4716320" cy="533400"/>
-          </a:xfrm>
-          <a:prstGeom prst="rect">
-            <a:avLst/>
-          </a:prstGeom>
-          <a:solidFill>
-            <a:schemeClr val="accent1"/>
-          </a:solidFill>
-          <a:ln w="9525" cap="flat" cmpd="sng" algn="ctr">
-            <a:solidFill>
-              <a:schemeClr val="tx1"/>
-            </a:solidFill>
-            <a:prstDash val="solid"/>
-            <a:round/>
-            <a:headEnd type="none" w="med" len="med"/>
-            <a:tailEnd type="none" w="med" len="med"/>
-          </a:ln>
-          <a:effectLst/>
-        </p:spPr>
-        <p:txBody>
-          <a:bodyPr vert="horz" wrap="square" lIns="91440" tIns="45720" rIns="91440" bIns="45720" numCol="1" rtlCol="0" anchor="t" anchorCtr="0" compatLnSpc="1">
-            <a:prstTxWarp prst="textNoShape">
-              <a:avLst/>
-            </a:prstTxWarp>
-          </a:bodyPr>
-          <a:lstStyle/>
-          <a:p>
-            <a:pPr marL="0" marR="0" indent="0" algn="l" defTabSz="914400" rtl="0" eaLnBrk="0" fontAlgn="base" latinLnBrk="0" hangingPunct="0">
-              <a:lnSpc>
-                <a:spcPct val="100000"/>
-              </a:lnSpc>
-              <a:spcBef>
-                <a:spcPct val="0"/>
-              </a:spcBef>
-              <a:spcAft>
-                <a:spcPct val="0"/>
-              </a:spcAft>
-              <a:buClrTx/>
-              <a:buSzTx/>
-              <a:buFontTx/>
-              <a:buNone/>
-              <a:tabLst/>
-            </a:pPr>
-            <a:r>
-              <a:rPr kumimoji="0" lang="en-US" sz="2400" b="0" i="0" u="none" strike="noStrike" cap="none" normalizeH="0" baseline="0" dirty="0" smtClean="0">
-                <a:ln>
-                  <a:noFill/>
-                </a:ln>
-                <a:solidFill>
-                  <a:schemeClr val="tx1"/>
-                </a:solidFill>
-                <a:effectLst/>
-                <a:latin typeface="Arial" charset="0"/>
-                <a:ea typeface="ＭＳ Ｐゴシック" pitchFamily="1" charset="-128"/>
-              </a:rPr>
-              <a:t>Create new Workflow</a:t>
-            </a:r>
-          </a:p>
-        </p:txBody>
-      </p:sp>
-      <p:sp>
-        <p:nvSpPr>
-          <p:cNvPr id="12" name="Rectangle 11"/>
-          <p:cNvSpPr/>
-          <p:nvPr/>
-        </p:nvSpPr>
-        <p:spPr bwMode="auto">
-          <a:xfrm>
-            <a:off x="3132280" y="4774410"/>
-            <a:ext cx="4716320" cy="511314"/>
-          </a:xfrm>
-          <a:prstGeom prst="rect">
-            <a:avLst/>
-          </a:prstGeom>
-          <a:solidFill>
-            <a:schemeClr val="accent1"/>
-          </a:solidFill>
-          <a:ln w="9525" cap="flat" cmpd="sng" algn="ctr">
-            <a:solidFill>
-              <a:schemeClr val="tx1"/>
-            </a:solidFill>
-            <a:prstDash val="solid"/>
-            <a:round/>
-            <a:headEnd type="none" w="med" len="med"/>
-            <a:tailEnd type="none" w="med" len="med"/>
-          </a:ln>
-          <a:effectLst/>
-        </p:spPr>
-        <p:txBody>
-          <a:bodyPr vert="horz" wrap="square" lIns="91440" tIns="45720" rIns="91440" bIns="45720" numCol="1" rtlCol="0" anchor="t" anchorCtr="0" compatLnSpc="1">
-            <a:prstTxWarp prst="textNoShape">
-              <a:avLst/>
-            </a:prstTxWarp>
-          </a:bodyPr>
-          <a:lstStyle/>
-          <a:p>
-            <a:pPr marL="0" marR="0" indent="0" algn="l" defTabSz="914400" rtl="0" eaLnBrk="0" fontAlgn="base" latinLnBrk="0" hangingPunct="0">
-              <a:lnSpc>
-                <a:spcPct val="100000"/>
-              </a:lnSpc>
-              <a:spcBef>
-                <a:spcPct val="0"/>
-              </a:spcBef>
-              <a:spcAft>
-                <a:spcPct val="0"/>
-              </a:spcAft>
-              <a:buClrTx/>
-              <a:buSzTx/>
-              <a:buFontTx/>
-              <a:buNone/>
-              <a:tabLst/>
-            </a:pPr>
-            <a:r>
-              <a:rPr kumimoji="0" lang="en-US" sz="2400" b="0" i="0" u="none" strike="noStrike" cap="none" normalizeH="0" baseline="0" dirty="0" smtClean="0">
-                <a:ln>
-                  <a:noFill/>
-                </a:ln>
-                <a:solidFill>
-                  <a:schemeClr val="tx1"/>
-                </a:solidFill>
-                <a:effectLst/>
-                <a:latin typeface="Arial" charset="0"/>
-                <a:ea typeface="ＭＳ Ｐゴシック" pitchFamily="1" charset="-128"/>
-              </a:rPr>
-              <a:t>Add Automation to Workflow</a:t>
-            </a:r>
-          </a:p>
-        </p:txBody>
-      </p:sp>
-      <p:sp>
-        <p:nvSpPr>
-          <p:cNvPr id="13" name="Rectangle 12"/>
-          <p:cNvSpPr/>
-          <p:nvPr/>
-        </p:nvSpPr>
-        <p:spPr bwMode="auto">
-          <a:xfrm>
-            <a:off x="3132280" y="5363892"/>
-            <a:ext cx="4716320" cy="511314"/>
-          </a:xfrm>
-          <a:prstGeom prst="rect">
-            <a:avLst/>
-          </a:prstGeom>
-          <a:solidFill>
-            <a:schemeClr val="accent1"/>
-          </a:solidFill>
-          <a:ln w="9525" cap="flat" cmpd="sng" algn="ctr">
-            <a:solidFill>
-              <a:schemeClr val="tx1"/>
-            </a:solidFill>
-            <a:prstDash val="solid"/>
-            <a:round/>
-            <a:headEnd type="none" w="med" len="med"/>
-            <a:tailEnd type="none" w="med" len="med"/>
-          </a:ln>
-          <a:effectLst/>
-        </p:spPr>
-        <p:txBody>
-          <a:bodyPr vert="horz" wrap="square" lIns="91440" tIns="45720" rIns="91440" bIns="45720" numCol="1" rtlCol="0" anchor="t" anchorCtr="0" compatLnSpc="1">
-            <a:prstTxWarp prst="textNoShape">
-              <a:avLst/>
-            </a:prstTxWarp>
-          </a:bodyPr>
-          <a:lstStyle/>
-          <a:p>
-            <a:pPr marL="0" marR="0" indent="0" algn="l" defTabSz="914400" rtl="0" eaLnBrk="0" fontAlgn="base" latinLnBrk="0" hangingPunct="0">
-              <a:lnSpc>
-                <a:spcPct val="100000"/>
-              </a:lnSpc>
-              <a:spcBef>
-                <a:spcPct val="0"/>
-              </a:spcBef>
-              <a:spcAft>
-                <a:spcPct val="0"/>
-              </a:spcAft>
-              <a:buClrTx/>
-              <a:buSzTx/>
-              <a:buFontTx/>
-              <a:buNone/>
-              <a:tabLst/>
-            </a:pPr>
-            <a:r>
-              <a:rPr kumimoji="0" lang="en-US" sz="2400" b="0" i="0" u="none" strike="noStrike" cap="none" normalizeH="0" baseline="0" dirty="0" smtClean="0">
-                <a:ln>
-                  <a:noFill/>
-                </a:ln>
-                <a:solidFill>
-                  <a:schemeClr val="tx1"/>
-                </a:solidFill>
-                <a:effectLst/>
-                <a:latin typeface="Arial" charset="0"/>
-                <a:ea typeface="ＭＳ Ｐゴシック" pitchFamily="1" charset="-128"/>
-              </a:rPr>
-              <a:t>Add Behavior to Workflow</a:t>
-            </a:r>
           </a:p>
         </p:txBody>
       </p:sp>
     </p:spTree>
     <p:extLst>
       <p:ext uri="{BB962C8B-B14F-4D97-AF65-F5344CB8AC3E}">
-        <p14:creationId xmlns:p14="http://schemas.microsoft.com/office/powerpoint/2010/main" val="1087166271"/>
+        <p14:creationId xmlns:p14="http://schemas.microsoft.com/office/powerpoint/2010/main" val="2358411301"/>
       </p:ext>
     </p:extLst>
   </p:cSld>
@@ -10747,6 +10268,730 @@
         </p:nvSpPr>
         <p:spPr>
           <a:xfrm>
+            <a:off x="3132280" y="838200"/>
+            <a:ext cx="2521844" cy="707886"/>
+          </a:xfrm>
+          <a:prstGeom prst="rect">
+            <a:avLst/>
+          </a:prstGeom>
+          <a:noFill/>
+        </p:spPr>
+        <p:txBody>
+          <a:bodyPr wrap="none" rtlCol="0">
+            <a:spAutoFit/>
+          </a:bodyPr>
+          <a:lstStyle/>
+          <a:p>
+            <a:pPr algn="ctr"/>
+            <a:r>
+              <a:rPr lang="en-US" sz="4000" dirty="0" err="1" smtClean="0">
+                <a:solidFill>
+                  <a:schemeClr val="bg1"/>
+                </a:solidFill>
+              </a:rPr>
+              <a:t>EmpiriCall</a:t>
+            </a:r>
+            <a:endParaRPr lang="en-US" sz="4000" dirty="0">
+              <a:solidFill>
+                <a:schemeClr val="bg1"/>
+              </a:solidFill>
+            </a:endParaRPr>
+          </a:p>
+        </p:txBody>
+      </p:sp>
+      <p:sp>
+        <p:nvSpPr>
+          <p:cNvPr id="2" name="Rectangle 1"/>
+          <p:cNvSpPr/>
+          <p:nvPr/>
+        </p:nvSpPr>
+        <p:spPr bwMode="auto">
+          <a:xfrm>
+            <a:off x="609600" y="2133600"/>
+            <a:ext cx="2133600" cy="1710396"/>
+          </a:xfrm>
+          <a:prstGeom prst="rect">
+            <a:avLst/>
+          </a:prstGeom>
+          <a:solidFill>
+            <a:schemeClr val="accent1"/>
+          </a:solidFill>
+          <a:ln w="9525" cap="flat" cmpd="sng" algn="ctr">
+            <a:solidFill>
+              <a:schemeClr val="tx1"/>
+            </a:solidFill>
+            <a:prstDash val="solid"/>
+            <a:round/>
+            <a:headEnd type="none" w="med" len="med"/>
+            <a:tailEnd type="none" w="med" len="med"/>
+          </a:ln>
+          <a:effectLst/>
+        </p:spPr>
+        <p:txBody>
+          <a:bodyPr vert="horz" wrap="square" lIns="91440" tIns="45720" rIns="91440" bIns="45720" numCol="1" rtlCol="0" anchor="t" anchorCtr="0" compatLnSpc="1">
+            <a:prstTxWarp prst="textNoShape">
+              <a:avLst/>
+            </a:prstTxWarp>
+          </a:bodyPr>
+          <a:lstStyle/>
+          <a:p>
+            <a:pPr marL="0" marR="0" indent="0" algn="l" defTabSz="914400" rtl="0" eaLnBrk="0" fontAlgn="base" latinLnBrk="0" hangingPunct="0">
+              <a:lnSpc>
+                <a:spcPct val="100000"/>
+              </a:lnSpc>
+              <a:spcBef>
+                <a:spcPct val="0"/>
+              </a:spcBef>
+              <a:spcAft>
+                <a:spcPct val="0"/>
+              </a:spcAft>
+              <a:buClrTx/>
+              <a:buSzTx/>
+              <a:buFontTx/>
+              <a:buNone/>
+              <a:tabLst/>
+            </a:pPr>
+            <a:r>
+              <a:rPr kumimoji="0" lang="en-US" sz="2400" b="0" i="0" u="none" strike="noStrike" cap="none" normalizeH="0" baseline="0" dirty="0" smtClean="0">
+                <a:ln>
+                  <a:noFill/>
+                </a:ln>
+                <a:solidFill>
+                  <a:schemeClr val="tx1"/>
+                </a:solidFill>
+                <a:effectLst/>
+                <a:latin typeface="Arial" charset="0"/>
+                <a:ea typeface="ＭＳ Ｐゴシック" pitchFamily="1" charset="-128"/>
+              </a:rPr>
+              <a:t>Learning Plan</a:t>
+            </a:r>
+          </a:p>
+          <a:p>
+            <a:pPr marL="0" marR="0" indent="0" algn="l" defTabSz="914400" rtl="0" eaLnBrk="0" fontAlgn="base" latinLnBrk="0" hangingPunct="0">
+              <a:lnSpc>
+                <a:spcPct val="100000"/>
+              </a:lnSpc>
+              <a:spcBef>
+                <a:spcPct val="0"/>
+              </a:spcBef>
+              <a:spcAft>
+                <a:spcPct val="0"/>
+              </a:spcAft>
+              <a:buClrTx/>
+              <a:buSzTx/>
+              <a:buFontTx/>
+              <a:buNone/>
+              <a:tabLst/>
+            </a:pPr>
+            <a:r>
+              <a:rPr lang="en-US" dirty="0" smtClean="0"/>
+              <a:t>(feature 1)</a:t>
+            </a:r>
+            <a:endParaRPr kumimoji="0" lang="en-US" sz="2400" b="0" i="0" u="none" strike="noStrike" cap="none" normalizeH="0" baseline="0" dirty="0" smtClean="0">
+              <a:ln>
+                <a:noFill/>
+              </a:ln>
+              <a:solidFill>
+                <a:schemeClr val="tx1"/>
+              </a:solidFill>
+              <a:effectLst/>
+              <a:latin typeface="Arial" charset="0"/>
+              <a:ea typeface="ＭＳ Ｐゴシック" pitchFamily="1" charset="-128"/>
+            </a:endParaRPr>
+          </a:p>
+        </p:txBody>
+      </p:sp>
+      <p:sp>
+        <p:nvSpPr>
+          <p:cNvPr id="6" name="Rectangle 5"/>
+          <p:cNvSpPr/>
+          <p:nvPr/>
+        </p:nvSpPr>
+        <p:spPr bwMode="auto">
+          <a:xfrm>
+            <a:off x="3132280" y="2133600"/>
+            <a:ext cx="4716320" cy="533400"/>
+          </a:xfrm>
+          <a:prstGeom prst="rect">
+            <a:avLst/>
+          </a:prstGeom>
+          <a:solidFill>
+            <a:schemeClr val="accent1"/>
+          </a:solidFill>
+          <a:ln w="9525" cap="flat" cmpd="sng" algn="ctr">
+            <a:solidFill>
+              <a:schemeClr val="tx1"/>
+            </a:solidFill>
+            <a:prstDash val="solid"/>
+            <a:round/>
+            <a:headEnd type="none" w="med" len="med"/>
+            <a:tailEnd type="none" w="med" len="med"/>
+          </a:ln>
+          <a:effectLst/>
+        </p:spPr>
+        <p:txBody>
+          <a:bodyPr vert="horz" wrap="square" lIns="91440" tIns="45720" rIns="91440" bIns="45720" numCol="1" rtlCol="0" anchor="t" anchorCtr="0" compatLnSpc="1">
+            <a:prstTxWarp prst="textNoShape">
+              <a:avLst/>
+            </a:prstTxWarp>
+          </a:bodyPr>
+          <a:lstStyle/>
+          <a:p>
+            <a:pPr marL="0" marR="0" indent="0" algn="l" defTabSz="914400" rtl="0" eaLnBrk="0" fontAlgn="base" latinLnBrk="0" hangingPunct="0">
+              <a:lnSpc>
+                <a:spcPct val="100000"/>
+              </a:lnSpc>
+              <a:spcBef>
+                <a:spcPct val="0"/>
+              </a:spcBef>
+              <a:spcAft>
+                <a:spcPct val="0"/>
+              </a:spcAft>
+              <a:buClrTx/>
+              <a:buSzTx/>
+              <a:buFontTx/>
+              <a:buNone/>
+              <a:tabLst/>
+            </a:pPr>
+            <a:r>
+              <a:rPr kumimoji="0" lang="en-US" sz="2400" b="0" i="0" u="none" strike="noStrike" cap="none" normalizeH="0" baseline="0" dirty="0" smtClean="0">
+                <a:ln>
+                  <a:noFill/>
+                </a:ln>
+                <a:solidFill>
+                  <a:schemeClr val="tx1"/>
+                </a:solidFill>
+                <a:effectLst/>
+                <a:latin typeface="Arial" charset="0"/>
+                <a:ea typeface="ＭＳ Ｐゴシック" pitchFamily="1" charset="-128"/>
+              </a:rPr>
+              <a:t>Learning Plan creation</a:t>
+            </a:r>
+          </a:p>
+        </p:txBody>
+      </p:sp>
+      <p:sp>
+        <p:nvSpPr>
+          <p:cNvPr id="8" name="Rectangle 7"/>
+          <p:cNvSpPr/>
+          <p:nvPr/>
+        </p:nvSpPr>
+        <p:spPr bwMode="auto">
+          <a:xfrm>
+            <a:off x="3132280" y="2743200"/>
+            <a:ext cx="4716320" cy="511314"/>
+          </a:xfrm>
+          <a:prstGeom prst="rect">
+            <a:avLst/>
+          </a:prstGeom>
+          <a:solidFill>
+            <a:schemeClr val="accent1"/>
+          </a:solidFill>
+          <a:ln w="9525" cap="flat" cmpd="sng" algn="ctr">
+            <a:solidFill>
+              <a:schemeClr val="tx1"/>
+            </a:solidFill>
+            <a:prstDash val="solid"/>
+            <a:round/>
+            <a:headEnd type="none" w="med" len="med"/>
+            <a:tailEnd type="none" w="med" len="med"/>
+          </a:ln>
+          <a:effectLst/>
+        </p:spPr>
+        <p:txBody>
+          <a:bodyPr vert="horz" wrap="square" lIns="91440" tIns="45720" rIns="91440" bIns="45720" numCol="1" rtlCol="0" anchor="t" anchorCtr="0" compatLnSpc="1">
+            <a:prstTxWarp prst="textNoShape">
+              <a:avLst/>
+            </a:prstTxWarp>
+          </a:bodyPr>
+          <a:lstStyle/>
+          <a:p>
+            <a:pPr marL="0" marR="0" indent="0" algn="l" defTabSz="914400" rtl="0" eaLnBrk="0" fontAlgn="base" latinLnBrk="0" hangingPunct="0">
+              <a:lnSpc>
+                <a:spcPct val="100000"/>
+              </a:lnSpc>
+              <a:spcBef>
+                <a:spcPct val="0"/>
+              </a:spcBef>
+              <a:spcAft>
+                <a:spcPct val="0"/>
+              </a:spcAft>
+              <a:buClrTx/>
+              <a:buSzTx/>
+              <a:buFontTx/>
+              <a:buNone/>
+              <a:tabLst/>
+            </a:pPr>
+            <a:r>
+              <a:rPr kumimoji="0" lang="en-US" sz="2400" b="0" i="0" u="none" strike="noStrike" cap="none" normalizeH="0" baseline="0" dirty="0" smtClean="0">
+                <a:ln>
+                  <a:noFill/>
+                </a:ln>
+                <a:solidFill>
+                  <a:schemeClr val="tx1"/>
+                </a:solidFill>
+                <a:effectLst/>
+                <a:latin typeface="Arial" charset="0"/>
+                <a:ea typeface="ＭＳ Ｐゴシック" pitchFamily="1" charset="-128"/>
+              </a:rPr>
+              <a:t>Learning Plan view</a:t>
+            </a:r>
+          </a:p>
+        </p:txBody>
+      </p:sp>
+      <p:sp>
+        <p:nvSpPr>
+          <p:cNvPr id="9" name="Rectangle 8"/>
+          <p:cNvSpPr/>
+          <p:nvPr/>
+        </p:nvSpPr>
+        <p:spPr bwMode="auto">
+          <a:xfrm>
+            <a:off x="3132280" y="3332682"/>
+            <a:ext cx="4716320" cy="511314"/>
+          </a:xfrm>
+          <a:prstGeom prst="rect">
+            <a:avLst/>
+          </a:prstGeom>
+          <a:solidFill>
+            <a:schemeClr val="accent1"/>
+          </a:solidFill>
+          <a:ln w="9525" cap="flat" cmpd="sng" algn="ctr">
+            <a:solidFill>
+              <a:schemeClr val="tx1"/>
+            </a:solidFill>
+            <a:prstDash val="solid"/>
+            <a:round/>
+            <a:headEnd type="none" w="med" len="med"/>
+            <a:tailEnd type="none" w="med" len="med"/>
+          </a:ln>
+          <a:effectLst/>
+        </p:spPr>
+        <p:txBody>
+          <a:bodyPr vert="horz" wrap="square" lIns="91440" tIns="45720" rIns="91440" bIns="45720" numCol="1" rtlCol="0" anchor="t" anchorCtr="0" compatLnSpc="1">
+            <a:prstTxWarp prst="textNoShape">
+              <a:avLst/>
+            </a:prstTxWarp>
+          </a:bodyPr>
+          <a:lstStyle/>
+          <a:p>
+            <a:pPr marL="0" marR="0" indent="0" algn="l" defTabSz="914400" rtl="0" eaLnBrk="0" fontAlgn="base" latinLnBrk="0" hangingPunct="0">
+              <a:lnSpc>
+                <a:spcPct val="100000"/>
+              </a:lnSpc>
+              <a:spcBef>
+                <a:spcPct val="0"/>
+              </a:spcBef>
+              <a:spcAft>
+                <a:spcPct val="0"/>
+              </a:spcAft>
+              <a:buClrTx/>
+              <a:buSzTx/>
+              <a:buFontTx/>
+              <a:buNone/>
+              <a:tabLst/>
+            </a:pPr>
+            <a:r>
+              <a:rPr lang="en-US" smtClean="0"/>
+              <a:t>Reflective </a:t>
+            </a:r>
+            <a:r>
+              <a:rPr lang="en-US" smtClean="0"/>
+              <a:t>Practice </a:t>
+            </a:r>
+            <a:r>
+              <a:rPr lang="en-US" dirty="0" smtClean="0"/>
+              <a:t>Exercises</a:t>
+            </a:r>
+            <a:endParaRPr kumimoji="0" lang="en-US" sz="2400" b="0" i="0" u="none" strike="noStrike" cap="none" normalizeH="0" baseline="0" dirty="0" smtClean="0">
+              <a:ln>
+                <a:noFill/>
+              </a:ln>
+              <a:solidFill>
+                <a:schemeClr val="tx1"/>
+              </a:solidFill>
+              <a:effectLst/>
+              <a:latin typeface="Arial" charset="0"/>
+              <a:ea typeface="ＭＳ Ｐゴシック" pitchFamily="1" charset="-128"/>
+            </a:endParaRPr>
+          </a:p>
+        </p:txBody>
+      </p:sp>
+      <p:sp>
+        <p:nvSpPr>
+          <p:cNvPr id="10" name="Rectangle 9"/>
+          <p:cNvSpPr/>
+          <p:nvPr/>
+        </p:nvSpPr>
+        <p:spPr bwMode="auto">
+          <a:xfrm>
+            <a:off x="609600" y="4164810"/>
+            <a:ext cx="2133600" cy="1710396"/>
+          </a:xfrm>
+          <a:prstGeom prst="rect">
+            <a:avLst/>
+          </a:prstGeom>
+          <a:solidFill>
+            <a:schemeClr val="accent1"/>
+          </a:solidFill>
+          <a:ln w="9525" cap="flat" cmpd="sng" algn="ctr">
+            <a:solidFill>
+              <a:schemeClr val="tx1"/>
+            </a:solidFill>
+            <a:prstDash val="solid"/>
+            <a:round/>
+            <a:headEnd type="none" w="med" len="med"/>
+            <a:tailEnd type="none" w="med" len="med"/>
+          </a:ln>
+          <a:effectLst/>
+        </p:spPr>
+        <p:txBody>
+          <a:bodyPr vert="horz" wrap="square" lIns="91440" tIns="45720" rIns="91440" bIns="45720" numCol="1" rtlCol="0" anchor="t" anchorCtr="0" compatLnSpc="1">
+            <a:prstTxWarp prst="textNoShape">
+              <a:avLst/>
+            </a:prstTxWarp>
+          </a:bodyPr>
+          <a:lstStyle/>
+          <a:p>
+            <a:pPr marL="0" marR="0" indent="0" algn="l" defTabSz="914400" rtl="0" eaLnBrk="0" fontAlgn="base" latinLnBrk="0" hangingPunct="0">
+              <a:lnSpc>
+                <a:spcPct val="100000"/>
+              </a:lnSpc>
+              <a:spcBef>
+                <a:spcPct val="0"/>
+              </a:spcBef>
+              <a:spcAft>
+                <a:spcPct val="0"/>
+              </a:spcAft>
+              <a:buClrTx/>
+              <a:buSzTx/>
+              <a:buFontTx/>
+              <a:buNone/>
+              <a:tabLst/>
+            </a:pPr>
+            <a:r>
+              <a:rPr kumimoji="0" lang="en-US" sz="2400" b="0" i="0" u="none" strike="noStrike" cap="none" normalizeH="0" baseline="0" dirty="0" smtClean="0">
+                <a:ln>
+                  <a:noFill/>
+                </a:ln>
+                <a:solidFill>
+                  <a:schemeClr val="tx1"/>
+                </a:solidFill>
+                <a:effectLst/>
+                <a:latin typeface="Arial" charset="0"/>
+                <a:ea typeface="ＭＳ Ｐゴシック" pitchFamily="1" charset="-128"/>
+              </a:rPr>
+              <a:t>Workflow</a:t>
+            </a:r>
+          </a:p>
+          <a:p>
+            <a:pPr marL="0" marR="0" indent="0" algn="l" defTabSz="914400" rtl="0" eaLnBrk="0" fontAlgn="base" latinLnBrk="0" hangingPunct="0">
+              <a:lnSpc>
+                <a:spcPct val="100000"/>
+              </a:lnSpc>
+              <a:spcBef>
+                <a:spcPct val="0"/>
+              </a:spcBef>
+              <a:spcAft>
+                <a:spcPct val="0"/>
+              </a:spcAft>
+              <a:buClrTx/>
+              <a:buSzTx/>
+              <a:buFontTx/>
+              <a:buNone/>
+              <a:tabLst/>
+            </a:pPr>
+            <a:r>
+              <a:rPr lang="en-US" dirty="0" smtClean="0"/>
+              <a:t>Admin</a:t>
+            </a:r>
+          </a:p>
+          <a:p>
+            <a:pPr marL="0" marR="0" indent="0" algn="l" defTabSz="914400" rtl="0" eaLnBrk="0" fontAlgn="base" latinLnBrk="0" hangingPunct="0">
+              <a:lnSpc>
+                <a:spcPct val="100000"/>
+              </a:lnSpc>
+              <a:spcBef>
+                <a:spcPct val="0"/>
+              </a:spcBef>
+              <a:spcAft>
+                <a:spcPct val="0"/>
+              </a:spcAft>
+              <a:buClrTx/>
+              <a:buSzTx/>
+              <a:buFontTx/>
+              <a:buNone/>
+              <a:tabLst/>
+            </a:pPr>
+            <a:r>
+              <a:rPr kumimoji="0" lang="en-US" sz="2400" b="0" i="0" u="none" strike="noStrike" cap="none" normalizeH="0" baseline="0" dirty="0" smtClean="0">
+                <a:ln>
+                  <a:noFill/>
+                </a:ln>
+                <a:solidFill>
+                  <a:schemeClr val="tx1"/>
+                </a:solidFill>
+                <a:effectLst/>
+                <a:latin typeface="Arial" charset="0"/>
+                <a:ea typeface="ＭＳ Ｐゴシック" pitchFamily="1" charset="-128"/>
+              </a:rPr>
+              <a:t>(feature 2)</a:t>
+            </a:r>
+          </a:p>
+        </p:txBody>
+      </p:sp>
+      <p:sp>
+        <p:nvSpPr>
+          <p:cNvPr id="11" name="Rectangle 10"/>
+          <p:cNvSpPr/>
+          <p:nvPr/>
+        </p:nvSpPr>
+        <p:spPr bwMode="auto">
+          <a:xfrm>
+            <a:off x="3132280" y="4164810"/>
+            <a:ext cx="4716320" cy="533400"/>
+          </a:xfrm>
+          <a:prstGeom prst="rect">
+            <a:avLst/>
+          </a:prstGeom>
+          <a:solidFill>
+            <a:schemeClr val="accent1"/>
+          </a:solidFill>
+          <a:ln w="9525" cap="flat" cmpd="sng" algn="ctr">
+            <a:solidFill>
+              <a:schemeClr val="tx1"/>
+            </a:solidFill>
+            <a:prstDash val="solid"/>
+            <a:round/>
+            <a:headEnd type="none" w="med" len="med"/>
+            <a:tailEnd type="none" w="med" len="med"/>
+          </a:ln>
+          <a:effectLst/>
+        </p:spPr>
+        <p:txBody>
+          <a:bodyPr vert="horz" wrap="square" lIns="91440" tIns="45720" rIns="91440" bIns="45720" numCol="1" rtlCol="0" anchor="t" anchorCtr="0" compatLnSpc="1">
+            <a:prstTxWarp prst="textNoShape">
+              <a:avLst/>
+            </a:prstTxWarp>
+          </a:bodyPr>
+          <a:lstStyle/>
+          <a:p>
+            <a:pPr marL="0" marR="0" indent="0" algn="l" defTabSz="914400" rtl="0" eaLnBrk="0" fontAlgn="base" latinLnBrk="0" hangingPunct="0">
+              <a:lnSpc>
+                <a:spcPct val="100000"/>
+              </a:lnSpc>
+              <a:spcBef>
+                <a:spcPct val="0"/>
+              </a:spcBef>
+              <a:spcAft>
+                <a:spcPct val="0"/>
+              </a:spcAft>
+              <a:buClrTx/>
+              <a:buSzTx/>
+              <a:buFontTx/>
+              <a:buNone/>
+              <a:tabLst/>
+            </a:pPr>
+            <a:r>
+              <a:rPr kumimoji="0" lang="en-US" sz="2400" b="0" i="0" u="none" strike="noStrike" cap="none" normalizeH="0" baseline="0" dirty="0" smtClean="0">
+                <a:ln>
+                  <a:noFill/>
+                </a:ln>
+                <a:solidFill>
+                  <a:schemeClr val="tx1"/>
+                </a:solidFill>
+                <a:effectLst/>
+                <a:latin typeface="Arial" charset="0"/>
+                <a:ea typeface="ＭＳ Ｐゴシック" pitchFamily="1" charset="-128"/>
+              </a:rPr>
+              <a:t>Create new Workflow</a:t>
+            </a:r>
+          </a:p>
+        </p:txBody>
+      </p:sp>
+      <p:sp>
+        <p:nvSpPr>
+          <p:cNvPr id="12" name="Rectangle 11"/>
+          <p:cNvSpPr/>
+          <p:nvPr/>
+        </p:nvSpPr>
+        <p:spPr bwMode="auto">
+          <a:xfrm>
+            <a:off x="3132280" y="4774410"/>
+            <a:ext cx="4716320" cy="511314"/>
+          </a:xfrm>
+          <a:prstGeom prst="rect">
+            <a:avLst/>
+          </a:prstGeom>
+          <a:solidFill>
+            <a:schemeClr val="accent1"/>
+          </a:solidFill>
+          <a:ln w="9525" cap="flat" cmpd="sng" algn="ctr">
+            <a:solidFill>
+              <a:schemeClr val="tx1"/>
+            </a:solidFill>
+            <a:prstDash val="solid"/>
+            <a:round/>
+            <a:headEnd type="none" w="med" len="med"/>
+            <a:tailEnd type="none" w="med" len="med"/>
+          </a:ln>
+          <a:effectLst/>
+        </p:spPr>
+        <p:txBody>
+          <a:bodyPr vert="horz" wrap="square" lIns="91440" tIns="45720" rIns="91440" bIns="45720" numCol="1" rtlCol="0" anchor="t" anchorCtr="0" compatLnSpc="1">
+            <a:prstTxWarp prst="textNoShape">
+              <a:avLst/>
+            </a:prstTxWarp>
+          </a:bodyPr>
+          <a:lstStyle/>
+          <a:p>
+            <a:pPr marL="0" marR="0" indent="0" algn="l" defTabSz="914400" rtl="0" eaLnBrk="0" fontAlgn="base" latinLnBrk="0" hangingPunct="0">
+              <a:lnSpc>
+                <a:spcPct val="100000"/>
+              </a:lnSpc>
+              <a:spcBef>
+                <a:spcPct val="0"/>
+              </a:spcBef>
+              <a:spcAft>
+                <a:spcPct val="0"/>
+              </a:spcAft>
+              <a:buClrTx/>
+              <a:buSzTx/>
+              <a:buFontTx/>
+              <a:buNone/>
+              <a:tabLst/>
+            </a:pPr>
+            <a:r>
+              <a:rPr kumimoji="0" lang="en-US" sz="2400" b="0" i="0" u="none" strike="noStrike" cap="none" normalizeH="0" baseline="0" dirty="0" smtClean="0">
+                <a:ln>
+                  <a:noFill/>
+                </a:ln>
+                <a:solidFill>
+                  <a:schemeClr val="tx1"/>
+                </a:solidFill>
+                <a:effectLst/>
+                <a:latin typeface="Arial" charset="0"/>
+                <a:ea typeface="ＭＳ Ｐゴシック" pitchFamily="1" charset="-128"/>
+              </a:rPr>
+              <a:t>Add Automation to Workflow</a:t>
+            </a:r>
+          </a:p>
+        </p:txBody>
+      </p:sp>
+      <p:sp>
+        <p:nvSpPr>
+          <p:cNvPr id="13" name="Rectangle 12"/>
+          <p:cNvSpPr/>
+          <p:nvPr/>
+        </p:nvSpPr>
+        <p:spPr bwMode="auto">
+          <a:xfrm>
+            <a:off x="3132280" y="5363892"/>
+            <a:ext cx="4716320" cy="511314"/>
+          </a:xfrm>
+          <a:prstGeom prst="rect">
+            <a:avLst/>
+          </a:prstGeom>
+          <a:solidFill>
+            <a:schemeClr val="accent1"/>
+          </a:solidFill>
+          <a:ln w="9525" cap="flat" cmpd="sng" algn="ctr">
+            <a:solidFill>
+              <a:schemeClr val="tx1"/>
+            </a:solidFill>
+            <a:prstDash val="solid"/>
+            <a:round/>
+            <a:headEnd type="none" w="med" len="med"/>
+            <a:tailEnd type="none" w="med" len="med"/>
+          </a:ln>
+          <a:effectLst/>
+        </p:spPr>
+        <p:txBody>
+          <a:bodyPr vert="horz" wrap="square" lIns="91440" tIns="45720" rIns="91440" bIns="45720" numCol="1" rtlCol="0" anchor="t" anchorCtr="0" compatLnSpc="1">
+            <a:prstTxWarp prst="textNoShape">
+              <a:avLst/>
+            </a:prstTxWarp>
+          </a:bodyPr>
+          <a:lstStyle/>
+          <a:p>
+            <a:pPr marL="0" marR="0" indent="0" algn="l" defTabSz="914400" rtl="0" eaLnBrk="0" fontAlgn="base" latinLnBrk="0" hangingPunct="0">
+              <a:lnSpc>
+                <a:spcPct val="100000"/>
+              </a:lnSpc>
+              <a:spcBef>
+                <a:spcPct val="0"/>
+              </a:spcBef>
+              <a:spcAft>
+                <a:spcPct val="0"/>
+              </a:spcAft>
+              <a:buClrTx/>
+              <a:buSzTx/>
+              <a:buFontTx/>
+              <a:buNone/>
+              <a:tabLst/>
+            </a:pPr>
+            <a:r>
+              <a:rPr kumimoji="0" lang="en-US" sz="2400" b="0" i="0" u="none" strike="noStrike" cap="none" normalizeH="0" baseline="0" dirty="0" smtClean="0">
+                <a:ln>
+                  <a:noFill/>
+                </a:ln>
+                <a:solidFill>
+                  <a:schemeClr val="tx1"/>
+                </a:solidFill>
+                <a:effectLst/>
+                <a:latin typeface="Arial" charset="0"/>
+                <a:ea typeface="ＭＳ Ｐゴシック" pitchFamily="1" charset="-128"/>
+              </a:rPr>
+              <a:t>Add Behavior to Workflow</a:t>
+            </a:r>
+          </a:p>
+        </p:txBody>
+      </p:sp>
+    </p:spTree>
+    <p:extLst>
+      <p:ext uri="{BB962C8B-B14F-4D97-AF65-F5344CB8AC3E}">
+        <p14:creationId xmlns:p14="http://schemas.microsoft.com/office/powerpoint/2010/main" val="1087166271"/>
+      </p:ext>
+    </p:extLst>
+  </p:cSld>
+  <p:clrMapOvr>
+    <a:masterClrMapping/>
+  </p:clrMapOvr>
+  <p:timing>
+    <p:tnLst>
+      <p:par>
+        <p:cTn id="1" dur="indefinite" restart="never" nodeType="tmRoot"/>
+      </p:par>
+    </p:tnLst>
+  </p:timing>
+</p:sld>
+</file>
+
+<file path=ppt/slides/slide17.xml><?xml version="1.0" encoding="utf-8"?>
+<p:sld xmlns:a="http://schemas.openxmlformats.org/drawingml/2006/main" xmlns:r="http://schemas.openxmlformats.org/officeDocument/2006/relationships" xmlns:p="http://schemas.openxmlformats.org/presentationml/2006/main">
+  <p:cSld>
+    <p:spTree>
+      <p:nvGrpSpPr>
+        <p:cNvPr id="1" name=""/>
+        <p:cNvGrpSpPr/>
+        <p:nvPr/>
+      </p:nvGrpSpPr>
+      <p:grpSpPr>
+        <a:xfrm>
+          <a:off x="0" y="0"/>
+          <a:ext cx="0" cy="0"/>
+          <a:chOff x="0" y="0"/>
+          <a:chExt cx="0" cy="0"/>
+        </a:xfrm>
+      </p:grpSpPr>
+      <p:sp>
+        <p:nvSpPr>
+          <p:cNvPr id="5" name="TextBox 4"/>
+          <p:cNvSpPr txBox="1"/>
+          <p:nvPr/>
+        </p:nvSpPr>
+        <p:spPr>
+          <a:xfrm>
             <a:off x="853467" y="2895600"/>
             <a:ext cx="6971780" cy="1323439"/>
           </a:xfrm>
@@ -10825,7 +11070,7 @@
 </p:sld>
 </file>
 
-<file path=ppt/slides/slide17.xml><?xml version="1.0" encoding="utf-8"?>
+<file path=ppt/slides/slide18.xml><?xml version="1.0" encoding="utf-8"?>
 <p:sld xmlns:a="http://schemas.openxmlformats.org/drawingml/2006/main" xmlns:r="http://schemas.openxmlformats.org/officeDocument/2006/relationships" xmlns:p="http://schemas.openxmlformats.org/presentationml/2006/main">
   <p:cSld>
     <p:spTree>
@@ -11479,6 +11724,160 @@
 </file>
 
 <file path=ppt/slides/slide5.xml><?xml version="1.0" encoding="utf-8"?>
+<p:sld xmlns:a="http://schemas.openxmlformats.org/drawingml/2006/main" xmlns:r="http://schemas.openxmlformats.org/officeDocument/2006/relationships" xmlns:p="http://schemas.openxmlformats.org/presentationml/2006/main">
+  <p:cSld>
+    <p:spTree>
+      <p:nvGrpSpPr>
+        <p:cNvPr id="1" name=""/>
+        <p:cNvGrpSpPr/>
+        <p:nvPr/>
+      </p:nvGrpSpPr>
+      <p:grpSpPr>
+        <a:xfrm>
+          <a:off x="0" y="0"/>
+          <a:ext cx="0" cy="0"/>
+          <a:chOff x="0" y="0"/>
+          <a:chExt cx="0" cy="0"/>
+        </a:xfrm>
+      </p:grpSpPr>
+      <p:sp>
+        <p:nvSpPr>
+          <p:cNvPr id="2" name="Text Placeholder 1"/>
+          <p:cNvSpPr>
+            <a:spLocks noGrp="1"/>
+          </p:cNvSpPr>
+          <p:nvPr>
+            <p:ph type="body" sz="quarter" idx="13"/>
+          </p:nvPr>
+        </p:nvSpPr>
+        <p:spPr/>
+        <p:txBody>
+          <a:bodyPr/>
+          <a:lstStyle/>
+          <a:p>
+            <a:r>
+              <a:rPr lang="en-US" dirty="0" smtClean="0"/>
+              <a:t>Queueing review</a:t>
+            </a:r>
+          </a:p>
+          <a:p>
+            <a:r>
+              <a:rPr lang="en-US" dirty="0" err="1" smtClean="0"/>
+              <a:t>RabbitMQ</a:t>
+            </a:r>
+            <a:r>
+              <a:rPr lang="en-US" dirty="0" smtClean="0"/>
+              <a:t> on .NET demo</a:t>
+            </a:r>
+          </a:p>
+          <a:p>
+            <a:r>
+              <a:rPr lang="en-US" dirty="0" smtClean="0"/>
+              <a:t>Queueing patterns</a:t>
+            </a:r>
+          </a:p>
+          <a:p>
+            <a:r>
+              <a:rPr lang="en-US" dirty="0" err="1" smtClean="0"/>
+              <a:t>EasyNetQ</a:t>
+            </a:r>
+            <a:r>
+              <a:rPr lang="en-US" dirty="0" smtClean="0"/>
+              <a:t> basics</a:t>
+            </a:r>
+          </a:p>
+          <a:p>
+            <a:r>
+              <a:rPr lang="en-US" dirty="0" err="1" smtClean="0"/>
+              <a:t>EasyNetQ</a:t>
+            </a:r>
+            <a:r>
+              <a:rPr lang="en-US" dirty="0" smtClean="0"/>
+              <a:t> code demo</a:t>
+            </a:r>
+          </a:p>
+          <a:p>
+            <a:r>
+              <a:rPr lang="en-US" dirty="0" smtClean="0"/>
+              <a:t>Real application</a:t>
+            </a:r>
+            <a:endParaRPr lang="en-US" dirty="0"/>
+          </a:p>
+        </p:txBody>
+      </p:sp>
+      <p:sp>
+        <p:nvSpPr>
+          <p:cNvPr id="3" name="Title 2"/>
+          <p:cNvSpPr>
+            <a:spLocks noGrp="1"/>
+          </p:cNvSpPr>
+          <p:nvPr>
+            <p:ph type="title"/>
+          </p:nvPr>
+        </p:nvSpPr>
+        <p:spPr/>
+        <p:txBody>
+          <a:bodyPr/>
+          <a:lstStyle/>
+          <a:p>
+            <a:r>
+              <a:rPr lang="en-US" dirty="0" smtClean="0"/>
+              <a:t>Agenda</a:t>
+            </a:r>
+            <a:endParaRPr lang="en-US" dirty="0"/>
+          </a:p>
+        </p:txBody>
+      </p:sp>
+      <p:sp>
+        <p:nvSpPr>
+          <p:cNvPr id="4" name="Slide Number Placeholder 3"/>
+          <p:cNvSpPr>
+            <a:spLocks noGrp="1"/>
+          </p:cNvSpPr>
+          <p:nvPr>
+            <p:ph type="sldNum" sz="quarter" idx="12"/>
+          </p:nvPr>
+        </p:nvSpPr>
+        <p:spPr/>
+        <p:txBody>
+          <a:bodyPr/>
+          <a:lstStyle/>
+          <a:p>
+            <a:pPr>
+              <a:defRPr/>
+            </a:pPr>
+            <a:fld id="{3DD022D9-6EEB-4EF0-B01F-D2A689606F0A}" type="slidenum">
+              <a:rPr lang="en-US" smtClean="0"/>
+              <a:pPr>
+                <a:defRPr/>
+              </a:pPr>
+              <a:t>5</a:t>
+            </a:fld>
+            <a:endParaRPr lang="en-US" dirty="0"/>
+          </a:p>
+        </p:txBody>
+      </p:sp>
+    </p:spTree>
+    <p:extLst>
+      <p:ext uri="{BB962C8B-B14F-4D97-AF65-F5344CB8AC3E}">
+        <p14:creationId xmlns:p14="http://schemas.microsoft.com/office/powerpoint/2010/main" val="39347187"/>
+      </p:ext>
+    </p:extLst>
+  </p:cSld>
+  <p:clrMapOvr>
+    <a:masterClrMapping/>
+  </p:clrMapOvr>
+  <p:timing>
+    <p:tnLst>
+      <p:par>
+        <p:cTn id="1" dur="indefinite" restart="never" nodeType="tmRoot"/>
+      </p:par>
+    </p:tnLst>
+  </p:timing>
+</p:sld>
+</file>
+
+<file path=ppt/slides/slide6.xml><?xml version="1.0" encoding="utf-8"?>
 <p:sld xmlns:a="http://schemas.openxmlformats.org/drawingml/2006/main" xmlns:r="http://schemas.openxmlformats.org/officeDocument/2006/relationships" xmlns:p="http://schemas.openxmlformats.org/presentationml/2006/main">
   <p:cSld>
     <p:spTree>
@@ -12579,101 +12978,6 @@
 </p:sld>
 </file>
 
-<file path=ppt/slides/slide6.xml><?xml version="1.0" encoding="utf-8"?>
-<p:sld xmlns:a="http://schemas.openxmlformats.org/drawingml/2006/main" xmlns:r="http://schemas.openxmlformats.org/officeDocument/2006/relationships" xmlns:p="http://schemas.openxmlformats.org/presentationml/2006/main">
-  <p:cSld>
-    <p:spTree>
-      <p:nvGrpSpPr>
-        <p:cNvPr id="1" name=""/>
-        <p:cNvGrpSpPr/>
-        <p:nvPr/>
-      </p:nvGrpSpPr>
-      <p:grpSpPr>
-        <a:xfrm>
-          <a:off x="0" y="0"/>
-          <a:ext cx="0" cy="0"/>
-          <a:chOff x="0" y="0"/>
-          <a:chExt cx="0" cy="0"/>
-        </a:xfrm>
-      </p:grpSpPr>
-      <p:sp>
-        <p:nvSpPr>
-          <p:cNvPr id="5" name="TextBox 4"/>
-          <p:cNvSpPr txBox="1"/>
-          <p:nvPr/>
-        </p:nvSpPr>
-        <p:spPr>
-          <a:xfrm>
-            <a:off x="2438400" y="2362200"/>
-            <a:ext cx="4006225" cy="1323439"/>
-          </a:xfrm>
-          <a:prstGeom prst="rect">
-            <a:avLst/>
-          </a:prstGeom>
-          <a:noFill/>
-        </p:spPr>
-        <p:txBody>
-          <a:bodyPr wrap="none" rtlCol="0">
-            <a:spAutoFit/>
-          </a:bodyPr>
-          <a:lstStyle/>
-          <a:p>
-            <a:pPr algn="ctr"/>
-            <a:r>
-              <a:rPr lang="en-US" sz="4000" dirty="0" smtClean="0">
-                <a:solidFill>
-                  <a:schemeClr val="bg1"/>
-                </a:solidFill>
-              </a:rPr>
-              <a:t>Code:</a:t>
-            </a:r>
-          </a:p>
-          <a:p>
-            <a:pPr algn="ctr"/>
-            <a:r>
-              <a:rPr lang="en-US" sz="4000" dirty="0" err="1" smtClean="0">
-                <a:solidFill>
-                  <a:schemeClr val="bg1"/>
-                </a:solidFill>
-              </a:rPr>
-              <a:t>RabbitMQ</a:t>
-            </a:r>
-            <a:r>
-              <a:rPr lang="en-US" sz="4000" dirty="0" smtClean="0">
-                <a:solidFill>
-                  <a:schemeClr val="bg1"/>
-                </a:solidFill>
-              </a:rPr>
-              <a:t> Demo</a:t>
-            </a:r>
-            <a:endParaRPr lang="en-US" sz="4000" dirty="0">
-              <a:solidFill>
-                <a:schemeClr val="bg1"/>
-              </a:solidFill>
-            </a:endParaRPr>
-          </a:p>
-        </p:txBody>
-      </p:sp>
-    </p:spTree>
-    <p:extLst>
-      <p:ext uri="{BB962C8B-B14F-4D97-AF65-F5344CB8AC3E}">
-        <p14:creationId xmlns:p14="http://schemas.microsoft.com/office/powerpoint/2010/main" val="3863202606"/>
-      </p:ext>
-    </p:extLst>
-  </p:cSld>
-  <p:clrMapOvr>
-    <a:masterClrMapping/>
-  </p:clrMapOvr>
-  <p:timing>
-    <p:tnLst>
-      <p:par>
-        <p:cTn id="1" dur="indefinite" restart="never" nodeType="tmRoot"/>
-      </p:par>
-    </p:tnLst>
-  </p:timing>
-</p:sld>
-</file>
-
 <file path=ppt/slides/slide7.xml><?xml version="1.0" encoding="utf-8"?>
 <p:sld xmlns:a="http://schemas.openxmlformats.org/drawingml/2006/main" xmlns:r="http://schemas.openxmlformats.org/officeDocument/2006/relationships" xmlns:p="http://schemas.openxmlformats.org/presentationml/2006/main">
   <p:cSld>
@@ -12699,8 +13003,8 @@
         </p:nvSpPr>
         <p:spPr>
           <a:xfrm>
-            <a:off x="3200400" y="2895600"/>
-            <a:ext cx="2521844" cy="707886"/>
+            <a:off x="2438400" y="2362200"/>
+            <a:ext cx="4006225" cy="1323439"/>
           </a:xfrm>
           <a:prstGeom prst="rect">
             <a:avLst/>
@@ -12715,12 +13019,31 @@
           <a:p>
             <a:pPr algn="ctr"/>
             <a:r>
+              <a:rPr lang="en-US" sz="4000" dirty="0" smtClean="0">
+                <a:solidFill>
+                  <a:schemeClr val="bg1"/>
+                </a:solidFill>
+              </a:rPr>
+              <a:t>Code:</a:t>
+            </a:r>
+          </a:p>
+          <a:p>
+            <a:pPr algn="ctr"/>
+            <a:r>
               <a:rPr lang="en-US" sz="4000" dirty="0" err="1" smtClean="0">
                 <a:solidFill>
                   <a:schemeClr val="bg1"/>
                 </a:solidFill>
               </a:rPr>
-              <a:t>EasyNetQ</a:t>
+              <a:t>RabbitMQ</a:t>
+            </a:r>
+            <a:r>
+              <a:rPr lang="en-US" sz="4000" dirty="0" smtClean="0">
+                <a:solidFill>
+                  <a:schemeClr val="bg1"/>
+                </a:solidFill>
+              </a:rPr>
+              <a:t> Demo</a:t>
             </a:r>
             <a:endParaRPr lang="en-US" sz="4000" dirty="0">
               <a:solidFill>
@@ -12733,7 +13056,7 @@
     </p:spTree>
     <p:extLst>
       <p:ext uri="{BB962C8B-B14F-4D97-AF65-F5344CB8AC3E}">
-        <p14:creationId xmlns:p14="http://schemas.microsoft.com/office/powerpoint/2010/main" val="1630030280"/>
+        <p14:creationId xmlns:p14="http://schemas.microsoft.com/office/powerpoint/2010/main" val="3863202606"/>
       </p:ext>
     </p:extLst>
   </p:cSld>
@@ -12775,8 +13098,8 @@
         </p:nvSpPr>
         <p:spPr>
           <a:xfrm>
-            <a:off x="304800" y="2743200"/>
-            <a:ext cx="8369600" cy="707886"/>
+            <a:off x="3200400" y="2895600"/>
+            <a:ext cx="2521844" cy="707886"/>
           </a:xfrm>
           <a:prstGeom prst="rect">
             <a:avLst/>
@@ -12791,14 +13114,6 @@
           <a:p>
             <a:pPr algn="ctr"/>
             <a:r>
-              <a:rPr lang="en-US" sz="4000" dirty="0" smtClean="0">
-                <a:solidFill>
-                  <a:schemeClr val="bg1"/>
-                </a:solidFill>
-              </a:rPr>
-              <a:t>In </a:t>
-            </a:r>
-            <a:r>
               <a:rPr lang="en-US" sz="4000" dirty="0" err="1" smtClean="0">
                 <a:solidFill>
                   <a:schemeClr val="bg1"/>
@@ -12806,14 +13121,6 @@
               </a:rPr>
               <a:t>EasyNetQ</a:t>
             </a:r>
-            <a:r>
-              <a:rPr lang="en-US" sz="4000" dirty="0" smtClean="0">
-                <a:solidFill>
-                  <a:schemeClr val="bg1"/>
-                </a:solidFill>
-              </a:rPr>
-              <a:t>, messages are objects</a:t>
-            </a:r>
             <a:endParaRPr lang="en-US" sz="4000" dirty="0">
               <a:solidFill>
                 <a:schemeClr val="bg1"/>
@@ -12825,7 +13132,7 @@
     </p:spTree>
     <p:extLst>
       <p:ext uri="{BB962C8B-B14F-4D97-AF65-F5344CB8AC3E}">
-        <p14:creationId xmlns:p14="http://schemas.microsoft.com/office/powerpoint/2010/main" val="2125078179"/>
+        <p14:creationId xmlns:p14="http://schemas.microsoft.com/office/powerpoint/2010/main" val="1630030280"/>
       </p:ext>
     </p:extLst>
   </p:cSld>
@@ -12867,8 +13174,8 @@
         </p:nvSpPr>
         <p:spPr>
           <a:xfrm>
-            <a:off x="304800" y="838200"/>
-            <a:ext cx="8653301" cy="4401205"/>
+            <a:off x="304800" y="2743200"/>
+            <a:ext cx="8369600" cy="707886"/>
           </a:xfrm>
           <a:prstGeom prst="rect">
             <a:avLst/>
@@ -12876,12 +13183,20 @@
           <a:noFill/>
         </p:spPr>
         <p:txBody>
-          <a:bodyPr wrap="square" rtlCol="0">
+          <a:bodyPr wrap="none" rtlCol="0">
             <a:spAutoFit/>
           </a:bodyPr>
           <a:lstStyle/>
           <a:p>
             <a:pPr algn="ctr"/>
+            <a:r>
+              <a:rPr lang="en-US" sz="4000" dirty="0" smtClean="0">
+                <a:solidFill>
+                  <a:schemeClr val="bg1"/>
+                </a:solidFill>
+              </a:rPr>
+              <a:t>In </a:t>
+            </a:r>
             <a:r>
               <a:rPr lang="en-US" sz="4000" dirty="0" err="1" smtClean="0">
                 <a:solidFill>
@@ -12896,82 +13211,20 @@
                   <a:schemeClr val="bg1"/>
                 </a:solidFill>
               </a:rPr>
-              <a:t> Patterns:</a:t>
-            </a:r>
-          </a:p>
-          <a:p>
-            <a:pPr algn="ctr"/>
-            <a:endParaRPr lang="en-US" sz="4000" dirty="0" smtClean="0">
+              <a:t>, messages are objects</a:t>
+            </a:r>
+            <a:endParaRPr lang="en-US" sz="4000" dirty="0">
               <a:solidFill>
                 <a:schemeClr val="bg1"/>
               </a:solidFill>
             </a:endParaRPr>
           </a:p>
-          <a:p>
-            <a:pPr marL="742950" indent="-742950">
-              <a:buAutoNum type="arabicPeriod"/>
-            </a:pPr>
-            <a:r>
-              <a:rPr lang="en-US" sz="4000" dirty="0" smtClean="0">
-                <a:solidFill>
-                  <a:schemeClr val="bg1"/>
-                </a:solidFill>
-              </a:rPr>
-              <a:t>Send &amp; Receive</a:t>
-            </a:r>
-          </a:p>
-          <a:p>
-            <a:pPr marL="742950" indent="-742950">
-              <a:buAutoNum type="arabicPeriod"/>
-            </a:pPr>
-            <a:endParaRPr lang="en-US" sz="4000" dirty="0" smtClean="0">
-              <a:solidFill>
-                <a:schemeClr val="bg1"/>
-              </a:solidFill>
-            </a:endParaRPr>
-          </a:p>
-          <a:p>
-            <a:pPr marL="742950" indent="-742950">
-              <a:buAutoNum type="arabicPeriod"/>
-            </a:pPr>
-            <a:r>
-              <a:rPr lang="en-US" sz="4000" dirty="0" smtClean="0">
-                <a:solidFill>
-                  <a:schemeClr val="bg1"/>
-                </a:solidFill>
-              </a:rPr>
-              <a:t>Publish &amp; Subscribe</a:t>
-            </a:r>
-          </a:p>
-          <a:p>
-            <a:pPr marL="742950" indent="-742950">
-              <a:buAutoNum type="arabicPeriod"/>
-            </a:pPr>
-            <a:endParaRPr lang="en-US" sz="4000" dirty="0" smtClean="0">
-              <a:solidFill>
-                <a:schemeClr val="bg1"/>
-              </a:solidFill>
-            </a:endParaRPr>
-          </a:p>
-          <a:p>
-            <a:pPr marL="742950" indent="-742950">
-              <a:buAutoNum type="arabicPeriod"/>
-            </a:pPr>
-            <a:r>
-              <a:rPr lang="en-US" sz="4000" dirty="0" smtClean="0">
-                <a:solidFill>
-                  <a:schemeClr val="bg1"/>
-                </a:solidFill>
-              </a:rPr>
-              <a:t>Request &amp; Response</a:t>
-            </a:r>
-          </a:p>
         </p:txBody>
       </p:sp>
     </p:spTree>
     <p:extLst>
       <p:ext uri="{BB962C8B-B14F-4D97-AF65-F5344CB8AC3E}">
-        <p14:creationId xmlns:p14="http://schemas.microsoft.com/office/powerpoint/2010/main" val="2609970301"/>
+        <p14:creationId xmlns:p14="http://schemas.microsoft.com/office/powerpoint/2010/main" val="2125078179"/>
       </p:ext>
     </p:extLst>
   </p:cSld>
@@ -14117,18 +14370,18 @@
 </file>
 
 <file path=customXml/item1.xml><?xml version="1.0" encoding="utf-8"?>
+<p:properties xmlns:p="http://schemas.microsoft.com/office/2006/metadata/properties" xmlns:xsi="http://www.w3.org/2001/XMLSchema-instance">
+  <documentManagement/>
+</p:properties>
+</file>
+
+<file path=customXml/item2.xml><?xml version="1.0" encoding="utf-8"?>
 <?mso-contentType ?>
 <FormTemplates xmlns="http://schemas.microsoft.com/sharepoint/v3/contenttype/forms">
   <Display>DocumentLibraryForm</Display>
   <Edit>DocumentLibraryForm</Edit>
   <New>DocumentLibraryForm</New>
 </FormTemplates>
-</file>
-
-<file path=customXml/item2.xml><?xml version="1.0" encoding="utf-8"?>
-<p:properties xmlns:p="http://schemas.microsoft.com/office/2006/metadata/properties" xmlns:xsi="http://www.w3.org/2001/XMLSchema-instance">
-  <documentManagement/>
-</p:properties>
 </file>
 
 <file path=customXml/item3.xml><?xml version="1.0" encoding="utf-8"?>
@@ -14291,14 +14544,6 @@
 </file>
 
 <file path=customXml/itemProps1.xml><?xml version="1.0" encoding="utf-8"?>
-<ds:datastoreItem xmlns:ds="http://schemas.openxmlformats.org/officeDocument/2006/customXml" ds:itemID="{8C23FA9D-D7BA-4AFD-B85F-281750C62C01}">
-  <ds:schemaRefs>
-    <ds:schemaRef ds:uri="http://schemas.microsoft.com/sharepoint/v3/contenttype/forms"/>
-  </ds:schemaRefs>
-</ds:datastoreItem>
-</file>
-
-<file path=customXml/itemProps2.xml><?xml version="1.0" encoding="utf-8"?>
 <ds:datastoreItem xmlns:ds="http://schemas.openxmlformats.org/officeDocument/2006/customXml" ds:itemID="{07558391-8EE6-4E06-99C8-92B89A44F7E2}">
   <ds:schemaRefs>
     <ds:schemaRef ds:uri="http://schemas.microsoft.com/office/infopath/2007/PartnerControls"/>
@@ -14311,6 +14556,14 @@
     <ds:schemaRef ds:uri="f8ac541a-bba0-4917-b64a-f995323e0098"/>
     <ds:schemaRef ds:uri="0da6e460-5409-42fa-b61f-2f47ce404b8b"/>
     <ds:schemaRef ds:uri="http://purl.org/dc/terms/"/>
+  </ds:schemaRefs>
+</ds:datastoreItem>
+</file>
+
+<file path=customXml/itemProps2.xml><?xml version="1.0" encoding="utf-8"?>
+<ds:datastoreItem xmlns:ds="http://schemas.openxmlformats.org/officeDocument/2006/customXml" ds:itemID="{8C23FA9D-D7BA-4AFD-B85F-281750C62C01}">
+  <ds:schemaRefs>
+    <ds:schemaRef ds:uri="http://schemas.microsoft.com/sharepoint/v3/contenttype/forms"/>
   </ds:schemaRefs>
 </ds:datastoreItem>
 </file>

</xml_diff>

<commit_message>
tweaks to slide and code for presentation flow
</commit_message>
<xml_diff>
--- a/slides.pptx
+++ b/slides.pptx
@@ -264,7 +264,7 @@
               <a:pPr>
                 <a:defRPr/>
               </a:pPr>
-              <a:t>12/30/2015</a:t>
+              <a:t>1/5/2016</a:t>
             </a:fld>
             <a:endParaRPr lang="en-US"/>
           </a:p>
@@ -617,57 +617,7 @@
           <a:bodyPr/>
           <a:lstStyle/>
           <a:p>
-            <a:r>
-              <a:rPr lang="en-US" baseline="0" dirty="0" smtClean="0"/>
-              <a:t>I got into Rabbit because I had a problem that I need solved, not because it was a cool toy I wanted to play with.</a:t>
-            </a:r>
-          </a:p>
-          <a:p>
-            <a:endParaRPr lang="en-US" baseline="0" dirty="0" smtClean="0"/>
-          </a:p>
-          <a:p>
-            <a:pPr marL="0" marR="0" indent="0" algn="l" defTabSz="914400" rtl="0" eaLnBrk="0" fontAlgn="base" latinLnBrk="0" hangingPunct="0">
-              <a:lnSpc>
-                <a:spcPct val="100000"/>
-              </a:lnSpc>
-              <a:spcBef>
-                <a:spcPct val="30000"/>
-              </a:spcBef>
-              <a:spcAft>
-                <a:spcPct val="0"/>
-              </a:spcAft>
-              <a:buClrTx/>
-              <a:buSzTx/>
-              <a:buFontTx/>
-              <a:buNone/>
-              <a:tabLst/>
-              <a:defRPr/>
-            </a:pPr>
-            <a:r>
-              <a:rPr lang="en-US" dirty="0" smtClean="0"/>
-              <a:t>Queueing systems are powerful tools with lots of different</a:t>
-            </a:r>
-            <a:r>
-              <a:rPr lang="en-US" baseline="0" dirty="0" smtClean="0"/>
-              <a:t> ways you can do things.</a:t>
-            </a:r>
-          </a:p>
-          <a:p>
-            <a:r>
-              <a:rPr lang="en-US" baseline="0" dirty="0" smtClean="0"/>
-              <a:t>But It was intimidating to me. If there are a million ways to do it, chances are I would pick the wrong one.</a:t>
-            </a:r>
-            <a:endParaRPr lang="en-US" dirty="0" smtClean="0"/>
-          </a:p>
-          <a:p>
-            <a:r>
-              <a:rPr lang="en-US" baseline="0" dirty="0" smtClean="0"/>
-              <a:t>But I found that it doesn’t have to be. If you feel the same way now, then I want to show you that it’s easier than I thought.</a:t>
-            </a:r>
-            <a:endParaRPr lang="en-US" dirty="0" smtClean="0"/>
-          </a:p>
-          <a:p>
-            <a:endParaRPr lang="en-US" dirty="0"/>
+            <a:endParaRPr lang="en-US"/>
           </a:p>
         </p:txBody>
       </p:sp>
@@ -694,7 +644,7 @@
               <a:pPr>
                 <a:defRPr/>
               </a:pPr>
-              <a:t>2</a:t>
+              <a:t>1</a:t>
             </a:fld>
             <a:endParaRPr lang="en-US"/>
           </a:p>
@@ -703,7 +653,7 @@
     </p:spTree>
     <p:extLst>
       <p:ext uri="{BB962C8B-B14F-4D97-AF65-F5344CB8AC3E}">
-        <p14:creationId xmlns:p14="http://schemas.microsoft.com/office/powerpoint/2010/main" val="1031107804"/>
+        <p14:creationId xmlns:p14="http://schemas.microsoft.com/office/powerpoint/2010/main" val="1124727117"/>
       </p:ext>
     </p:extLst>
   </p:cSld>
@@ -759,47 +709,21 @@
           <a:p>
             <a:r>
               <a:rPr lang="en-US" dirty="0" smtClean="0"/>
-              <a:t>You put a message A on the queue</a:t>
+              <a:t>Here are three patterns that </a:t>
+            </a:r>
+            <a:r>
+              <a:rPr lang="en-US" dirty="0" err="1" smtClean="0"/>
+              <a:t>EasyNetQ</a:t>
+            </a:r>
+            <a:r>
+              <a:rPr lang="en-US" dirty="0" smtClean="0"/>
+              <a:t> handles</a:t>
             </a:r>
             <a:r>
               <a:rPr lang="en-US" baseline="0" dirty="0" smtClean="0"/>
-              <a:t> (send)</a:t>
-            </a:r>
-          </a:p>
-          <a:p>
-            <a:r>
-              <a:rPr lang="en-US" baseline="0" dirty="0" smtClean="0"/>
-              <a:t>You take a message A off the queue (receive)</a:t>
-            </a:r>
-          </a:p>
-          <a:p>
-            <a:r>
-              <a:rPr lang="en-US" baseline="0" dirty="0" smtClean="0"/>
-              <a:t>The queue is durable, so it will persist in the queue after it is sent.</a:t>
-            </a:r>
-          </a:p>
-          <a:p>
-            <a:endParaRPr lang="en-US" dirty="0" smtClean="0"/>
-          </a:p>
-          <a:p>
-            <a:r>
-              <a:rPr lang="en-US" dirty="0" smtClean="0"/>
-              <a:t>With this pattern, you can put</a:t>
-            </a:r>
-            <a:r>
-              <a:rPr lang="en-US" baseline="0" dirty="0" smtClean="0"/>
-              <a:t> any number of message types on the same queue. Receivers who subscribe to the queue will process the message types separately.</a:t>
-            </a:r>
-          </a:p>
-          <a:p>
-            <a:endParaRPr lang="en-US" baseline="0" dirty="0" smtClean="0"/>
-          </a:p>
-          <a:p>
-            <a:r>
-              <a:rPr lang="en-US" baseline="0" dirty="0" smtClean="0"/>
-              <a:t>You don’t have to put everything on the same queue, but you can.</a:t>
-            </a:r>
-            <a:endParaRPr lang="en-US" dirty="0" smtClean="0"/>
+              <a:t> for us.</a:t>
+            </a:r>
+            <a:endParaRPr lang="en-US" dirty="0"/>
           </a:p>
         </p:txBody>
       </p:sp>
@@ -826,7 +750,7 @@
               <a:pPr>
                 <a:defRPr/>
               </a:pPr>
-              <a:t>11</a:t>
+              <a:t>10</a:t>
             </a:fld>
             <a:endParaRPr lang="en-US"/>
           </a:p>
@@ -835,7 +759,7 @@
     </p:spTree>
     <p:extLst>
       <p:ext uri="{BB962C8B-B14F-4D97-AF65-F5344CB8AC3E}">
-        <p14:creationId xmlns:p14="http://schemas.microsoft.com/office/powerpoint/2010/main" val="1174759699"/>
+        <p14:creationId xmlns:p14="http://schemas.microsoft.com/office/powerpoint/2010/main" val="329760597"/>
       </p:ext>
     </p:extLst>
   </p:cSld>
@@ -891,42 +815,47 @@
           <a:p>
             <a:r>
               <a:rPr lang="en-US" dirty="0" smtClean="0"/>
-              <a:t>You publish a message</a:t>
-            </a:r>
+              <a:t>You put a message A on the queue</a:t>
+            </a:r>
+            <a:r>
+              <a:rPr lang="en-US" baseline="0" dirty="0" smtClean="0"/>
+              <a:t> (send)</a:t>
+            </a:r>
+          </a:p>
+          <a:p>
+            <a:r>
+              <a:rPr lang="en-US" baseline="0" dirty="0" smtClean="0"/>
+              <a:t>You take a message A off the queue (receive)</a:t>
+            </a:r>
+          </a:p>
+          <a:p>
+            <a:r>
+              <a:rPr lang="en-US" baseline="0" dirty="0" smtClean="0"/>
+              <a:t>The queue is durable, so it will persist in the queue after it is sent.</a:t>
+            </a:r>
+          </a:p>
+          <a:p>
+            <a:endParaRPr lang="en-US" dirty="0" smtClean="0"/>
           </a:p>
           <a:p>
             <a:r>
               <a:rPr lang="en-US" dirty="0" smtClean="0"/>
-              <a:t>Anyone who is subscribing</a:t>
+              <a:t>With this pattern, you can put</a:t>
             </a:r>
             <a:r>
               <a:rPr lang="en-US" baseline="0" dirty="0" smtClean="0"/>
-              <a:t> will receive the message.</a:t>
-            </a:r>
+              <a:t> any number of message types on the same queue. Receivers who subscribe to the queue will process the message types separately.</a:t>
+            </a:r>
+          </a:p>
+          <a:p>
+            <a:endParaRPr lang="en-US" baseline="0" dirty="0" smtClean="0"/>
           </a:p>
           <a:p>
             <a:r>
               <a:rPr lang="en-US" baseline="0" dirty="0" smtClean="0"/>
-              <a:t>You can have multiple subscribers for 2 different reasons:</a:t>
-            </a:r>
-          </a:p>
-          <a:p>
-            <a:pPr marL="228600" indent="-228600">
-              <a:buAutoNum type="arabicParenR"/>
-            </a:pPr>
-            <a:r>
-              <a:rPr lang="en-US" baseline="0" dirty="0" smtClean="0"/>
-              <a:t>Scaling (more processes, the more messages you can process)</a:t>
-            </a:r>
-          </a:p>
-          <a:p>
-            <a:pPr marL="228600" indent="-228600">
-              <a:buAutoNum type="arabicParenR"/>
-            </a:pPr>
-            <a:r>
-              <a:rPr lang="en-US" baseline="0" dirty="0" smtClean="0"/>
-              <a:t>Doing multiple things with the same message (notify the seller, process the payment, notify the warehouse)</a:t>
-            </a:r>
+              <a:t>You don’t have to put everything on the same queue, but you can.</a:t>
+            </a:r>
+            <a:endParaRPr lang="en-US" dirty="0" smtClean="0"/>
           </a:p>
         </p:txBody>
       </p:sp>
@@ -953,7 +882,7 @@
               <a:pPr>
                 <a:defRPr/>
               </a:pPr>
-              <a:t>12</a:t>
+              <a:t>11</a:t>
             </a:fld>
             <a:endParaRPr lang="en-US"/>
           </a:p>
@@ -962,7 +891,7 @@
     </p:spTree>
     <p:extLst>
       <p:ext uri="{BB962C8B-B14F-4D97-AF65-F5344CB8AC3E}">
-        <p14:creationId xmlns:p14="http://schemas.microsoft.com/office/powerpoint/2010/main" val="3615418977"/>
+        <p14:creationId xmlns:p14="http://schemas.microsoft.com/office/powerpoint/2010/main" val="1174759699"/>
       </p:ext>
     </p:extLst>
   </p:cSld>
@@ -1018,39 +947,42 @@
           <a:p>
             <a:r>
               <a:rPr lang="en-US" dirty="0" smtClean="0"/>
-              <a:t>You can use</a:t>
+              <a:t>You publish a message</a:t>
+            </a:r>
+          </a:p>
+          <a:p>
+            <a:r>
+              <a:rPr lang="en-US" dirty="0" smtClean="0"/>
+              <a:t>Anyone who is subscribing</a:t>
             </a:r>
             <a:r>
               <a:rPr lang="en-US" baseline="0" dirty="0" smtClean="0"/>
-              <a:t> </a:t>
-            </a:r>
-            <a:r>
-              <a:rPr lang="en-US" baseline="0" dirty="0" err="1" smtClean="0"/>
-              <a:t>EasyNetQ</a:t>
-            </a:r>
+              <a:t> will receive the message.</a:t>
+            </a:r>
+          </a:p>
+          <a:p>
             <a:r>
               <a:rPr lang="en-US" baseline="0" dirty="0" smtClean="0"/>
-              <a:t> to send a message as a request, and then wait for the response.</a:t>
-            </a:r>
-          </a:p>
-          <a:p>
+              <a:t>You can have multiple subscribers for 2 different reasons:</a:t>
+            </a:r>
+          </a:p>
+          <a:p>
+            <a:pPr marL="228600" indent="-228600">
+              <a:buAutoNum type="arabicParenR"/>
+            </a:pPr>
             <a:r>
               <a:rPr lang="en-US" baseline="0" dirty="0" smtClean="0"/>
-              <a:t>It’s like a remote method call.</a:t>
-            </a:r>
-          </a:p>
-          <a:p>
+              <a:t>Scaling (more processes, the more messages you can process)</a:t>
+            </a:r>
+          </a:p>
+          <a:p>
+            <a:pPr marL="228600" indent="-228600">
+              <a:buAutoNum type="arabicParenR"/>
+            </a:pPr>
             <a:r>
               <a:rPr lang="en-US" baseline="0" dirty="0" smtClean="0"/>
-              <a:t>You can do it as a blocking call or as an asynchronous call.</a:t>
-            </a:r>
-          </a:p>
-          <a:p>
-            <a:r>
-              <a:rPr lang="en-US" baseline="0" dirty="0" smtClean="0"/>
-              <a:t>This is pretty cool, but I’m not going to demo it today unless we have time. Talk to me afterwards if this is something you’re interested in.</a:t>
-            </a:r>
-            <a:endParaRPr lang="en-US" dirty="0"/>
+              <a:t>Doing multiple things with the same message (notify the seller, process the payment, notify the warehouse)</a:t>
+            </a:r>
           </a:p>
         </p:txBody>
       </p:sp>
@@ -1077,7 +1009,7 @@
               <a:pPr>
                 <a:defRPr/>
               </a:pPr>
-              <a:t>13</a:t>
+              <a:t>12</a:t>
             </a:fld>
             <a:endParaRPr lang="en-US"/>
           </a:p>
@@ -1086,7 +1018,7 @@
     </p:spTree>
     <p:extLst>
       <p:ext uri="{BB962C8B-B14F-4D97-AF65-F5344CB8AC3E}">
-        <p14:creationId xmlns:p14="http://schemas.microsoft.com/office/powerpoint/2010/main" val="3672246787"/>
+        <p14:creationId xmlns:p14="http://schemas.microsoft.com/office/powerpoint/2010/main" val="3615418977"/>
       </p:ext>
     </p:extLst>
   </p:cSld>
@@ -1142,11 +1074,37 @@
           <a:p>
             <a:r>
               <a:rPr lang="en-US" dirty="0" smtClean="0"/>
-              <a:t>I’m not going to cover</a:t>
+              <a:t>You can use</a:t>
             </a:r>
             <a:r>
               <a:rPr lang="en-US" baseline="0" dirty="0" smtClean="0"/>
-              <a:t> #3, but I do have code samples for it if you are interested in checking it out on your own.</a:t>
+              <a:t> </a:t>
+            </a:r>
+            <a:r>
+              <a:rPr lang="en-US" baseline="0" dirty="0" err="1" smtClean="0"/>
+              <a:t>EasyNetQ</a:t>
+            </a:r>
+            <a:r>
+              <a:rPr lang="en-US" baseline="0" dirty="0" smtClean="0"/>
+              <a:t> to send a message as a request, and then wait for the response.</a:t>
+            </a:r>
+          </a:p>
+          <a:p>
+            <a:r>
+              <a:rPr lang="en-US" baseline="0" dirty="0" smtClean="0"/>
+              <a:t>It’s like a remote method call.</a:t>
+            </a:r>
+          </a:p>
+          <a:p>
+            <a:r>
+              <a:rPr lang="en-US" baseline="0" dirty="0" smtClean="0"/>
+              <a:t>You can do it as a blocking call or as an asynchronous call.</a:t>
+            </a:r>
+          </a:p>
+          <a:p>
+            <a:r>
+              <a:rPr lang="en-US" baseline="0" dirty="0" smtClean="0"/>
+              <a:t>This is pretty cool, but I’m not going to demo it today unless we have time. Talk to me afterwards if this is something you’re interested in.</a:t>
             </a:r>
             <a:endParaRPr lang="en-US" dirty="0"/>
           </a:p>
@@ -1175,7 +1133,7 @@
               <a:pPr>
                 <a:defRPr/>
               </a:pPr>
-              <a:t>14</a:t>
+              <a:t>13</a:t>
             </a:fld>
             <a:endParaRPr lang="en-US"/>
           </a:p>
@@ -1184,7 +1142,7 @@
     </p:spTree>
     <p:extLst>
       <p:ext uri="{BB962C8B-B14F-4D97-AF65-F5344CB8AC3E}">
-        <p14:creationId xmlns:p14="http://schemas.microsoft.com/office/powerpoint/2010/main" val="2587942622"/>
+        <p14:creationId xmlns:p14="http://schemas.microsoft.com/office/powerpoint/2010/main" val="3672246787"/>
       </p:ext>
     </p:extLst>
   </p:cSld>
@@ -1240,113 +1198,13 @@
           <a:p>
             <a:r>
               <a:rPr lang="en-US" dirty="0" smtClean="0"/>
-              <a:t>At</a:t>
+              <a:t>I’m not going to cover</a:t>
             </a:r>
             <a:r>
               <a:rPr lang="en-US" baseline="0" dirty="0" smtClean="0"/>
-              <a:t> last </a:t>
-            </a:r>
-            <a:r>
-              <a:rPr lang="en-US" baseline="0" dirty="0" err="1" smtClean="0"/>
-              <a:t>CodeMash</a:t>
-            </a:r>
-            <a:r>
-              <a:rPr lang="en-US" baseline="0" dirty="0" smtClean="0"/>
-              <a:t>, I was inspired to create an open source project, </a:t>
-            </a:r>
-            <a:r>
-              <a:rPr lang="en-US" baseline="0" dirty="0" err="1" smtClean="0"/>
-              <a:t>EmpiriCall</a:t>
-            </a:r>
-            <a:r>
-              <a:rPr lang="en-US" baseline="0" dirty="0" smtClean="0"/>
-              <a:t>. It’s still a work in progress.</a:t>
-            </a:r>
-          </a:p>
-          <a:p>
-            <a:endParaRPr lang="en-US" baseline="0" dirty="0" smtClean="0"/>
-          </a:p>
-          <a:p>
-            <a:r>
-              <a:rPr lang="en-US" baseline="0" dirty="0" smtClean="0"/>
-              <a:t>At Heuristics, we mainly work on a product called </a:t>
-            </a:r>
-            <a:r>
-              <a:rPr lang="en-US" baseline="0" dirty="0" err="1" smtClean="0"/>
-              <a:t>LearningBuilder</a:t>
-            </a:r>
-            <a:r>
-              <a:rPr lang="en-US" baseline="0" dirty="0" smtClean="0"/>
-              <a:t>. It’s a large, complex, highly configurable system with a lot of features.</a:t>
-            </a:r>
-          </a:p>
-          <a:p>
-            <a:endParaRPr lang="en-US" baseline="0" dirty="0" smtClean="0"/>
-          </a:p>
-          <a:p>
-            <a:r>
-              <a:rPr lang="en-US" baseline="0" dirty="0" smtClean="0"/>
-              <a:t>I wanted to answer some questions about </a:t>
-            </a:r>
-            <a:r>
-              <a:rPr lang="en-US" baseline="0" dirty="0" err="1" smtClean="0"/>
-              <a:t>LearningBuilder</a:t>
-            </a:r>
-            <a:r>
-              <a:rPr lang="en-US" baseline="0" dirty="0" smtClean="0"/>
-              <a:t>.</a:t>
-            </a:r>
-          </a:p>
-          <a:p>
-            <a:pPr marL="228600" indent="-228600">
-              <a:buAutoNum type="arabicParenR"/>
-            </a:pPr>
-            <a:r>
-              <a:rPr lang="en-US" baseline="0" dirty="0" smtClean="0"/>
-              <a:t>Which features are being used?</a:t>
-            </a:r>
-          </a:p>
-          <a:p>
-            <a:pPr marL="228600" indent="-228600">
-              <a:buAutoNum type="arabicParenR"/>
-            </a:pPr>
-            <a:r>
-              <a:rPr lang="en-US" baseline="0" dirty="0" smtClean="0"/>
-              <a:t>Which features are not being used (or barely being used)?</a:t>
-            </a:r>
-          </a:p>
-          <a:p>
-            <a:pPr marL="228600" indent="-228600">
-              <a:buAutoNum type="arabicParenR"/>
-            </a:pPr>
-            <a:r>
-              <a:rPr lang="en-US" baseline="0" dirty="0" smtClean="0"/>
-              <a:t>Which users are using which features?</a:t>
-            </a:r>
-          </a:p>
-          <a:p>
-            <a:pPr marL="228600" indent="-228600">
-              <a:buAutoNum type="arabicParenR"/>
-            </a:pPr>
-            <a:r>
-              <a:rPr lang="en-US" baseline="0" dirty="0" smtClean="0"/>
-              <a:t>Which customers are using which features?</a:t>
-            </a:r>
-          </a:p>
-          <a:p>
-            <a:pPr marL="228600" indent="-228600">
-              <a:buAutoNum type="arabicParenR"/>
-            </a:pPr>
-            <a:endParaRPr lang="en-US" baseline="0" dirty="0" smtClean="0"/>
-          </a:p>
-          <a:p>
-            <a:pPr marL="0" indent="0">
-              <a:buNone/>
-            </a:pPr>
-            <a:r>
-              <a:rPr lang="en-US" baseline="0" dirty="0" smtClean="0"/>
-              <a:t>I could guess, talk to customers, talk to the BAs, sales, etc. And that’s important. But I also want to be able to look at the actual usage, and have empirical answers to those questions. This data can help inform decisions for testing, refactoring, sales, pricing.</a:t>
-            </a:r>
+              <a:t> #3, but I do have code samples for it if you are interested in checking it out on your own.</a:t>
+            </a:r>
+            <a:endParaRPr lang="en-US" dirty="0"/>
           </a:p>
         </p:txBody>
       </p:sp>
@@ -1373,7 +1231,7 @@
               <a:pPr>
                 <a:defRPr/>
               </a:pPr>
-              <a:t>15</a:t>
+              <a:t>14</a:t>
             </a:fld>
             <a:endParaRPr lang="en-US"/>
           </a:p>
@@ -1382,7 +1240,7 @@
     </p:spTree>
     <p:extLst>
       <p:ext uri="{BB962C8B-B14F-4D97-AF65-F5344CB8AC3E}">
-        <p14:creationId xmlns:p14="http://schemas.microsoft.com/office/powerpoint/2010/main" val="1152442700"/>
+        <p14:creationId xmlns:p14="http://schemas.microsoft.com/office/powerpoint/2010/main" val="2587942622"/>
       </p:ext>
     </p:extLst>
   </p:cSld>
@@ -1433,239 +1291,118 @@
         </p:nvSpPr>
         <p:spPr/>
         <p:txBody>
-          <a:bodyPr>
-            <a:normAutofit fontScale="92500"/>
-          </a:bodyPr>
+          <a:bodyPr/>
           <a:lstStyle/>
           <a:p>
-            <a:pPr marL="0" marR="0" indent="0" algn="l" defTabSz="914400" rtl="0" eaLnBrk="0" fontAlgn="base" latinLnBrk="0" hangingPunct="0">
-              <a:lnSpc>
-                <a:spcPct val="100000"/>
-              </a:lnSpc>
-              <a:spcBef>
-                <a:spcPct val="30000"/>
-              </a:spcBef>
-              <a:spcAft>
-                <a:spcPct val="0"/>
-              </a:spcAft>
-              <a:buClrTx/>
-              <a:buSzTx/>
-              <a:buFontTx/>
-              <a:buNone/>
-              <a:tabLst/>
-              <a:defRPr/>
+            <a:r>
+              <a:rPr lang="en-US" dirty="0" smtClean="0"/>
+              <a:t>At</a:t>
+            </a:r>
+            <a:r>
+              <a:rPr lang="en-US" baseline="0" dirty="0" smtClean="0"/>
+              <a:t> last </a:t>
+            </a:r>
+            <a:r>
+              <a:rPr lang="en-US" baseline="0" dirty="0" err="1" smtClean="0"/>
+              <a:t>CodeMash</a:t>
+            </a:r>
+            <a:r>
+              <a:rPr lang="en-US" baseline="0" dirty="0" smtClean="0"/>
+              <a:t>, I was inspired to create an open source project, </a:t>
+            </a:r>
+            <a:r>
+              <a:rPr lang="en-US" baseline="0" dirty="0" err="1" smtClean="0"/>
+              <a:t>EmpiriCall</a:t>
+            </a:r>
+            <a:r>
+              <a:rPr lang="en-US" baseline="0" dirty="0" smtClean="0"/>
+              <a:t>. It’s still a work in progress.</a:t>
+            </a:r>
+          </a:p>
+          <a:p>
+            <a:endParaRPr lang="en-US" baseline="0" dirty="0" smtClean="0"/>
+          </a:p>
+          <a:p>
+            <a:r>
+              <a:rPr lang="en-US" baseline="0" dirty="0" smtClean="0"/>
+              <a:t>At Heuristics, we mainly work on a product called </a:t>
+            </a:r>
+            <a:r>
+              <a:rPr lang="en-US" baseline="0" dirty="0" err="1" smtClean="0"/>
+              <a:t>LearningBuilder</a:t>
+            </a:r>
+            <a:r>
+              <a:rPr lang="en-US" baseline="0" dirty="0" smtClean="0"/>
+              <a:t>. It’s a large, complex, highly configurable system with a lot of features.</a:t>
+            </a:r>
+          </a:p>
+          <a:p>
+            <a:endParaRPr lang="en-US" baseline="0" dirty="0" smtClean="0"/>
+          </a:p>
+          <a:p>
+            <a:r>
+              <a:rPr lang="en-US" baseline="0" dirty="0" smtClean="0"/>
+              <a:t>I wanted to answer some questions about </a:t>
+            </a:r>
+            <a:r>
+              <a:rPr lang="en-US" baseline="0" dirty="0" err="1" smtClean="0"/>
+              <a:t>LearningBuilder</a:t>
+            </a:r>
+            <a:r>
+              <a:rPr lang="en-US" baseline="0" dirty="0" smtClean="0"/>
+              <a:t>.</a:t>
+            </a:r>
+          </a:p>
+          <a:p>
+            <a:pPr marL="228600" indent="-228600">
+              <a:buAutoNum type="arabicParenR"/>
             </a:pPr>
             <a:r>
-              <a:rPr lang="en-US" dirty="0" smtClean="0"/>
-              <a:t>I’m sure I’m not the first to think of this, and maybe I’m wrong,</a:t>
-            </a:r>
-            <a:r>
               <a:rPr lang="en-US" baseline="0" dirty="0" smtClean="0"/>
-              <a:t> but here goes.</a:t>
-            </a:r>
-          </a:p>
-          <a:p>
-            <a:endParaRPr lang="en-US" dirty="0" smtClean="0"/>
-          </a:p>
-          <a:p>
-            <a:r>
-              <a:rPr lang="en-US" dirty="0" smtClean="0"/>
-              <a:t>My</a:t>
-            </a:r>
+              <a:t>Which features are being used?</a:t>
+            </a:r>
+          </a:p>
+          <a:p>
+            <a:pPr marL="228600" indent="-228600">
+              <a:buAutoNum type="arabicParenR"/>
+            </a:pPr>
             <a:r>
               <a:rPr lang="en-US" baseline="0" dirty="0" smtClean="0"/>
-              <a:t> central conceit is that there are features, and there are MVC actions. A feature consists of a bundle of MVC actions. I can track MVC action details, therefore, I can track features. (if I map them correctly).</a:t>
-            </a:r>
-            <a:endParaRPr lang="en-US" dirty="0" smtClean="0"/>
-          </a:p>
-          <a:p>
-            <a:endParaRPr lang="en-US" dirty="0" smtClean="0"/>
-          </a:p>
-          <a:p>
-            <a:r>
-              <a:rPr lang="en-US" dirty="0" smtClean="0"/>
-              <a:t>You</a:t>
-            </a:r>
+              <a:t>Which features are not being used (or barely being used)?</a:t>
+            </a:r>
+          </a:p>
+          <a:p>
+            <a:pPr marL="228600" indent="-228600">
+              <a:buAutoNum type="arabicParenR"/>
+            </a:pPr>
             <a:r>
               <a:rPr lang="en-US" baseline="0" dirty="0" smtClean="0"/>
-              <a:t> might think a logging framework or Google Analytics could do this, and maybe they can, but I don’t think those tools have this in mind. They also can’t report on what’s NOT being used very well.</a:t>
-            </a:r>
-            <a:endParaRPr lang="en-US" dirty="0" smtClean="0"/>
-          </a:p>
-          <a:p>
-            <a:pPr marL="0" marR="0" indent="0" algn="l" defTabSz="914400" rtl="0" eaLnBrk="0" fontAlgn="base" latinLnBrk="0" hangingPunct="0">
-              <a:lnSpc>
-                <a:spcPct val="100000"/>
-              </a:lnSpc>
-              <a:spcBef>
-                <a:spcPct val="30000"/>
-              </a:spcBef>
-              <a:spcAft>
-                <a:spcPct val="0"/>
-              </a:spcAft>
-              <a:buClrTx/>
-              <a:buSzTx/>
-              <a:buFontTx/>
-              <a:buNone/>
-              <a:tabLst/>
-              <a:defRPr/>
+              <a:t>Which users are using which features?</a:t>
+            </a:r>
+          </a:p>
+          <a:p>
+            <a:pPr marL="228600" indent="-228600">
+              <a:buAutoNum type="arabicParenR"/>
+            </a:pPr>
+            <a:r>
+              <a:rPr lang="en-US" baseline="0" dirty="0" smtClean="0"/>
+              <a:t>Which customers are using which features?</a:t>
+            </a:r>
+          </a:p>
+          <a:p>
+            <a:pPr marL="228600" indent="-228600">
+              <a:buAutoNum type="arabicParenR"/>
             </a:pPr>
             <a:endParaRPr lang="en-US" baseline="0" dirty="0" smtClean="0"/>
           </a:p>
           <a:p>
-            <a:pPr marL="0" marR="0" indent="0" algn="l" defTabSz="914400" rtl="0" eaLnBrk="0" fontAlgn="base" latinLnBrk="0" hangingPunct="0">
-              <a:lnSpc>
-                <a:spcPct val="100000"/>
-              </a:lnSpc>
-              <a:spcBef>
-                <a:spcPct val="30000"/>
-              </a:spcBef>
-              <a:spcAft>
-                <a:spcPct val="0"/>
-              </a:spcAft>
-              <a:buClrTx/>
-              <a:buSzTx/>
-              <a:buFontTx/>
+            <a:pPr marL="0" indent="0">
               <a:buNone/>
-              <a:tabLst/>
-              <a:defRPr/>
             </a:pPr>
             <a:r>
               <a:rPr lang="en-US" baseline="0" dirty="0" smtClean="0"/>
-              <a:t>I’m going to record every single MVC action and the user who is doing the action. I’m going to parse my MVC app to get a list of all the possible actions. I can also tie those actions to a “feature”, which is just an arbitrary string.</a:t>
-            </a:r>
-          </a:p>
-          <a:p>
-            <a:pPr marL="0" marR="0" indent="0" algn="l" defTabSz="914400" rtl="0" eaLnBrk="0" fontAlgn="base" latinLnBrk="0" hangingPunct="0">
-              <a:lnSpc>
-                <a:spcPct val="100000"/>
-              </a:lnSpc>
-              <a:spcBef>
-                <a:spcPct val="30000"/>
-              </a:spcBef>
-              <a:spcAft>
-                <a:spcPct val="0"/>
-              </a:spcAft>
-              <a:buClrTx/>
-              <a:buSzTx/>
-              <a:buFontTx/>
-              <a:buNone/>
-              <a:tabLst/>
-              <a:defRPr/>
-            </a:pPr>
-            <a:endParaRPr lang="en-US" baseline="0" dirty="0" smtClean="0"/>
-          </a:p>
-          <a:p>
-            <a:pPr marL="0" marR="0" indent="0" algn="l" defTabSz="914400" rtl="0" eaLnBrk="0" fontAlgn="base" latinLnBrk="0" hangingPunct="0">
-              <a:lnSpc>
-                <a:spcPct val="100000"/>
-              </a:lnSpc>
-              <a:spcBef>
-                <a:spcPct val="30000"/>
-              </a:spcBef>
-              <a:spcAft>
-                <a:spcPct val="0"/>
-              </a:spcAft>
-              <a:buClrTx/>
-              <a:buSzTx/>
-              <a:buFontTx/>
-              <a:buNone/>
-              <a:tabLst/>
-              <a:defRPr/>
-            </a:pPr>
-            <a:r>
-              <a:rPr lang="en-US" baseline="0" dirty="0" smtClean="0"/>
-              <a:t>An architect can see “hey, no one has used this action in 6 months, why not? Can we drop it?”</a:t>
-            </a:r>
-          </a:p>
-          <a:p>
-            <a:pPr marL="0" marR="0" indent="0" algn="l" defTabSz="914400" rtl="0" eaLnBrk="0" fontAlgn="base" latinLnBrk="0" hangingPunct="0">
-              <a:lnSpc>
-                <a:spcPct val="100000"/>
-              </a:lnSpc>
-              <a:spcBef>
-                <a:spcPct val="30000"/>
-              </a:spcBef>
-              <a:spcAft>
-                <a:spcPct val="0"/>
-              </a:spcAft>
-              <a:buClrTx/>
-              <a:buSzTx/>
-              <a:buFontTx/>
-              <a:buNone/>
-              <a:tabLst/>
-              <a:defRPr/>
-            </a:pPr>
-            <a:r>
-              <a:rPr lang="en-US" baseline="0" dirty="0" smtClean="0"/>
-              <a:t>A BA can see “Hey, this customer is using feature X a lot during a certain month? Why? Is there something missing?”</a:t>
-            </a:r>
-          </a:p>
-          <a:p>
-            <a:pPr marL="0" marR="0" indent="0" algn="l" defTabSz="914400" rtl="0" eaLnBrk="0" fontAlgn="base" latinLnBrk="0" hangingPunct="0">
-              <a:lnSpc>
-                <a:spcPct val="100000"/>
-              </a:lnSpc>
-              <a:spcBef>
-                <a:spcPct val="30000"/>
-              </a:spcBef>
-              <a:spcAft>
-                <a:spcPct val="0"/>
-              </a:spcAft>
-              <a:buClrTx/>
-              <a:buSzTx/>
-              <a:buFontTx/>
-              <a:buNone/>
-              <a:tabLst/>
-              <a:defRPr/>
-            </a:pPr>
-            <a:r>
-              <a:rPr lang="en-US" baseline="0" dirty="0" smtClean="0"/>
-              <a:t>Sales can see “Hey, only customer X is using feature Y, maybe we should sell it as a separate module.”</a:t>
-            </a:r>
-          </a:p>
-          <a:p>
-            <a:pPr marL="0" marR="0" indent="0" algn="l" defTabSz="914400" rtl="0" eaLnBrk="0" fontAlgn="base" latinLnBrk="0" hangingPunct="0">
-              <a:lnSpc>
-                <a:spcPct val="100000"/>
-              </a:lnSpc>
-              <a:spcBef>
-                <a:spcPct val="30000"/>
-              </a:spcBef>
-              <a:spcAft>
-                <a:spcPct val="0"/>
-              </a:spcAft>
-              <a:buClrTx/>
-              <a:buSzTx/>
-              <a:buFontTx/>
-              <a:buNone/>
-              <a:tabLst/>
-              <a:defRPr/>
-            </a:pPr>
-            <a:r>
-              <a:rPr lang="en-US" baseline="0" dirty="0" smtClean="0"/>
-              <a:t>A UX Designer can see “Hey, no one is using feature Z, maybe because it’s not discoverable enough”</a:t>
-            </a:r>
-          </a:p>
-          <a:p>
-            <a:pPr marL="0" marR="0" indent="0" algn="l" defTabSz="914400" rtl="0" eaLnBrk="0" fontAlgn="base" latinLnBrk="0" hangingPunct="0">
-              <a:lnSpc>
-                <a:spcPct val="100000"/>
-              </a:lnSpc>
-              <a:spcBef>
-                <a:spcPct val="30000"/>
-              </a:spcBef>
-              <a:spcAft>
-                <a:spcPct val="0"/>
-              </a:spcAft>
-              <a:buClrTx/>
-              <a:buSzTx/>
-              <a:buFontTx/>
-              <a:buNone/>
-              <a:tabLst/>
-              <a:defRPr/>
-            </a:pPr>
-            <a:endParaRPr lang="en-US" baseline="0" dirty="0" smtClean="0"/>
+              <a:t>I could guess, talk to customers, talk to the BAs, sales, etc. And that’s important. But I also want to be able to look at the actual usage, and have empirical answers to those questions. This data can help inform decisions for testing, refactoring, sales, pricing.</a:t>
+            </a:r>
           </a:p>
         </p:txBody>
       </p:sp>
@@ -1692,7 +1429,7 @@
               <a:pPr>
                 <a:defRPr/>
               </a:pPr>
-              <a:t>16</a:t>
+              <a:t>15</a:t>
             </a:fld>
             <a:endParaRPr lang="en-US"/>
           </a:p>
@@ -1701,7 +1438,7 @@
     </p:spTree>
     <p:extLst>
       <p:ext uri="{BB962C8B-B14F-4D97-AF65-F5344CB8AC3E}">
-        <p14:creationId xmlns:p14="http://schemas.microsoft.com/office/powerpoint/2010/main" val="1206815952"/>
+        <p14:creationId xmlns:p14="http://schemas.microsoft.com/office/powerpoint/2010/main" val="1152442700"/>
       </p:ext>
     </p:extLst>
   </p:cSld>
@@ -1752,7 +1489,9 @@
         </p:nvSpPr>
         <p:spPr/>
         <p:txBody>
-          <a:bodyPr/>
+          <a:bodyPr>
+            <a:normAutofit fontScale="92500"/>
+          </a:bodyPr>
           <a:lstStyle/>
           <a:p>
             <a:pPr marL="0" marR="0" indent="0" algn="l" defTabSz="914400" rtl="0" eaLnBrk="0" fontAlgn="base" latinLnBrk="0" hangingPunct="0">
@@ -1773,6 +1512,323 @@
               <a:defRPr/>
             </a:pPr>
             <a:r>
+              <a:rPr lang="en-US" dirty="0" smtClean="0"/>
+              <a:t>I’m sure I’m not the first to think of this, and maybe I’m wrong,</a:t>
+            </a:r>
+            <a:r>
+              <a:rPr lang="en-US" baseline="0" dirty="0" smtClean="0"/>
+              <a:t> but here goes.</a:t>
+            </a:r>
+          </a:p>
+          <a:p>
+            <a:endParaRPr lang="en-US" dirty="0" smtClean="0"/>
+          </a:p>
+          <a:p>
+            <a:r>
+              <a:rPr lang="en-US" dirty="0" smtClean="0"/>
+              <a:t>My</a:t>
+            </a:r>
+            <a:r>
+              <a:rPr lang="en-US" baseline="0" dirty="0" smtClean="0"/>
+              <a:t> central conceit is that there are features, and there are MVC actions. A feature consists of a bundle of MVC actions. I can track MVC action details, therefore, I can track features. (if I map them correctly).</a:t>
+            </a:r>
+            <a:endParaRPr lang="en-US" dirty="0" smtClean="0"/>
+          </a:p>
+          <a:p>
+            <a:endParaRPr lang="en-US" dirty="0" smtClean="0"/>
+          </a:p>
+          <a:p>
+            <a:r>
+              <a:rPr lang="en-US" dirty="0" smtClean="0"/>
+              <a:t>You</a:t>
+            </a:r>
+            <a:r>
+              <a:rPr lang="en-US" baseline="0" dirty="0" smtClean="0"/>
+              <a:t> might think a logging framework or Google Analytics could do this, and maybe they can, but I don’t think those tools have this in mind. They also can’t report on what’s NOT being used very well.</a:t>
+            </a:r>
+            <a:endParaRPr lang="en-US" dirty="0" smtClean="0"/>
+          </a:p>
+          <a:p>
+            <a:pPr marL="0" marR="0" indent="0" algn="l" defTabSz="914400" rtl="0" eaLnBrk="0" fontAlgn="base" latinLnBrk="0" hangingPunct="0">
+              <a:lnSpc>
+                <a:spcPct val="100000"/>
+              </a:lnSpc>
+              <a:spcBef>
+                <a:spcPct val="30000"/>
+              </a:spcBef>
+              <a:spcAft>
+                <a:spcPct val="0"/>
+              </a:spcAft>
+              <a:buClrTx/>
+              <a:buSzTx/>
+              <a:buFontTx/>
+              <a:buNone/>
+              <a:tabLst/>
+              <a:defRPr/>
+            </a:pPr>
+            <a:endParaRPr lang="en-US" baseline="0" dirty="0" smtClean="0"/>
+          </a:p>
+          <a:p>
+            <a:pPr marL="0" marR="0" indent="0" algn="l" defTabSz="914400" rtl="0" eaLnBrk="0" fontAlgn="base" latinLnBrk="0" hangingPunct="0">
+              <a:lnSpc>
+                <a:spcPct val="100000"/>
+              </a:lnSpc>
+              <a:spcBef>
+                <a:spcPct val="30000"/>
+              </a:spcBef>
+              <a:spcAft>
+                <a:spcPct val="0"/>
+              </a:spcAft>
+              <a:buClrTx/>
+              <a:buSzTx/>
+              <a:buFontTx/>
+              <a:buNone/>
+              <a:tabLst/>
+              <a:defRPr/>
+            </a:pPr>
+            <a:r>
+              <a:rPr lang="en-US" baseline="0" dirty="0" smtClean="0"/>
+              <a:t>I’m going to record every single MVC action and the user who is doing the action. I’m going to parse my MVC app to get a list of all the possible actions. I can also tie those actions to a “feature”, which is just an arbitrary string.</a:t>
+            </a:r>
+          </a:p>
+          <a:p>
+            <a:pPr marL="0" marR="0" indent="0" algn="l" defTabSz="914400" rtl="0" eaLnBrk="0" fontAlgn="base" latinLnBrk="0" hangingPunct="0">
+              <a:lnSpc>
+                <a:spcPct val="100000"/>
+              </a:lnSpc>
+              <a:spcBef>
+                <a:spcPct val="30000"/>
+              </a:spcBef>
+              <a:spcAft>
+                <a:spcPct val="0"/>
+              </a:spcAft>
+              <a:buClrTx/>
+              <a:buSzTx/>
+              <a:buFontTx/>
+              <a:buNone/>
+              <a:tabLst/>
+              <a:defRPr/>
+            </a:pPr>
+            <a:endParaRPr lang="en-US" baseline="0" dirty="0" smtClean="0"/>
+          </a:p>
+          <a:p>
+            <a:pPr marL="0" marR="0" indent="0" algn="l" defTabSz="914400" rtl="0" eaLnBrk="0" fontAlgn="base" latinLnBrk="0" hangingPunct="0">
+              <a:lnSpc>
+                <a:spcPct val="100000"/>
+              </a:lnSpc>
+              <a:spcBef>
+                <a:spcPct val="30000"/>
+              </a:spcBef>
+              <a:spcAft>
+                <a:spcPct val="0"/>
+              </a:spcAft>
+              <a:buClrTx/>
+              <a:buSzTx/>
+              <a:buFontTx/>
+              <a:buNone/>
+              <a:tabLst/>
+              <a:defRPr/>
+            </a:pPr>
+            <a:r>
+              <a:rPr lang="en-US" baseline="0" dirty="0" smtClean="0"/>
+              <a:t>An architect can see “hey, no one has used this action in 6 months, why not? Can we drop it?”</a:t>
+            </a:r>
+          </a:p>
+          <a:p>
+            <a:pPr marL="0" marR="0" indent="0" algn="l" defTabSz="914400" rtl="0" eaLnBrk="0" fontAlgn="base" latinLnBrk="0" hangingPunct="0">
+              <a:lnSpc>
+                <a:spcPct val="100000"/>
+              </a:lnSpc>
+              <a:spcBef>
+                <a:spcPct val="30000"/>
+              </a:spcBef>
+              <a:spcAft>
+                <a:spcPct val="0"/>
+              </a:spcAft>
+              <a:buClrTx/>
+              <a:buSzTx/>
+              <a:buFontTx/>
+              <a:buNone/>
+              <a:tabLst/>
+              <a:defRPr/>
+            </a:pPr>
+            <a:r>
+              <a:rPr lang="en-US" baseline="0" dirty="0" smtClean="0"/>
+              <a:t>A BA can see “Hey, this customer is using feature X a lot during a certain month? Why? Is there something missing?”</a:t>
+            </a:r>
+          </a:p>
+          <a:p>
+            <a:pPr marL="0" marR="0" indent="0" algn="l" defTabSz="914400" rtl="0" eaLnBrk="0" fontAlgn="base" latinLnBrk="0" hangingPunct="0">
+              <a:lnSpc>
+                <a:spcPct val="100000"/>
+              </a:lnSpc>
+              <a:spcBef>
+                <a:spcPct val="30000"/>
+              </a:spcBef>
+              <a:spcAft>
+                <a:spcPct val="0"/>
+              </a:spcAft>
+              <a:buClrTx/>
+              <a:buSzTx/>
+              <a:buFontTx/>
+              <a:buNone/>
+              <a:tabLst/>
+              <a:defRPr/>
+            </a:pPr>
+            <a:r>
+              <a:rPr lang="en-US" baseline="0" dirty="0" smtClean="0"/>
+              <a:t>Sales can see “Hey, only customer X is using feature Y, maybe we should sell it as a separate module.”</a:t>
+            </a:r>
+          </a:p>
+          <a:p>
+            <a:pPr marL="0" marR="0" indent="0" algn="l" defTabSz="914400" rtl="0" eaLnBrk="0" fontAlgn="base" latinLnBrk="0" hangingPunct="0">
+              <a:lnSpc>
+                <a:spcPct val="100000"/>
+              </a:lnSpc>
+              <a:spcBef>
+                <a:spcPct val="30000"/>
+              </a:spcBef>
+              <a:spcAft>
+                <a:spcPct val="0"/>
+              </a:spcAft>
+              <a:buClrTx/>
+              <a:buSzTx/>
+              <a:buFontTx/>
+              <a:buNone/>
+              <a:tabLst/>
+              <a:defRPr/>
+            </a:pPr>
+            <a:r>
+              <a:rPr lang="en-US" baseline="0" dirty="0" smtClean="0"/>
+              <a:t>A UX Designer can see “Hey, no one is using feature Z, maybe because it’s not discoverable enough”</a:t>
+            </a:r>
+          </a:p>
+          <a:p>
+            <a:pPr marL="0" marR="0" indent="0" algn="l" defTabSz="914400" rtl="0" eaLnBrk="0" fontAlgn="base" latinLnBrk="0" hangingPunct="0">
+              <a:lnSpc>
+                <a:spcPct val="100000"/>
+              </a:lnSpc>
+              <a:spcBef>
+                <a:spcPct val="30000"/>
+              </a:spcBef>
+              <a:spcAft>
+                <a:spcPct val="0"/>
+              </a:spcAft>
+              <a:buClrTx/>
+              <a:buSzTx/>
+              <a:buFontTx/>
+              <a:buNone/>
+              <a:tabLst/>
+              <a:defRPr/>
+            </a:pPr>
+            <a:endParaRPr lang="en-US" baseline="0" dirty="0" smtClean="0"/>
+          </a:p>
+        </p:txBody>
+      </p:sp>
+      <p:sp>
+        <p:nvSpPr>
+          <p:cNvPr id="4" name="Slide Number Placeholder 3"/>
+          <p:cNvSpPr>
+            <a:spLocks noGrp="1"/>
+          </p:cNvSpPr>
+          <p:nvPr>
+            <p:ph type="sldNum" sz="quarter" idx="10"/>
+          </p:nvPr>
+        </p:nvSpPr>
+        <p:spPr/>
+        <p:txBody>
+          <a:bodyPr/>
+          <a:lstStyle/>
+          <a:p>
+            <a:pPr>
+              <a:defRPr/>
+            </a:pPr>
+            <a:fld id="{8AF380C8-B354-427F-99E5-332FEB535C73}" type="slidenum">
+              <a:rPr lang="en-US" smtClean="0"/>
+              <a:pPr>
+                <a:defRPr/>
+              </a:pPr>
+              <a:t>16</a:t>
+            </a:fld>
+            <a:endParaRPr lang="en-US"/>
+          </a:p>
+        </p:txBody>
+      </p:sp>
+    </p:spTree>
+    <p:extLst>
+      <p:ext uri="{BB962C8B-B14F-4D97-AF65-F5344CB8AC3E}">
+        <p14:creationId xmlns:p14="http://schemas.microsoft.com/office/powerpoint/2010/main" val="1206815952"/>
+      </p:ext>
+    </p:extLst>
+  </p:cSld>
+  <p:clrMapOvr>
+    <a:masterClrMapping/>
+  </p:clrMapOvr>
+</p:notes>
+</file>
+
+<file path=ppt/notesSlides/notesSlide17.xml><?xml version="1.0" encoding="utf-8"?>
+<p:notes xmlns:a="http://schemas.openxmlformats.org/drawingml/2006/main" xmlns:r="http://schemas.openxmlformats.org/officeDocument/2006/relationships" xmlns:p="http://schemas.openxmlformats.org/presentationml/2006/main">
+  <p:cSld>
+    <p:spTree>
+      <p:nvGrpSpPr>
+        <p:cNvPr id="1" name=""/>
+        <p:cNvGrpSpPr/>
+        <p:nvPr/>
+      </p:nvGrpSpPr>
+      <p:grpSpPr>
+        <a:xfrm>
+          <a:off x="0" y="0"/>
+          <a:ext cx="0" cy="0"/>
+          <a:chOff x="0" y="0"/>
+          <a:chExt cx="0" cy="0"/>
+        </a:xfrm>
+      </p:grpSpPr>
+      <p:sp>
+        <p:nvSpPr>
+          <p:cNvPr id="2" name="Slide Image Placeholder 1"/>
+          <p:cNvSpPr>
+            <a:spLocks noGrp="1" noRot="1" noChangeAspect="1"/>
+          </p:cNvSpPr>
+          <p:nvPr>
+            <p:ph type="sldImg"/>
+          </p:nvPr>
+        </p:nvSpPr>
+        <p:spPr/>
+      </p:sp>
+      <p:sp>
+        <p:nvSpPr>
+          <p:cNvPr id="3" name="Notes Placeholder 2"/>
+          <p:cNvSpPr>
+            <a:spLocks noGrp="1"/>
+          </p:cNvSpPr>
+          <p:nvPr>
+            <p:ph type="body" idx="1"/>
+          </p:nvPr>
+        </p:nvSpPr>
+        <p:spPr/>
+        <p:txBody>
+          <a:bodyPr/>
+          <a:lstStyle/>
+          <a:p>
+            <a:pPr marL="0" marR="0" indent="0" algn="l" defTabSz="914400" rtl="0" eaLnBrk="0" fontAlgn="base" latinLnBrk="0" hangingPunct="0">
+              <a:lnSpc>
+                <a:spcPct val="100000"/>
+              </a:lnSpc>
+              <a:spcBef>
+                <a:spcPct val="30000"/>
+              </a:spcBef>
+              <a:spcAft>
+                <a:spcPct val="0"/>
+              </a:spcAft>
+              <a:buClrTx/>
+              <a:buSzTx/>
+              <a:buFontTx/>
+              <a:buNone/>
+              <a:tabLst/>
+              <a:defRPr/>
+            </a:pPr>
+            <a:r>
               <a:rPr lang="en-US" baseline="0" dirty="0" smtClean="0"/>
               <a:t>That’s my vision, anyway. Let me show it to you in action, on </a:t>
             </a:r>
@@ -1843,7 +1899,7 @@
 </p:notes>
 </file>
 
-<file path=ppt/notesSlides/notesSlide17.xml><?xml version="1.0" encoding="utf-8"?>
+<file path=ppt/notesSlides/notesSlide18.xml><?xml version="1.0" encoding="utf-8"?>
 <p:notes xmlns:a="http://schemas.openxmlformats.org/drawingml/2006/main" xmlns:r="http://schemas.openxmlformats.org/officeDocument/2006/relationships" xmlns:p="http://schemas.openxmlformats.org/presentationml/2006/main">
   <p:cSld>
     <p:spTree>
@@ -1991,19 +2047,59 @@
         </p:nvSpPr>
         <p:spPr/>
         <p:txBody>
-          <a:bodyPr>
-            <a:normAutofit/>
-          </a:bodyPr>
+          <a:bodyPr/>
           <a:lstStyle/>
           <a:p>
             <a:r>
+              <a:rPr lang="en-US" baseline="0" dirty="0" smtClean="0"/>
+              <a:t>I got into Rabbit because I had a problem that I need solved, not because it was a cool toy I wanted to play with.</a:t>
+            </a:r>
+          </a:p>
+          <a:p>
+            <a:endParaRPr lang="en-US" baseline="0" dirty="0" smtClean="0"/>
+          </a:p>
+          <a:p>
+            <a:pPr marL="0" marR="0" indent="0" algn="l" defTabSz="914400" rtl="0" eaLnBrk="0" fontAlgn="base" latinLnBrk="0" hangingPunct="0">
+              <a:lnSpc>
+                <a:spcPct val="100000"/>
+              </a:lnSpc>
+              <a:spcBef>
+                <a:spcPct val="30000"/>
+              </a:spcBef>
+              <a:spcAft>
+                <a:spcPct val="0"/>
+              </a:spcAft>
+              <a:buClrTx/>
+              <a:buSzTx/>
+              <a:buFontTx/>
+              <a:buNone/>
+              <a:tabLst/>
+              <a:defRPr/>
+            </a:pPr>
+            <a:r>
               <a:rPr lang="en-US" dirty="0" smtClean="0"/>
-              <a:t>Heuristic</a:t>
+              <a:t>Queueing systems are powerful tools with lots of different</a:t>
             </a:r>
             <a:r>
               <a:rPr lang="en-US" baseline="0" dirty="0" smtClean="0"/>
-              <a:t> Solutions is based in the D.C. area; has mostly remote staff. A lot of us are in Columbus, Ohio. If you are near Columbus, Ohio and you’re in this room, ask me about Heuristic Solutions, I’d love to talk to you about it. We mainly work on a SaaS product with complex domain and code base. And I plan to actually show you our product today, as it relates to Queueing.</a:t>
-            </a:r>
+              <a:t> ways you can do things.</a:t>
+            </a:r>
+          </a:p>
+          <a:p>
+            <a:r>
+              <a:rPr lang="en-US" baseline="0" dirty="0" smtClean="0"/>
+              <a:t>But It was intimidating to me. If there are a million ways to do it, chances are I would pick the wrong one.</a:t>
+            </a:r>
+            <a:endParaRPr lang="en-US" dirty="0" smtClean="0"/>
+          </a:p>
+          <a:p>
+            <a:r>
+              <a:rPr lang="en-US" baseline="0" dirty="0" smtClean="0"/>
+              <a:t>But I found that it doesn’t have to be. If you feel the same way now, then I want to show you that it’s easier than I thought.</a:t>
+            </a:r>
+            <a:endParaRPr lang="en-US" dirty="0" smtClean="0"/>
+          </a:p>
+          <a:p>
             <a:endParaRPr lang="en-US" dirty="0"/>
           </a:p>
         </p:txBody>
@@ -2031,7 +2127,7 @@
               <a:pPr>
                 <a:defRPr/>
               </a:pPr>
-              <a:t>3</a:t>
+              <a:t>2</a:t>
             </a:fld>
             <a:endParaRPr lang="en-US"/>
           </a:p>
@@ -2040,7 +2136,7 @@
     </p:spTree>
     <p:extLst>
       <p:ext uri="{BB962C8B-B14F-4D97-AF65-F5344CB8AC3E}">
-        <p14:creationId xmlns:p14="http://schemas.microsoft.com/office/powerpoint/2010/main" val="2004222011"/>
+        <p14:creationId xmlns:p14="http://schemas.microsoft.com/office/powerpoint/2010/main" val="1031107804"/>
       </p:ext>
     </p:extLst>
   </p:cSld>
@@ -2091,16 +2187,18 @@
         </p:nvSpPr>
         <p:spPr/>
         <p:txBody>
-          <a:bodyPr/>
+          <a:bodyPr>
+            <a:normAutofit/>
+          </a:bodyPr>
           <a:lstStyle/>
           <a:p>
             <a:r>
               <a:rPr lang="en-US" dirty="0" smtClean="0"/>
-              <a:t>I wrote a book</a:t>
+              <a:t>Heuristic</a:t>
             </a:r>
             <a:r>
               <a:rPr lang="en-US" baseline="0" dirty="0" smtClean="0"/>
-              <a:t> on AOP; it’s only tangentially related to what I’m talking about today but you should buy it anyway</a:t>
+              <a:t> Solutions is based in the D.C. area; has mostly remote staff. A lot of us are in Columbus, Ohio. If you are near Columbus, Ohio and you’re in this room, ask me about Heuristic Solutions, I’d love to talk to you about it. We mainly work on a SaaS product with complex domain and code base. And I plan to actually show you our product today, as it relates to Queueing.</a:t>
             </a:r>
             <a:endParaRPr lang="en-US" dirty="0"/>
           </a:p>
@@ -2129,7 +2227,7 @@
               <a:pPr>
                 <a:defRPr/>
               </a:pPr>
-              <a:t>4</a:t>
+              <a:t>3</a:t>
             </a:fld>
             <a:endParaRPr lang="en-US"/>
           </a:p>
@@ -2138,7 +2236,7 @@
     </p:spTree>
     <p:extLst>
       <p:ext uri="{BB962C8B-B14F-4D97-AF65-F5344CB8AC3E}">
-        <p14:creationId xmlns:p14="http://schemas.microsoft.com/office/powerpoint/2010/main" val="4143180551"/>
+        <p14:creationId xmlns:p14="http://schemas.microsoft.com/office/powerpoint/2010/main" val="2004222011"/>
       </p:ext>
     </p:extLst>
   </p:cSld>
@@ -2194,7 +2292,11 @@
           <a:p>
             <a:r>
               <a:rPr lang="en-US" dirty="0" smtClean="0"/>
-              <a:t>Here’s what I’m covering today</a:t>
+              <a:t>I wrote a book</a:t>
+            </a:r>
+            <a:r>
+              <a:rPr lang="en-US" baseline="0" dirty="0" smtClean="0"/>
+              <a:t> on AOP; it’s only tangentially related to what I’m talking about today but you should buy it anyway</a:t>
             </a:r>
             <a:endParaRPr lang="en-US" dirty="0"/>
           </a:p>
@@ -2223,7 +2325,7 @@
               <a:pPr>
                 <a:defRPr/>
               </a:pPr>
-              <a:t>5</a:t>
+              <a:t>4</a:t>
             </a:fld>
             <a:endParaRPr lang="en-US"/>
           </a:p>
@@ -2232,7 +2334,7 @@
     </p:spTree>
     <p:extLst>
       <p:ext uri="{BB962C8B-B14F-4D97-AF65-F5344CB8AC3E}">
-        <p14:creationId xmlns:p14="http://schemas.microsoft.com/office/powerpoint/2010/main" val="2176565980"/>
+        <p14:creationId xmlns:p14="http://schemas.microsoft.com/office/powerpoint/2010/main" val="4143180551"/>
       </p:ext>
     </p:extLst>
   </p:cSld>
@@ -2288,30 +2390,51 @@
           <a:p>
             <a:r>
               <a:rPr lang="en-US" dirty="0" smtClean="0"/>
-              <a:t>Let’s assume that we have a “main program”,</a:t>
+              <a:t>Here’s what I’m covering </a:t>
+            </a:r>
+            <a:r>
+              <a:rPr lang="en-US" dirty="0" smtClean="0"/>
+              <a:t>today</a:t>
+            </a:r>
+          </a:p>
+          <a:p>
+            <a:r>
+              <a:rPr lang="en-US" dirty="0" smtClean="0"/>
+              <a:t>I’m not going to show you how to install </a:t>
+            </a:r>
+            <a:r>
+              <a:rPr lang="en-US" dirty="0" err="1" smtClean="0"/>
+              <a:t>RabbitMQ</a:t>
+            </a:r>
+            <a:r>
+              <a:rPr lang="en-US" dirty="0" smtClean="0"/>
+              <a:t> today</a:t>
+            </a:r>
+          </a:p>
+          <a:p>
+            <a:r>
+              <a:rPr lang="en-US" dirty="0" smtClean="0"/>
+              <a:t>I</a:t>
             </a:r>
             <a:r>
               <a:rPr lang="en-US" baseline="0" dirty="0" smtClean="0"/>
-              <a:t> let’s say a web app. It does all kinds of stuff: renders a UI, does business logic, makes DB queries, etc. Picture Amazon.com for instance.</a:t>
-            </a:r>
-          </a:p>
-          <a:p>
-            <a:endParaRPr lang="en-US" baseline="0" dirty="0" smtClean="0"/>
+              <a:t> have a video series on YouTube, and those videos will cover that, I’ll give you the link on the last slide</a:t>
+            </a:r>
           </a:p>
           <a:p>
             <a:r>
               <a:rPr lang="en-US" baseline="0" dirty="0" smtClean="0"/>
-              <a:t>It also has some tasks that are difficult, slow, or maybe there’s a large quantity of them. These tasks are on the main progress process, which means they affect the user experience. But those tasks don’t necessary need to happen there. They could be run on some other process, or some other machine. When you place an order, Amazon has to do a lot of work: notifications to sellers, notification to warehouses, updating databases, retrieving funds etc. These don’t all need to happen immediately. Amazon can just tell you “okay we got your order” and ideally move that work off of the web server to some other process on some other machine.</a:t>
-            </a:r>
-          </a:p>
-          <a:p>
-            <a:endParaRPr lang="en-US" baseline="0" dirty="0" smtClean="0"/>
-          </a:p>
-          <a:p>
+              <a:t>It’s super easy on windows and </a:t>
+            </a:r>
+            <a:r>
+              <a:rPr lang="en-US" baseline="0" dirty="0" err="1" smtClean="0"/>
+              <a:t>linux</a:t>
+            </a:r>
             <a:r>
               <a:rPr lang="en-US" baseline="0" dirty="0" smtClean="0"/>
-              <a:t>But we can’t  just push it directly to the machine, it might already be busy. So we put the relevant information into a temporary holding area. This is the queue.</a:t>
-            </a:r>
+              <a:t>, come talk to me afterwards I’d be happy to help</a:t>
+            </a:r>
+            <a:endParaRPr lang="en-US" dirty="0" smtClean="0"/>
           </a:p>
         </p:txBody>
       </p:sp>
@@ -2338,7 +2461,7 @@
               <a:pPr>
                 <a:defRPr/>
               </a:pPr>
-              <a:t>6</a:t>
+              <a:t>5</a:t>
             </a:fld>
             <a:endParaRPr lang="en-US"/>
           </a:p>
@@ -2347,7 +2470,7 @@
     </p:spTree>
     <p:extLst>
       <p:ext uri="{BB962C8B-B14F-4D97-AF65-F5344CB8AC3E}">
-        <p14:creationId xmlns:p14="http://schemas.microsoft.com/office/powerpoint/2010/main" val="1568745081"/>
+        <p14:creationId xmlns:p14="http://schemas.microsoft.com/office/powerpoint/2010/main" val="2176565980"/>
       </p:ext>
     </p:extLst>
   </p:cSld>
@@ -2403,21 +2526,30 @@
           <a:p>
             <a:r>
               <a:rPr lang="en-US" dirty="0" smtClean="0"/>
-              <a:t>I’m going to show you a Hello World using</a:t>
+              <a:t>Let’s assume that we have a “main program”,</a:t>
             </a:r>
             <a:r>
               <a:rPr lang="en-US" baseline="0" dirty="0" smtClean="0"/>
-              <a:t> </a:t>
-            </a:r>
-            <a:r>
-              <a:rPr lang="en-US" baseline="0" dirty="0" err="1" smtClean="0"/>
-              <a:t>RabbitMQ</a:t>
-            </a:r>
+              <a:t> let’s say a web app. It does all kinds of stuff: renders a UI, does business logic, makes DB queries, etc. Picture Amazon.com for instance.</a:t>
+            </a:r>
+          </a:p>
+          <a:p>
+            <a:endParaRPr lang="en-US" baseline="0" dirty="0" smtClean="0"/>
+          </a:p>
+          <a:p>
             <a:r>
               <a:rPr lang="en-US" baseline="0" dirty="0" smtClean="0"/>
-              <a:t> on .NET</a:t>
-            </a:r>
-            <a:endParaRPr lang="en-US" dirty="0"/>
+              <a:t>It also has some tasks that are difficult, slow, or maybe there’s a large quantity of them. These tasks are on the main progress process, which means they affect the user experience. But those tasks don’t necessary need to happen there. They could be run on some other process, or some other machine. When you place an order, Amazon has to do a lot of work: notifications to sellers, notification to warehouses, updating databases, retrieving funds etc. These don’t all need to happen immediately. Amazon can just tell you “okay we got your order” and ideally move that work off of the web server to some other process on some other machine.</a:t>
+            </a:r>
+          </a:p>
+          <a:p>
+            <a:endParaRPr lang="en-US" baseline="0" dirty="0" smtClean="0"/>
+          </a:p>
+          <a:p>
+            <a:r>
+              <a:rPr lang="en-US" baseline="0" dirty="0" smtClean="0"/>
+              <a:t>But we can’t  just push it directly to the machine, it might already be busy. So we put the relevant information into a temporary holding area. This is the queue.</a:t>
+            </a:r>
           </a:p>
         </p:txBody>
       </p:sp>
@@ -2444,7 +2576,7 @@
               <a:pPr>
                 <a:defRPr/>
               </a:pPr>
-              <a:t>7</a:t>
+              <a:t>6</a:t>
             </a:fld>
             <a:endParaRPr lang="en-US"/>
           </a:p>
@@ -2453,7 +2585,7 @@
     </p:spTree>
     <p:extLst>
       <p:ext uri="{BB962C8B-B14F-4D97-AF65-F5344CB8AC3E}">
-        <p14:creationId xmlns:p14="http://schemas.microsoft.com/office/powerpoint/2010/main" val="1601098168"/>
+        <p14:creationId xmlns:p14="http://schemas.microsoft.com/office/powerpoint/2010/main" val="1568745081"/>
       </p:ext>
     </p:extLst>
   </p:cSld>
@@ -2509,56 +2641,24 @@
           <a:p>
             <a:r>
               <a:rPr lang="en-US" dirty="0" smtClean="0"/>
-              <a:t>We get</a:t>
+              <a:t>I’m going to show you a Hello World using</a:t>
             </a:r>
             <a:r>
               <a:rPr lang="en-US" baseline="0" dirty="0" smtClean="0"/>
-              <a:t> a lot of power, but we may have to do a lot of work.</a:t>
-            </a:r>
-          </a:p>
-          <a:p>
+              <a:t> </a:t>
+            </a:r>
+            <a:r>
+              <a:rPr lang="en-US" baseline="0" dirty="0" err="1" smtClean="0"/>
+              <a:t>RabbitMQ</a:t>
+            </a:r>
             <a:r>
               <a:rPr lang="en-US" baseline="0" dirty="0" smtClean="0"/>
-              <a:t>Instead, we could use </a:t>
-            </a:r>
-            <a:r>
-              <a:rPr lang="en-US" baseline="0" dirty="0" err="1" smtClean="0"/>
-              <a:t>EasyNetQ</a:t>
+              <a:t> on .</a:t>
             </a:r>
             <a:r>
               <a:rPr lang="en-US" baseline="0" dirty="0" smtClean="0"/>
-              <a:t>.</a:t>
-            </a:r>
-          </a:p>
-          <a:p>
-            <a:endParaRPr lang="en-US" baseline="0" dirty="0" smtClean="0"/>
-          </a:p>
-          <a:p>
-            <a:r>
-              <a:rPr lang="en-US" baseline="0" dirty="0" smtClean="0"/>
-              <a:t>This is a .NET specific library, so both the producer(s) and consumer(s) need to be in .NET to use this.</a:t>
-            </a:r>
-          </a:p>
-          <a:p>
-            <a:r>
-              <a:rPr lang="en-US" baseline="0" dirty="0" smtClean="0"/>
-              <a:t>It’s an opinionated library, so we lose some control of </a:t>
-            </a:r>
-            <a:r>
-              <a:rPr lang="en-US" baseline="0" dirty="0" err="1" smtClean="0"/>
-              <a:t>RabbitMq</a:t>
-            </a:r>
-            <a:r>
-              <a:rPr lang="en-US" baseline="0" dirty="0" smtClean="0"/>
-              <a:t>.</a:t>
-            </a:r>
-          </a:p>
-          <a:p>
-            <a:r>
-              <a:rPr lang="en-US" baseline="0" dirty="0" smtClean="0"/>
-              <a:t>We lose some flexibility, but we gain some powerful patterns of producing and consuming.</a:t>
-            </a:r>
-            <a:endParaRPr lang="en-US" dirty="0"/>
+              <a:t>NET</a:t>
+            </a:r>
           </a:p>
         </p:txBody>
       </p:sp>
@@ -2585,7 +2685,7 @@
               <a:pPr>
                 <a:defRPr/>
               </a:pPr>
-              <a:t>8</a:t>
+              <a:t>7</a:t>
             </a:fld>
             <a:endParaRPr lang="en-US"/>
           </a:p>
@@ -2594,7 +2694,7 @@
     </p:spTree>
     <p:extLst>
       <p:ext uri="{BB962C8B-B14F-4D97-AF65-F5344CB8AC3E}">
-        <p14:creationId xmlns:p14="http://schemas.microsoft.com/office/powerpoint/2010/main" val="3970463987"/>
+        <p14:creationId xmlns:p14="http://schemas.microsoft.com/office/powerpoint/2010/main" val="1601098168"/>
       </p:ext>
     </p:extLst>
   </p:cSld>
@@ -2650,11 +2750,17 @@
           <a:p>
             <a:r>
               <a:rPr lang="en-US" dirty="0" smtClean="0"/>
-              <a:t>Messages are plain old objects. You</a:t>
+              <a:t>We get</a:t>
             </a:r>
             <a:r>
               <a:rPr lang="en-US" baseline="0" dirty="0" smtClean="0"/>
-              <a:t> give an object to </a:t>
+              <a:t> a lot of power, but we may have to do a lot of work.</a:t>
+            </a:r>
+          </a:p>
+          <a:p>
+            <a:r>
+              <a:rPr lang="en-US" baseline="0" dirty="0" smtClean="0"/>
+              <a:t>Instead, we could use </a:t>
             </a:r>
             <a:r>
               <a:rPr lang="en-US" baseline="0" dirty="0" err="1" smtClean="0"/>
@@ -2662,17 +2768,38 @@
             </a:r>
             <a:r>
               <a:rPr lang="en-US" baseline="0" dirty="0" smtClean="0"/>
-              <a:t>, it creates the channels, routing, queues, serializes the messages.</a:t>
-            </a:r>
+              <a:t>.</a:t>
+            </a:r>
+          </a:p>
+          <a:p>
+            <a:endParaRPr lang="en-US" baseline="0" dirty="0" smtClean="0"/>
           </a:p>
           <a:p>
             <a:r>
               <a:rPr lang="en-US" baseline="0" dirty="0" smtClean="0"/>
-              <a:t>You pull a message off the queue as an object, it finds the right routing, queue, and does the deserialization.</a:t>
-            </a:r>
-          </a:p>
-          <a:p>
-            <a:endParaRPr lang="en-US" baseline="0" dirty="0" smtClean="0"/>
+              <a:t>This is a .NET specific library, so both the producer(s) and consumer(s) need to be in .NET to use this.</a:t>
+            </a:r>
+          </a:p>
+          <a:p>
+            <a:r>
+              <a:rPr lang="en-US" baseline="0" dirty="0" smtClean="0"/>
+              <a:t>It’s an opinionated library, so we lose some control of </a:t>
+            </a:r>
+            <a:r>
+              <a:rPr lang="en-US" baseline="0" dirty="0" err="1" smtClean="0"/>
+              <a:t>RabbitMq</a:t>
+            </a:r>
+            <a:r>
+              <a:rPr lang="en-US" baseline="0" dirty="0" smtClean="0"/>
+              <a:t>.</a:t>
+            </a:r>
+          </a:p>
+          <a:p>
+            <a:r>
+              <a:rPr lang="en-US" baseline="0" dirty="0" smtClean="0"/>
+              <a:t>We lose some flexibility, but we gain some powerful patterns of producing and consuming.</a:t>
+            </a:r>
+            <a:endParaRPr lang="en-US" dirty="0"/>
           </a:p>
         </p:txBody>
       </p:sp>
@@ -2699,7 +2826,7 @@
               <a:pPr>
                 <a:defRPr/>
               </a:pPr>
-              <a:t>9</a:t>
+              <a:t>8</a:t>
             </a:fld>
             <a:endParaRPr lang="en-US"/>
           </a:p>
@@ -2708,7 +2835,7 @@
     </p:spTree>
     <p:extLst>
       <p:ext uri="{BB962C8B-B14F-4D97-AF65-F5344CB8AC3E}">
-        <p14:creationId xmlns:p14="http://schemas.microsoft.com/office/powerpoint/2010/main" val="1800400832"/>
+        <p14:creationId xmlns:p14="http://schemas.microsoft.com/office/powerpoint/2010/main" val="3970463987"/>
       </p:ext>
     </p:extLst>
   </p:cSld>
@@ -2764,21 +2891,29 @@
           <a:p>
             <a:r>
               <a:rPr lang="en-US" dirty="0" smtClean="0"/>
-              <a:t>Here are three patterns that </a:t>
-            </a:r>
-            <a:r>
-              <a:rPr lang="en-US" dirty="0" err="1" smtClean="0"/>
+              <a:t>Messages are plain old objects. You</a:t>
+            </a:r>
+            <a:r>
+              <a:rPr lang="en-US" baseline="0" dirty="0" smtClean="0"/>
+              <a:t> give an object to </a:t>
+            </a:r>
+            <a:r>
+              <a:rPr lang="en-US" baseline="0" dirty="0" err="1" smtClean="0"/>
               <a:t>EasyNetQ</a:t>
             </a:r>
             <a:r>
-              <a:rPr lang="en-US" dirty="0" smtClean="0"/>
-              <a:t> handles</a:t>
-            </a:r>
-            <a:r>
               <a:rPr lang="en-US" baseline="0" dirty="0" smtClean="0"/>
-              <a:t> for us.</a:t>
-            </a:r>
-            <a:endParaRPr lang="en-US" dirty="0"/>
+              <a:t>, it creates the channels, routing, queues, serializes the messages.</a:t>
+            </a:r>
+          </a:p>
+          <a:p>
+            <a:r>
+              <a:rPr lang="en-US" baseline="0" dirty="0" smtClean="0"/>
+              <a:t>You pull a message off the queue as an object, it finds the right routing, queue, and does the deserialization.</a:t>
+            </a:r>
+          </a:p>
+          <a:p>
+            <a:endParaRPr lang="en-US" baseline="0" dirty="0" smtClean="0"/>
           </a:p>
         </p:txBody>
       </p:sp>
@@ -2805,7 +2940,7 @@
               <a:pPr>
                 <a:defRPr/>
               </a:pPr>
-              <a:t>10</a:t>
+              <a:t>9</a:t>
             </a:fld>
             <a:endParaRPr lang="en-US"/>
           </a:p>
@@ -2814,7 +2949,7 @@
     </p:spTree>
     <p:extLst>
       <p:ext uri="{BB962C8B-B14F-4D97-AF65-F5344CB8AC3E}">
-        <p14:creationId xmlns:p14="http://schemas.microsoft.com/office/powerpoint/2010/main" val="329760597"/>
+        <p14:creationId xmlns:p14="http://schemas.microsoft.com/office/powerpoint/2010/main" val="1800400832"/>
       </p:ext>
     </p:extLst>
   </p:cSld>
@@ -3390,7 +3525,7 @@
               <a:pPr>
                 <a:defRPr/>
               </a:pPr>
-              <a:t>12/30/2015</a:t>
+              <a:t>1/5/2016</a:t>
             </a:fld>
             <a:endParaRPr lang="en-US"/>
           </a:p>
@@ -3992,7 +4127,7 @@
               <a:pPr>
                 <a:defRPr/>
               </a:pPr>
-              <a:t>12/30/2015</a:t>
+              <a:t>1/5/2016</a:t>
             </a:fld>
             <a:endParaRPr lang="en-US"/>
           </a:p>
@@ -4186,7 +4321,7 @@
               <a:pPr>
                 <a:defRPr/>
               </a:pPr>
-              <a:t>12/30/2015</a:t>
+              <a:t>1/5/2016</a:t>
             </a:fld>
             <a:endParaRPr lang="en-US"/>
           </a:p>
@@ -4474,7 +4609,7 @@
               <a:pPr>
                 <a:defRPr/>
               </a:pPr>
-              <a:t>12/30/2015</a:t>
+              <a:t>1/5/2016</a:t>
             </a:fld>
             <a:endParaRPr lang="en-US"/>
           </a:p>
@@ -4753,7 +4888,7 @@
           <a:p>
             <a:fld id="{5B5F5B05-54A5-40D6-8C87-F6F8096DBE9F}" type="datetimeFigureOut">
               <a:rPr lang="en-US" smtClean="0"/>
-              <a:t>12/30/2015</a:t>
+              <a:t>1/5/2016</a:t>
             </a:fld>
             <a:endParaRPr lang="en-US"/>
           </a:p>
@@ -4905,7 +5040,7 @@
               <a:pPr>
                 <a:defRPr/>
               </a:pPr>
-              <a:t>12/30/2015</a:t>
+              <a:t>1/5/2016</a:t>
             </a:fld>
             <a:endParaRPr lang="en-US" dirty="0"/>
           </a:p>
@@ -5448,7 +5583,7 @@
           <p:nvPr/>
         </p:nvPicPr>
         <p:blipFill>
-          <a:blip r:embed="rId2">
+          <a:blip r:embed="rId3">
             <a:extLst>
               <a:ext uri="{28A0092B-C50C-407E-A947-70E740481C1C}">
                 <a14:useLocalDpi xmlns:a14="http://schemas.microsoft.com/office/drawing/2010/main" val="0"/>
@@ -10593,11 +10728,7 @@
             </a:pPr>
             <a:r>
               <a:rPr lang="en-US" smtClean="0"/>
-              <a:t>Reflective </a:t>
-            </a:r>
-            <a:r>
-              <a:rPr lang="en-US" smtClean="0"/>
-              <a:t>Practice </a:t>
+              <a:t>Reflective Practice </a:t>
             </a:r>
             <a:r>
               <a:rPr lang="en-US" dirty="0" smtClean="0"/>
@@ -11095,8 +11226,8 @@
         </p:nvSpPr>
         <p:spPr>
           <a:xfrm>
-            <a:off x="50648" y="1447799"/>
-            <a:ext cx="5867400" cy="4524315"/>
+            <a:off x="0" y="762000"/>
+            <a:ext cx="7620000" cy="5447645"/>
           </a:xfrm>
           <a:prstGeom prst="rect">
             <a:avLst/>
@@ -11110,7 +11241,7 @@
           <a:lstStyle/>
           <a:p>
             <a:r>
-              <a:rPr lang="en-US" sz="3600" dirty="0" smtClean="0">
+              <a:rPr lang="en-US" sz="3200" dirty="0" smtClean="0">
                 <a:solidFill>
                   <a:schemeClr val="bg1"/>
                 </a:solidFill>
@@ -11120,7 +11251,7 @@
           </a:p>
           <a:p>
             <a:r>
-              <a:rPr lang="en-US" sz="3600" dirty="0" smtClean="0">
+              <a:rPr lang="en-US" sz="3200" dirty="0" smtClean="0">
                 <a:solidFill>
                   <a:schemeClr val="bg1"/>
                 </a:solidFill>
@@ -11128,21 +11259,21 @@
               <a:t> github.com/</a:t>
             </a:r>
             <a:r>
-              <a:rPr lang="en-US" sz="3600" dirty="0" err="1" smtClean="0">
+              <a:rPr lang="en-US" sz="3200" dirty="0" err="1" smtClean="0">
                 <a:solidFill>
                   <a:schemeClr val="bg1"/>
                 </a:solidFill>
               </a:rPr>
               <a:t>mgroves</a:t>
             </a:r>
-            <a:endParaRPr lang="en-US" sz="3600" dirty="0" smtClean="0">
+            <a:endParaRPr lang="en-US" sz="3200" dirty="0" smtClean="0">
               <a:solidFill>
                 <a:schemeClr val="bg1"/>
               </a:solidFill>
             </a:endParaRPr>
           </a:p>
           <a:p>
-            <a:endParaRPr lang="en-US" sz="3600" dirty="0">
+            <a:endParaRPr lang="en-US" sz="3200" dirty="0">
               <a:solidFill>
                 <a:schemeClr val="bg1"/>
               </a:solidFill>
@@ -11150,7 +11281,7 @@
           </a:p>
           <a:p>
             <a:r>
-              <a:rPr lang="en-US" sz="3600" dirty="0" smtClean="0">
+              <a:rPr lang="en-US" sz="3200" dirty="0" smtClean="0">
                 <a:solidFill>
                   <a:schemeClr val="bg1"/>
                 </a:solidFill>
@@ -11160,7 +11291,7 @@
           </a:p>
           <a:p>
             <a:r>
-              <a:rPr lang="en-US" sz="3600" dirty="0" smtClean="0">
+              <a:rPr lang="en-US" sz="3200" dirty="0" smtClean="0">
                 <a:solidFill>
                   <a:schemeClr val="bg1"/>
                 </a:solidFill>
@@ -11169,7 +11300,7 @@
             </a:r>
           </a:p>
           <a:p>
-            <a:endParaRPr lang="en-US" sz="3600" dirty="0" smtClean="0">
+            <a:endParaRPr lang="en-US" sz="3200" dirty="0" smtClean="0">
               <a:solidFill>
                 <a:schemeClr val="bg1"/>
               </a:solidFill>
@@ -11177,7 +11308,7 @@
           </a:p>
           <a:p>
             <a:r>
-              <a:rPr lang="en-US" sz="3600" dirty="0" smtClean="0">
+              <a:rPr lang="en-US" sz="3200" dirty="0" smtClean="0">
                 <a:solidFill>
                   <a:schemeClr val="bg1"/>
                 </a:solidFill>
@@ -11187,14 +11318,57 @@
           </a:p>
           <a:p>
             <a:r>
-              <a:rPr lang="en-US" sz="3600" dirty="0" smtClean="0">
+              <a:rPr lang="en-US" sz="3200" dirty="0" smtClean="0">
                 <a:solidFill>
                   <a:schemeClr val="bg1"/>
                 </a:solidFill>
               </a:rPr>
-              <a:t> manning.com/groves</a:t>
-            </a:r>
-            <a:endParaRPr lang="en-US" sz="3600" dirty="0">
+              <a:t> </a:t>
+            </a:r>
+            <a:r>
+              <a:rPr lang="en-US" sz="3200" dirty="0" smtClean="0">
+                <a:solidFill>
+                  <a:schemeClr val="bg1"/>
+                </a:solidFill>
+              </a:rPr>
+              <a:t>manning.com/groves</a:t>
+            </a:r>
+          </a:p>
+          <a:p>
+            <a:endParaRPr lang="en-US" sz="3200" dirty="0">
+              <a:solidFill>
+                <a:schemeClr val="bg1"/>
+              </a:solidFill>
+            </a:endParaRPr>
+          </a:p>
+          <a:p>
+            <a:r>
+              <a:rPr lang="en-US" sz="3200" dirty="0" smtClean="0">
+                <a:solidFill>
+                  <a:schemeClr val="bg1"/>
+                </a:solidFill>
+              </a:rPr>
+              <a:t>Videos:</a:t>
+            </a:r>
+          </a:p>
+          <a:p>
+            <a:r>
+              <a:rPr lang="en-US" sz="2800" dirty="0" smtClean="0">
+                <a:solidFill>
+                  <a:schemeClr val="bg1"/>
+                </a:solidFill>
+              </a:rPr>
+              <a:t> http://</a:t>
+            </a:r>
+            <a:r>
+              <a:rPr lang="en-US" sz="2800" dirty="0">
+                <a:solidFill>
+                  <a:schemeClr val="bg1"/>
+                </a:solidFill>
+              </a:rPr>
+              <a:t>tinyurl.com/mgrovesrabbit</a:t>
+            </a:r>
+            <a:endParaRPr lang="en-US" dirty="0">
               <a:solidFill>
                 <a:schemeClr val="bg1"/>
               </a:solidFill>
@@ -11218,7 +11392,7 @@
         </p:blipFill>
         <p:spPr>
           <a:xfrm>
-            <a:off x="5181600" y="762000"/>
+            <a:off x="5334000" y="762000"/>
             <a:ext cx="3810000" cy="5741096"/>
           </a:xfrm>
           <a:prstGeom prst="rect">
@@ -13003,8 +13177,8 @@
         </p:nvSpPr>
         <p:spPr>
           <a:xfrm>
-            <a:off x="2438400" y="2362200"/>
-            <a:ext cx="4006225" cy="1323439"/>
+            <a:off x="2182722" y="2362200"/>
+            <a:ext cx="4517582" cy="1323439"/>
           </a:xfrm>
           <a:prstGeom prst="rect">
             <a:avLst/>
@@ -13043,7 +13217,7 @@
                   <a:schemeClr val="bg1"/>
                 </a:solidFill>
               </a:rPr>
-              <a:t> Demo</a:t>
+              <a:t> on .NET</a:t>
             </a:r>
             <a:endParaRPr lang="en-US" sz="4000" dirty="0">
               <a:solidFill>
@@ -14370,18 +14544,18 @@
 </file>
 
 <file path=customXml/item1.xml><?xml version="1.0" encoding="utf-8"?>
-<p:properties xmlns:p="http://schemas.microsoft.com/office/2006/metadata/properties" xmlns:xsi="http://www.w3.org/2001/XMLSchema-instance">
-  <documentManagement/>
-</p:properties>
-</file>
-
-<file path=customXml/item2.xml><?xml version="1.0" encoding="utf-8"?>
 <?mso-contentType ?>
 <FormTemplates xmlns="http://schemas.microsoft.com/sharepoint/v3/contenttype/forms">
   <Display>DocumentLibraryForm</Display>
   <Edit>DocumentLibraryForm</Edit>
   <New>DocumentLibraryForm</New>
 </FormTemplates>
+</file>
+
+<file path=customXml/item2.xml><?xml version="1.0" encoding="utf-8"?>
+<p:properties xmlns:p="http://schemas.microsoft.com/office/2006/metadata/properties" xmlns:xsi="http://www.w3.org/2001/XMLSchema-instance">
+  <documentManagement/>
+</p:properties>
 </file>
 
 <file path=customXml/item3.xml><?xml version="1.0" encoding="utf-8"?>
@@ -14544,6 +14718,14 @@
 </file>
 
 <file path=customXml/itemProps1.xml><?xml version="1.0" encoding="utf-8"?>
+<ds:datastoreItem xmlns:ds="http://schemas.openxmlformats.org/officeDocument/2006/customXml" ds:itemID="{8C23FA9D-D7BA-4AFD-B85F-281750C62C01}">
+  <ds:schemaRefs>
+    <ds:schemaRef ds:uri="http://schemas.microsoft.com/sharepoint/v3/contenttype/forms"/>
+  </ds:schemaRefs>
+</ds:datastoreItem>
+</file>
+
+<file path=customXml/itemProps2.xml><?xml version="1.0" encoding="utf-8"?>
 <ds:datastoreItem xmlns:ds="http://schemas.openxmlformats.org/officeDocument/2006/customXml" ds:itemID="{07558391-8EE6-4E06-99C8-92B89A44F7E2}">
   <ds:schemaRefs>
     <ds:schemaRef ds:uri="http://schemas.microsoft.com/office/infopath/2007/PartnerControls"/>
@@ -14556,14 +14738,6 @@
     <ds:schemaRef ds:uri="f8ac541a-bba0-4917-b64a-f995323e0098"/>
     <ds:schemaRef ds:uri="0da6e460-5409-42fa-b61f-2f47ce404b8b"/>
     <ds:schemaRef ds:uri="http://purl.org/dc/terms/"/>
-  </ds:schemaRefs>
-</ds:datastoreItem>
-</file>
-
-<file path=customXml/itemProps2.xml><?xml version="1.0" encoding="utf-8"?>
-<ds:datastoreItem xmlns:ds="http://schemas.openxmlformats.org/officeDocument/2006/customXml" ds:itemID="{8C23FA9D-D7BA-4AFD-B85F-281750C62C01}">
-  <ds:schemaRefs>
-    <ds:schemaRef ds:uri="http://schemas.microsoft.com/sharepoint/v3/contenttype/forms"/>
   </ds:schemaRefs>
 </ds:datastoreItem>
 </file>

</xml_diff>